<commit_message>
Updated SGW Project Update (Final) 15Nov17
Removed "Create Volunteer Profile" from User Stories & changed "Input
Volunteer Data/Hours" on Admin Workflow
</commit_message>
<xml_diff>
--- a/SGW Project Update (Final) 15Nov17.pptx
+++ b/SGW Project Update (Final) 15Nov17.pptx
@@ -907,7 +907,7 @@
               <a:latin typeface="Arial" panose="020B0604020202020204" pitchFamily="34" charset="0"/>
               <a:cs typeface="Arial" panose="020B0604020202020204" pitchFamily="34" charset="0"/>
             </a:rPr>
-            <a:t>1.1</a:t>
+            <a:t>1.0</a:t>
           </a:r>
         </a:p>
         <a:p>
@@ -975,7 +975,7 @@
               <a:latin typeface="Arial" panose="020B0604020202020204" pitchFamily="34" charset="0"/>
               <a:cs typeface="Arial" panose="020B0604020202020204" pitchFamily="34" charset="0"/>
             </a:rPr>
-            <a:t>1.2</a:t>
+            <a:t>1.1</a:t>
           </a:r>
         </a:p>
         <a:p>
@@ -2114,7 +2114,7 @@
               <a:latin typeface="Arial" panose="020B0604020202020204" pitchFamily="34" charset="0"/>
               <a:cs typeface="Arial" panose="020B0604020202020204" pitchFamily="34" charset="0"/>
             </a:rPr>
-            <a:t>1.3</a:t>
+            <a:t>1.2</a:t>
           </a:r>
         </a:p>
         <a:p>
@@ -3805,26 +3805,6 @@
     <dgm:pt modelId="{58FCFA12-57FF-4DDE-AA78-FD5F24D44BE5}" type="pres">
       <dgm:prSet presAssocID="{A6569C1B-F779-4BE0-969E-A2AFB0425B84}" presName="Name37" presStyleLbl="parChTrans1D3" presStyleIdx="4" presStyleCnt="22"/>
       <dgm:spPr/>
-    </dgm:pt>
-    <dgm:pt modelId="{72474307-32C2-4117-8E3D-EE0ECD80D53D}" type="pres">
-      <dgm:prSet presAssocID="{F841F772-F263-44DB-AF9F-DD29A8A41A82}" presName="hierRoot2" presStyleCnt="0">
-        <dgm:presLayoutVars>
-          <dgm:hierBranch val="init"/>
-        </dgm:presLayoutVars>
-      </dgm:prSet>
-      <dgm:spPr/>
-    </dgm:pt>
-    <dgm:pt modelId="{2FB2C3AB-7758-4FF5-8545-55FF77F10D3D}" type="pres">
-      <dgm:prSet presAssocID="{F841F772-F263-44DB-AF9F-DD29A8A41A82}" presName="rootComposite" presStyleCnt="0"/>
-      <dgm:spPr/>
-    </dgm:pt>
-    <dgm:pt modelId="{2F56B4D2-400A-48F1-9F86-328A9D96FD6A}" type="pres">
-      <dgm:prSet presAssocID="{F841F772-F263-44DB-AF9F-DD29A8A41A82}" presName="rootText" presStyleLbl="node3" presStyleIdx="4" presStyleCnt="22" custScaleY="127694">
-        <dgm:presLayoutVars>
-          <dgm:chPref val="3"/>
-        </dgm:presLayoutVars>
-      </dgm:prSet>
-      <dgm:spPr/>
       <dgm:t>
         <a:bodyPr/>
         <a:lstStyle/>
@@ -3833,8 +3813,24 @@
         </a:p>
       </dgm:t>
     </dgm:pt>
-    <dgm:pt modelId="{EAAC0396-F5F9-4F12-82E3-06CCEE8D8411}" type="pres">
-      <dgm:prSet presAssocID="{F841F772-F263-44DB-AF9F-DD29A8A41A82}" presName="rootConnector" presStyleLbl="node3" presStyleIdx="4" presStyleCnt="22"/>
+    <dgm:pt modelId="{72474307-32C2-4117-8E3D-EE0ECD80D53D}" type="pres">
+      <dgm:prSet presAssocID="{F841F772-F263-44DB-AF9F-DD29A8A41A82}" presName="hierRoot2" presStyleCnt="0">
+        <dgm:presLayoutVars>
+          <dgm:hierBranch val="init"/>
+        </dgm:presLayoutVars>
+      </dgm:prSet>
+      <dgm:spPr/>
+    </dgm:pt>
+    <dgm:pt modelId="{2FB2C3AB-7758-4FF5-8545-55FF77F10D3D}" type="pres">
+      <dgm:prSet presAssocID="{F841F772-F263-44DB-AF9F-DD29A8A41A82}" presName="rootComposite" presStyleCnt="0"/>
+      <dgm:spPr/>
+    </dgm:pt>
+    <dgm:pt modelId="{2F56B4D2-400A-48F1-9F86-328A9D96FD6A}" type="pres">
+      <dgm:prSet presAssocID="{F841F772-F263-44DB-AF9F-DD29A8A41A82}" presName="rootText" presStyleLbl="node3" presStyleIdx="4" presStyleCnt="22" custScaleY="127694">
+        <dgm:presLayoutVars>
+          <dgm:chPref val="3"/>
+        </dgm:presLayoutVars>
+      </dgm:prSet>
       <dgm:spPr/>
       <dgm:t>
         <a:bodyPr/>
@@ -3844,20 +3840,8 @@
         </a:p>
       </dgm:t>
     </dgm:pt>
-    <dgm:pt modelId="{0D61F103-8929-4F11-9E60-27D82E013DEF}" type="pres">
-      <dgm:prSet presAssocID="{F841F772-F263-44DB-AF9F-DD29A8A41A82}" presName="hierChild4" presStyleCnt="0"/>
-      <dgm:spPr/>
-    </dgm:pt>
-    <dgm:pt modelId="{3F26119D-54AC-41DA-AE56-F972BE7B6A6A}" type="pres">
-      <dgm:prSet presAssocID="{F841F772-F263-44DB-AF9F-DD29A8A41A82}" presName="hierChild5" presStyleCnt="0"/>
-      <dgm:spPr/>
-    </dgm:pt>
-    <dgm:pt modelId="{BD6A3BA6-9041-4D9C-958C-9D129F5A8170}" type="pres">
-      <dgm:prSet presAssocID="{54F52B91-96F3-4A93-8C51-4A8BFBEDFA33}" presName="hierChild5" presStyleCnt="0"/>
-      <dgm:spPr/>
-    </dgm:pt>
-    <dgm:pt modelId="{97C1ADA8-C573-433C-A903-2B5AF2D11025}" type="pres">
-      <dgm:prSet presAssocID="{8B86F944-694A-43B9-BD2C-86002A138388}" presName="Name37" presStyleLbl="parChTrans1D2" presStyleIdx="2" presStyleCnt="11"/>
+    <dgm:pt modelId="{EAAC0396-F5F9-4F12-82E3-06CCEE8D8411}" type="pres">
+      <dgm:prSet presAssocID="{F841F772-F263-44DB-AF9F-DD29A8A41A82}" presName="rootConnector" presStyleLbl="node3" presStyleIdx="4" presStyleCnt="22"/>
       <dgm:spPr/>
       <dgm:t>
         <a:bodyPr/>
@@ -3867,24 +3851,20 @@
         </a:p>
       </dgm:t>
     </dgm:pt>
-    <dgm:pt modelId="{8C0D7482-2972-4DA2-B023-40CFC2A60796}" type="pres">
-      <dgm:prSet presAssocID="{B5CEA2D4-A899-4C2C-BA30-79C7F0302244}" presName="hierRoot2" presStyleCnt="0">
-        <dgm:presLayoutVars>
-          <dgm:hierBranch val="init"/>
-        </dgm:presLayoutVars>
-      </dgm:prSet>
-      <dgm:spPr/>
-    </dgm:pt>
-    <dgm:pt modelId="{4A015B71-FF6D-4FAA-A716-C83012191BDD}" type="pres">
-      <dgm:prSet presAssocID="{B5CEA2D4-A899-4C2C-BA30-79C7F0302244}" presName="rootComposite" presStyleCnt="0"/>
-      <dgm:spPr/>
-    </dgm:pt>
-    <dgm:pt modelId="{E6677268-D00C-4D1B-A6D9-295F28778097}" type="pres">
-      <dgm:prSet presAssocID="{B5CEA2D4-A899-4C2C-BA30-79C7F0302244}" presName="rootText" presStyleLbl="node2" presStyleIdx="2" presStyleCnt="9">
-        <dgm:presLayoutVars>
-          <dgm:chPref val="3"/>
-        </dgm:presLayoutVars>
-      </dgm:prSet>
+    <dgm:pt modelId="{0D61F103-8929-4F11-9E60-27D82E013DEF}" type="pres">
+      <dgm:prSet presAssocID="{F841F772-F263-44DB-AF9F-DD29A8A41A82}" presName="hierChild4" presStyleCnt="0"/>
+      <dgm:spPr/>
+    </dgm:pt>
+    <dgm:pt modelId="{3F26119D-54AC-41DA-AE56-F972BE7B6A6A}" type="pres">
+      <dgm:prSet presAssocID="{F841F772-F263-44DB-AF9F-DD29A8A41A82}" presName="hierChild5" presStyleCnt="0"/>
+      <dgm:spPr/>
+    </dgm:pt>
+    <dgm:pt modelId="{BD6A3BA6-9041-4D9C-958C-9D129F5A8170}" type="pres">
+      <dgm:prSet presAssocID="{54F52B91-96F3-4A93-8C51-4A8BFBEDFA33}" presName="hierChild5" presStyleCnt="0"/>
+      <dgm:spPr/>
+    </dgm:pt>
+    <dgm:pt modelId="{97C1ADA8-C573-433C-A903-2B5AF2D11025}" type="pres">
+      <dgm:prSet presAssocID="{8B86F944-694A-43B9-BD2C-86002A138388}" presName="Name37" presStyleLbl="parChTrans1D2" presStyleIdx="2" presStyleCnt="11"/>
       <dgm:spPr/>
       <dgm:t>
         <a:bodyPr/>
@@ -3894,8 +3874,24 @@
         </a:p>
       </dgm:t>
     </dgm:pt>
-    <dgm:pt modelId="{2B0A4C06-23E2-4C10-ACD4-A1381D5956C7}" type="pres">
-      <dgm:prSet presAssocID="{B5CEA2D4-A899-4C2C-BA30-79C7F0302244}" presName="rootConnector" presStyleLbl="node2" presStyleIdx="2" presStyleCnt="9"/>
+    <dgm:pt modelId="{8C0D7482-2972-4DA2-B023-40CFC2A60796}" type="pres">
+      <dgm:prSet presAssocID="{B5CEA2D4-A899-4C2C-BA30-79C7F0302244}" presName="hierRoot2" presStyleCnt="0">
+        <dgm:presLayoutVars>
+          <dgm:hierBranch val="init"/>
+        </dgm:presLayoutVars>
+      </dgm:prSet>
+      <dgm:spPr/>
+    </dgm:pt>
+    <dgm:pt modelId="{4A015B71-FF6D-4FAA-A716-C83012191BDD}" type="pres">
+      <dgm:prSet presAssocID="{B5CEA2D4-A899-4C2C-BA30-79C7F0302244}" presName="rootComposite" presStyleCnt="0"/>
+      <dgm:spPr/>
+    </dgm:pt>
+    <dgm:pt modelId="{E6677268-D00C-4D1B-A6D9-295F28778097}" type="pres">
+      <dgm:prSet presAssocID="{B5CEA2D4-A899-4C2C-BA30-79C7F0302244}" presName="rootText" presStyleLbl="node2" presStyleIdx="2" presStyleCnt="9">
+        <dgm:presLayoutVars>
+          <dgm:chPref val="3"/>
+        </dgm:presLayoutVars>
+      </dgm:prSet>
       <dgm:spPr/>
       <dgm:t>
         <a:bodyPr/>
@@ -3905,12 +3901,8 @@
         </a:p>
       </dgm:t>
     </dgm:pt>
-    <dgm:pt modelId="{D5A05807-EFB5-48D0-B488-8CD82056E20D}" type="pres">
-      <dgm:prSet presAssocID="{B5CEA2D4-A899-4C2C-BA30-79C7F0302244}" presName="hierChild4" presStyleCnt="0"/>
-      <dgm:spPr/>
-    </dgm:pt>
-    <dgm:pt modelId="{4936C0EE-735B-4022-A21D-F437E8C8FB2C}" type="pres">
-      <dgm:prSet presAssocID="{B76B37EA-7611-4BE2-8A94-945B0806F9F6}" presName="Name37" presStyleLbl="parChTrans1D3" presStyleIdx="5" presStyleCnt="22"/>
+    <dgm:pt modelId="{2B0A4C06-23E2-4C10-ACD4-A1381D5956C7}" type="pres">
+      <dgm:prSet presAssocID="{B5CEA2D4-A899-4C2C-BA30-79C7F0302244}" presName="rootConnector" presStyleLbl="node2" presStyleIdx="2" presStyleCnt="9"/>
       <dgm:spPr/>
       <dgm:t>
         <a:bodyPr/>
@@ -3920,24 +3912,12 @@
         </a:p>
       </dgm:t>
     </dgm:pt>
-    <dgm:pt modelId="{608E8B0C-6362-4D15-909F-248DA487C2BF}" type="pres">
-      <dgm:prSet presAssocID="{A9751E97-5308-409A-BD37-D117ED6BF809}" presName="hierRoot2" presStyleCnt="0">
-        <dgm:presLayoutVars>
-          <dgm:hierBranch val="init"/>
-        </dgm:presLayoutVars>
-      </dgm:prSet>
-      <dgm:spPr/>
-    </dgm:pt>
-    <dgm:pt modelId="{8D8984DA-558F-47D2-A944-909EE8F084F5}" type="pres">
-      <dgm:prSet presAssocID="{A9751E97-5308-409A-BD37-D117ED6BF809}" presName="rootComposite" presStyleCnt="0"/>
-      <dgm:spPr/>
-    </dgm:pt>
-    <dgm:pt modelId="{15F2BC78-D50C-4AAD-8B4C-69F04EAC3A17}" type="pres">
-      <dgm:prSet presAssocID="{A9751E97-5308-409A-BD37-D117ED6BF809}" presName="rootText" presStyleLbl="node3" presStyleIdx="5" presStyleCnt="22">
-        <dgm:presLayoutVars>
-          <dgm:chPref val="3"/>
-        </dgm:presLayoutVars>
-      </dgm:prSet>
+    <dgm:pt modelId="{D5A05807-EFB5-48D0-B488-8CD82056E20D}" type="pres">
+      <dgm:prSet presAssocID="{B5CEA2D4-A899-4C2C-BA30-79C7F0302244}" presName="hierChild4" presStyleCnt="0"/>
+      <dgm:spPr/>
+    </dgm:pt>
+    <dgm:pt modelId="{4936C0EE-735B-4022-A21D-F437E8C8FB2C}" type="pres">
+      <dgm:prSet presAssocID="{B76B37EA-7611-4BE2-8A94-945B0806F9F6}" presName="Name37" presStyleLbl="parChTrans1D3" presStyleIdx="5" presStyleCnt="22"/>
       <dgm:spPr/>
       <dgm:t>
         <a:bodyPr/>
@@ -3947,8 +3927,24 @@
         </a:p>
       </dgm:t>
     </dgm:pt>
-    <dgm:pt modelId="{4F17F90F-8BD4-4804-A10D-0E0D98F92923}" type="pres">
-      <dgm:prSet presAssocID="{A9751E97-5308-409A-BD37-D117ED6BF809}" presName="rootConnector" presStyleLbl="node3" presStyleIdx="5" presStyleCnt="22"/>
+    <dgm:pt modelId="{608E8B0C-6362-4D15-909F-248DA487C2BF}" type="pres">
+      <dgm:prSet presAssocID="{A9751E97-5308-409A-BD37-D117ED6BF809}" presName="hierRoot2" presStyleCnt="0">
+        <dgm:presLayoutVars>
+          <dgm:hierBranch val="init"/>
+        </dgm:presLayoutVars>
+      </dgm:prSet>
+      <dgm:spPr/>
+    </dgm:pt>
+    <dgm:pt modelId="{8D8984DA-558F-47D2-A944-909EE8F084F5}" type="pres">
+      <dgm:prSet presAssocID="{A9751E97-5308-409A-BD37-D117ED6BF809}" presName="rootComposite" presStyleCnt="0"/>
+      <dgm:spPr/>
+    </dgm:pt>
+    <dgm:pt modelId="{15F2BC78-D50C-4AAD-8B4C-69F04EAC3A17}" type="pres">
+      <dgm:prSet presAssocID="{A9751E97-5308-409A-BD37-D117ED6BF809}" presName="rootText" presStyleLbl="node3" presStyleIdx="5" presStyleCnt="22">
+        <dgm:presLayoutVars>
+          <dgm:chPref val="3"/>
+        </dgm:presLayoutVars>
+      </dgm:prSet>
       <dgm:spPr/>
       <dgm:t>
         <a:bodyPr/>
@@ -3958,16 +3954,8 @@
         </a:p>
       </dgm:t>
     </dgm:pt>
-    <dgm:pt modelId="{085F421D-D2A3-4832-8D90-1E627F07F0CE}" type="pres">
-      <dgm:prSet presAssocID="{A9751E97-5308-409A-BD37-D117ED6BF809}" presName="hierChild4" presStyleCnt="0"/>
-      <dgm:spPr/>
-    </dgm:pt>
-    <dgm:pt modelId="{7E23741C-69CE-4B29-8C85-1E7293C3B5F4}" type="pres">
-      <dgm:prSet presAssocID="{A9751E97-5308-409A-BD37-D117ED6BF809}" presName="hierChild5" presStyleCnt="0"/>
-      <dgm:spPr/>
-    </dgm:pt>
-    <dgm:pt modelId="{613C03D6-7054-4B73-96F2-78EDD8671AF2}" type="pres">
-      <dgm:prSet presAssocID="{463DAE48-7CE6-4E11-AAB1-77194570CA13}" presName="Name37" presStyleLbl="parChTrans1D3" presStyleIdx="6" presStyleCnt="22"/>
+    <dgm:pt modelId="{4F17F90F-8BD4-4804-A10D-0E0D98F92923}" type="pres">
+      <dgm:prSet presAssocID="{A9751E97-5308-409A-BD37-D117ED6BF809}" presName="rootConnector" presStyleLbl="node3" presStyleIdx="5" presStyleCnt="22"/>
       <dgm:spPr/>
       <dgm:t>
         <a:bodyPr/>
@@ -3977,24 +3965,16 @@
         </a:p>
       </dgm:t>
     </dgm:pt>
-    <dgm:pt modelId="{FAF718D9-CE6F-4E63-BA1F-23100B0595C4}" type="pres">
-      <dgm:prSet presAssocID="{206FA317-2A95-4AFD-B801-ED2E3F52304B}" presName="hierRoot2" presStyleCnt="0">
-        <dgm:presLayoutVars>
-          <dgm:hierBranch val="init"/>
-        </dgm:presLayoutVars>
-      </dgm:prSet>
-      <dgm:spPr/>
-    </dgm:pt>
-    <dgm:pt modelId="{17C91B4C-F0E4-4024-A0F5-14512A7F497C}" type="pres">
-      <dgm:prSet presAssocID="{206FA317-2A95-4AFD-B801-ED2E3F52304B}" presName="rootComposite" presStyleCnt="0"/>
-      <dgm:spPr/>
-    </dgm:pt>
-    <dgm:pt modelId="{5EE94A07-DE5A-4F7A-A8DD-16D552E2D98E}" type="pres">
-      <dgm:prSet presAssocID="{206FA317-2A95-4AFD-B801-ED2E3F52304B}" presName="rootText" presStyleLbl="node3" presStyleIdx="6" presStyleCnt="22">
-        <dgm:presLayoutVars>
-          <dgm:chPref val="3"/>
-        </dgm:presLayoutVars>
-      </dgm:prSet>
+    <dgm:pt modelId="{085F421D-D2A3-4832-8D90-1E627F07F0CE}" type="pres">
+      <dgm:prSet presAssocID="{A9751E97-5308-409A-BD37-D117ED6BF809}" presName="hierChild4" presStyleCnt="0"/>
+      <dgm:spPr/>
+    </dgm:pt>
+    <dgm:pt modelId="{7E23741C-69CE-4B29-8C85-1E7293C3B5F4}" type="pres">
+      <dgm:prSet presAssocID="{A9751E97-5308-409A-BD37-D117ED6BF809}" presName="hierChild5" presStyleCnt="0"/>
+      <dgm:spPr/>
+    </dgm:pt>
+    <dgm:pt modelId="{613C03D6-7054-4B73-96F2-78EDD8671AF2}" type="pres">
+      <dgm:prSet presAssocID="{463DAE48-7CE6-4E11-AAB1-77194570CA13}" presName="Name37" presStyleLbl="parChTrans1D3" presStyleIdx="6" presStyleCnt="22"/>
       <dgm:spPr/>
       <dgm:t>
         <a:bodyPr/>
@@ -4004,8 +3984,24 @@
         </a:p>
       </dgm:t>
     </dgm:pt>
-    <dgm:pt modelId="{57F61604-BE15-4362-B346-71D638A88099}" type="pres">
-      <dgm:prSet presAssocID="{206FA317-2A95-4AFD-B801-ED2E3F52304B}" presName="rootConnector" presStyleLbl="node3" presStyleIdx="6" presStyleCnt="22"/>
+    <dgm:pt modelId="{FAF718D9-CE6F-4E63-BA1F-23100B0595C4}" type="pres">
+      <dgm:prSet presAssocID="{206FA317-2A95-4AFD-B801-ED2E3F52304B}" presName="hierRoot2" presStyleCnt="0">
+        <dgm:presLayoutVars>
+          <dgm:hierBranch val="init"/>
+        </dgm:presLayoutVars>
+      </dgm:prSet>
+      <dgm:spPr/>
+    </dgm:pt>
+    <dgm:pt modelId="{17C91B4C-F0E4-4024-A0F5-14512A7F497C}" type="pres">
+      <dgm:prSet presAssocID="{206FA317-2A95-4AFD-B801-ED2E3F52304B}" presName="rootComposite" presStyleCnt="0"/>
+      <dgm:spPr/>
+    </dgm:pt>
+    <dgm:pt modelId="{5EE94A07-DE5A-4F7A-A8DD-16D552E2D98E}" type="pres">
+      <dgm:prSet presAssocID="{206FA317-2A95-4AFD-B801-ED2E3F52304B}" presName="rootText" presStyleLbl="node3" presStyleIdx="6" presStyleCnt="22">
+        <dgm:presLayoutVars>
+          <dgm:chPref val="3"/>
+        </dgm:presLayoutVars>
+      </dgm:prSet>
       <dgm:spPr/>
       <dgm:t>
         <a:bodyPr/>
@@ -4015,16 +4011,8 @@
         </a:p>
       </dgm:t>
     </dgm:pt>
-    <dgm:pt modelId="{959171F2-E871-47B5-97FB-8A6260020CC0}" type="pres">
-      <dgm:prSet presAssocID="{206FA317-2A95-4AFD-B801-ED2E3F52304B}" presName="hierChild4" presStyleCnt="0"/>
-      <dgm:spPr/>
-    </dgm:pt>
-    <dgm:pt modelId="{F80890A4-215C-4D2A-B4C8-B399A6109114}" type="pres">
-      <dgm:prSet presAssocID="{206FA317-2A95-4AFD-B801-ED2E3F52304B}" presName="hierChild5" presStyleCnt="0"/>
-      <dgm:spPr/>
-    </dgm:pt>
-    <dgm:pt modelId="{FD7D4D9F-8B82-4134-A440-E709162FB101}" type="pres">
-      <dgm:prSet presAssocID="{F6903CF6-6A4F-4541-A359-24FE5D01E33B}" presName="Name37" presStyleLbl="parChTrans1D3" presStyleIdx="7" presStyleCnt="22"/>
+    <dgm:pt modelId="{57F61604-BE15-4362-B346-71D638A88099}" type="pres">
+      <dgm:prSet presAssocID="{206FA317-2A95-4AFD-B801-ED2E3F52304B}" presName="rootConnector" presStyleLbl="node3" presStyleIdx="6" presStyleCnt="22"/>
       <dgm:spPr/>
       <dgm:t>
         <a:bodyPr/>
@@ -4034,24 +4022,16 @@
         </a:p>
       </dgm:t>
     </dgm:pt>
-    <dgm:pt modelId="{5E4A1D37-BFD2-4AEA-A2E8-770F037C952F}" type="pres">
-      <dgm:prSet presAssocID="{04A842A6-3D2B-45FE-B6D1-65F0829EE722}" presName="hierRoot2" presStyleCnt="0">
-        <dgm:presLayoutVars>
-          <dgm:hierBranch val="init"/>
-        </dgm:presLayoutVars>
-      </dgm:prSet>
-      <dgm:spPr/>
-    </dgm:pt>
-    <dgm:pt modelId="{51BD2DFE-02EC-4DB1-A7F1-186D7E5AA6AC}" type="pres">
-      <dgm:prSet presAssocID="{04A842A6-3D2B-45FE-B6D1-65F0829EE722}" presName="rootComposite" presStyleCnt="0"/>
-      <dgm:spPr/>
-    </dgm:pt>
-    <dgm:pt modelId="{641A9226-B231-4E8E-9C55-F68651D94D4E}" type="pres">
-      <dgm:prSet presAssocID="{04A842A6-3D2B-45FE-B6D1-65F0829EE722}" presName="rootText" presStyleLbl="node3" presStyleIdx="7" presStyleCnt="22">
-        <dgm:presLayoutVars>
-          <dgm:chPref val="3"/>
-        </dgm:presLayoutVars>
-      </dgm:prSet>
+    <dgm:pt modelId="{959171F2-E871-47B5-97FB-8A6260020CC0}" type="pres">
+      <dgm:prSet presAssocID="{206FA317-2A95-4AFD-B801-ED2E3F52304B}" presName="hierChild4" presStyleCnt="0"/>
+      <dgm:spPr/>
+    </dgm:pt>
+    <dgm:pt modelId="{F80890A4-215C-4D2A-B4C8-B399A6109114}" type="pres">
+      <dgm:prSet presAssocID="{206FA317-2A95-4AFD-B801-ED2E3F52304B}" presName="hierChild5" presStyleCnt="0"/>
+      <dgm:spPr/>
+    </dgm:pt>
+    <dgm:pt modelId="{FD7D4D9F-8B82-4134-A440-E709162FB101}" type="pres">
+      <dgm:prSet presAssocID="{F6903CF6-6A4F-4541-A359-24FE5D01E33B}" presName="Name37" presStyleLbl="parChTrans1D3" presStyleIdx="7" presStyleCnt="22"/>
       <dgm:spPr/>
       <dgm:t>
         <a:bodyPr/>
@@ -4061,8 +4041,24 @@
         </a:p>
       </dgm:t>
     </dgm:pt>
-    <dgm:pt modelId="{03285AB4-389B-4A8E-A739-E4FB594C24BF}" type="pres">
-      <dgm:prSet presAssocID="{04A842A6-3D2B-45FE-B6D1-65F0829EE722}" presName="rootConnector" presStyleLbl="node3" presStyleIdx="7" presStyleCnt="22"/>
+    <dgm:pt modelId="{5E4A1D37-BFD2-4AEA-A2E8-770F037C952F}" type="pres">
+      <dgm:prSet presAssocID="{04A842A6-3D2B-45FE-B6D1-65F0829EE722}" presName="hierRoot2" presStyleCnt="0">
+        <dgm:presLayoutVars>
+          <dgm:hierBranch val="init"/>
+        </dgm:presLayoutVars>
+      </dgm:prSet>
+      <dgm:spPr/>
+    </dgm:pt>
+    <dgm:pt modelId="{51BD2DFE-02EC-4DB1-A7F1-186D7E5AA6AC}" type="pres">
+      <dgm:prSet presAssocID="{04A842A6-3D2B-45FE-B6D1-65F0829EE722}" presName="rootComposite" presStyleCnt="0"/>
+      <dgm:spPr/>
+    </dgm:pt>
+    <dgm:pt modelId="{641A9226-B231-4E8E-9C55-F68651D94D4E}" type="pres">
+      <dgm:prSet presAssocID="{04A842A6-3D2B-45FE-B6D1-65F0829EE722}" presName="rootText" presStyleLbl="node3" presStyleIdx="7" presStyleCnt="22">
+        <dgm:presLayoutVars>
+          <dgm:chPref val="3"/>
+        </dgm:presLayoutVars>
+      </dgm:prSet>
       <dgm:spPr/>
       <dgm:t>
         <a:bodyPr/>
@@ -4072,16 +4068,8 @@
         </a:p>
       </dgm:t>
     </dgm:pt>
-    <dgm:pt modelId="{E334A79F-86F5-4B5C-B6C7-03E88BFA55C9}" type="pres">
-      <dgm:prSet presAssocID="{04A842A6-3D2B-45FE-B6D1-65F0829EE722}" presName="hierChild4" presStyleCnt="0"/>
-      <dgm:spPr/>
-    </dgm:pt>
-    <dgm:pt modelId="{085F2607-B90B-46C0-86AE-FC22EF661656}" type="pres">
-      <dgm:prSet presAssocID="{04A842A6-3D2B-45FE-B6D1-65F0829EE722}" presName="hierChild5" presStyleCnt="0"/>
-      <dgm:spPr/>
-    </dgm:pt>
-    <dgm:pt modelId="{539C9AB9-A71B-47D2-BAFA-A26EF16D35E9}" type="pres">
-      <dgm:prSet presAssocID="{9511AE43-BA7F-49B2-BA3B-266CB9B06C28}" presName="Name37" presStyleLbl="parChTrans1D3" presStyleIdx="8" presStyleCnt="22"/>
+    <dgm:pt modelId="{03285AB4-389B-4A8E-A739-E4FB594C24BF}" type="pres">
+      <dgm:prSet presAssocID="{04A842A6-3D2B-45FE-B6D1-65F0829EE722}" presName="rootConnector" presStyleLbl="node3" presStyleIdx="7" presStyleCnt="22"/>
       <dgm:spPr/>
       <dgm:t>
         <a:bodyPr/>
@@ -4091,24 +4079,16 @@
         </a:p>
       </dgm:t>
     </dgm:pt>
-    <dgm:pt modelId="{00A21371-1360-4E0E-A0CF-64B2CA81844B}" type="pres">
-      <dgm:prSet presAssocID="{49114A9B-D2E0-4713-9DBF-1B7318FD9E27}" presName="hierRoot2" presStyleCnt="0">
-        <dgm:presLayoutVars>
-          <dgm:hierBranch val="init"/>
-        </dgm:presLayoutVars>
-      </dgm:prSet>
-      <dgm:spPr/>
-    </dgm:pt>
-    <dgm:pt modelId="{5D620067-97CA-4684-AA9A-ED49BECC6B50}" type="pres">
-      <dgm:prSet presAssocID="{49114A9B-D2E0-4713-9DBF-1B7318FD9E27}" presName="rootComposite" presStyleCnt="0"/>
-      <dgm:spPr/>
-    </dgm:pt>
-    <dgm:pt modelId="{E3166F7C-DF17-441D-9FD5-AE90B21D5054}" type="pres">
-      <dgm:prSet presAssocID="{49114A9B-D2E0-4713-9DBF-1B7318FD9E27}" presName="rootText" presStyleLbl="node3" presStyleIdx="8" presStyleCnt="22">
-        <dgm:presLayoutVars>
-          <dgm:chPref val="3"/>
-        </dgm:presLayoutVars>
-      </dgm:prSet>
+    <dgm:pt modelId="{E334A79F-86F5-4B5C-B6C7-03E88BFA55C9}" type="pres">
+      <dgm:prSet presAssocID="{04A842A6-3D2B-45FE-B6D1-65F0829EE722}" presName="hierChild4" presStyleCnt="0"/>
+      <dgm:spPr/>
+    </dgm:pt>
+    <dgm:pt modelId="{085F2607-B90B-46C0-86AE-FC22EF661656}" type="pres">
+      <dgm:prSet presAssocID="{04A842A6-3D2B-45FE-B6D1-65F0829EE722}" presName="hierChild5" presStyleCnt="0"/>
+      <dgm:spPr/>
+    </dgm:pt>
+    <dgm:pt modelId="{539C9AB9-A71B-47D2-BAFA-A26EF16D35E9}" type="pres">
+      <dgm:prSet presAssocID="{9511AE43-BA7F-49B2-BA3B-266CB9B06C28}" presName="Name37" presStyleLbl="parChTrans1D3" presStyleIdx="8" presStyleCnt="22"/>
       <dgm:spPr/>
       <dgm:t>
         <a:bodyPr/>
@@ -4118,8 +4098,24 @@
         </a:p>
       </dgm:t>
     </dgm:pt>
-    <dgm:pt modelId="{D5BAEF3F-BD35-4D7E-A4FF-F30965920AFA}" type="pres">
-      <dgm:prSet presAssocID="{49114A9B-D2E0-4713-9DBF-1B7318FD9E27}" presName="rootConnector" presStyleLbl="node3" presStyleIdx="8" presStyleCnt="22"/>
+    <dgm:pt modelId="{00A21371-1360-4E0E-A0CF-64B2CA81844B}" type="pres">
+      <dgm:prSet presAssocID="{49114A9B-D2E0-4713-9DBF-1B7318FD9E27}" presName="hierRoot2" presStyleCnt="0">
+        <dgm:presLayoutVars>
+          <dgm:hierBranch val="init"/>
+        </dgm:presLayoutVars>
+      </dgm:prSet>
+      <dgm:spPr/>
+    </dgm:pt>
+    <dgm:pt modelId="{5D620067-97CA-4684-AA9A-ED49BECC6B50}" type="pres">
+      <dgm:prSet presAssocID="{49114A9B-D2E0-4713-9DBF-1B7318FD9E27}" presName="rootComposite" presStyleCnt="0"/>
+      <dgm:spPr/>
+    </dgm:pt>
+    <dgm:pt modelId="{E3166F7C-DF17-441D-9FD5-AE90B21D5054}" type="pres">
+      <dgm:prSet presAssocID="{49114A9B-D2E0-4713-9DBF-1B7318FD9E27}" presName="rootText" presStyleLbl="node3" presStyleIdx="8" presStyleCnt="22">
+        <dgm:presLayoutVars>
+          <dgm:chPref val="3"/>
+        </dgm:presLayoutVars>
+      </dgm:prSet>
       <dgm:spPr/>
       <dgm:t>
         <a:bodyPr/>
@@ -4129,16 +4125,8 @@
         </a:p>
       </dgm:t>
     </dgm:pt>
-    <dgm:pt modelId="{954DE4C5-A326-4E49-BC70-C56A49102543}" type="pres">
-      <dgm:prSet presAssocID="{49114A9B-D2E0-4713-9DBF-1B7318FD9E27}" presName="hierChild4" presStyleCnt="0"/>
-      <dgm:spPr/>
-    </dgm:pt>
-    <dgm:pt modelId="{93110726-E6BB-43BB-89D2-78B96232F10A}" type="pres">
-      <dgm:prSet presAssocID="{49114A9B-D2E0-4713-9DBF-1B7318FD9E27}" presName="hierChild5" presStyleCnt="0"/>
-      <dgm:spPr/>
-    </dgm:pt>
-    <dgm:pt modelId="{41D8D129-29D8-4385-B786-894926FEDC42}" type="pres">
-      <dgm:prSet presAssocID="{F3C2A341-069D-4991-8990-61DFFDB62E32}" presName="Name37" presStyleLbl="parChTrans1D3" presStyleIdx="9" presStyleCnt="22"/>
+    <dgm:pt modelId="{D5BAEF3F-BD35-4D7E-A4FF-F30965920AFA}" type="pres">
+      <dgm:prSet presAssocID="{49114A9B-D2E0-4713-9DBF-1B7318FD9E27}" presName="rootConnector" presStyleLbl="node3" presStyleIdx="8" presStyleCnt="22"/>
       <dgm:spPr/>
       <dgm:t>
         <a:bodyPr/>
@@ -4148,24 +4136,16 @@
         </a:p>
       </dgm:t>
     </dgm:pt>
-    <dgm:pt modelId="{56B75CC1-3BE4-4933-86A4-AD5BDB483D09}" type="pres">
-      <dgm:prSet presAssocID="{6D36762B-FB57-4DEA-90CD-3F097F4D25CC}" presName="hierRoot2" presStyleCnt="0">
-        <dgm:presLayoutVars>
-          <dgm:hierBranch val="init"/>
-        </dgm:presLayoutVars>
-      </dgm:prSet>
-      <dgm:spPr/>
-    </dgm:pt>
-    <dgm:pt modelId="{989F04EF-9BC1-4B78-83E1-155E82FA04DB}" type="pres">
-      <dgm:prSet presAssocID="{6D36762B-FB57-4DEA-90CD-3F097F4D25CC}" presName="rootComposite" presStyleCnt="0"/>
-      <dgm:spPr/>
-    </dgm:pt>
-    <dgm:pt modelId="{92C0FB43-53F4-4321-BEF9-66199300F0E8}" type="pres">
-      <dgm:prSet presAssocID="{6D36762B-FB57-4DEA-90CD-3F097F4D25CC}" presName="rootText" presStyleLbl="node3" presStyleIdx="9" presStyleCnt="22">
-        <dgm:presLayoutVars>
-          <dgm:chPref val="3"/>
-        </dgm:presLayoutVars>
-      </dgm:prSet>
+    <dgm:pt modelId="{954DE4C5-A326-4E49-BC70-C56A49102543}" type="pres">
+      <dgm:prSet presAssocID="{49114A9B-D2E0-4713-9DBF-1B7318FD9E27}" presName="hierChild4" presStyleCnt="0"/>
+      <dgm:spPr/>
+    </dgm:pt>
+    <dgm:pt modelId="{93110726-E6BB-43BB-89D2-78B96232F10A}" type="pres">
+      <dgm:prSet presAssocID="{49114A9B-D2E0-4713-9DBF-1B7318FD9E27}" presName="hierChild5" presStyleCnt="0"/>
+      <dgm:spPr/>
+    </dgm:pt>
+    <dgm:pt modelId="{41D8D129-29D8-4385-B786-894926FEDC42}" type="pres">
+      <dgm:prSet presAssocID="{F3C2A341-069D-4991-8990-61DFFDB62E32}" presName="Name37" presStyleLbl="parChTrans1D3" presStyleIdx="9" presStyleCnt="22"/>
       <dgm:spPr/>
       <dgm:t>
         <a:bodyPr/>
@@ -4175,8 +4155,24 @@
         </a:p>
       </dgm:t>
     </dgm:pt>
-    <dgm:pt modelId="{D9ED388C-CEBD-4853-9A3E-C27037FF2C56}" type="pres">
-      <dgm:prSet presAssocID="{6D36762B-FB57-4DEA-90CD-3F097F4D25CC}" presName="rootConnector" presStyleLbl="node3" presStyleIdx="9" presStyleCnt="22"/>
+    <dgm:pt modelId="{56B75CC1-3BE4-4933-86A4-AD5BDB483D09}" type="pres">
+      <dgm:prSet presAssocID="{6D36762B-FB57-4DEA-90CD-3F097F4D25CC}" presName="hierRoot2" presStyleCnt="0">
+        <dgm:presLayoutVars>
+          <dgm:hierBranch val="init"/>
+        </dgm:presLayoutVars>
+      </dgm:prSet>
+      <dgm:spPr/>
+    </dgm:pt>
+    <dgm:pt modelId="{989F04EF-9BC1-4B78-83E1-155E82FA04DB}" type="pres">
+      <dgm:prSet presAssocID="{6D36762B-FB57-4DEA-90CD-3F097F4D25CC}" presName="rootComposite" presStyleCnt="0"/>
+      <dgm:spPr/>
+    </dgm:pt>
+    <dgm:pt modelId="{92C0FB43-53F4-4321-BEF9-66199300F0E8}" type="pres">
+      <dgm:prSet presAssocID="{6D36762B-FB57-4DEA-90CD-3F097F4D25CC}" presName="rootText" presStyleLbl="node3" presStyleIdx="9" presStyleCnt="22">
+        <dgm:presLayoutVars>
+          <dgm:chPref val="3"/>
+        </dgm:presLayoutVars>
+      </dgm:prSet>
       <dgm:spPr/>
       <dgm:t>
         <a:bodyPr/>
@@ -4186,16 +4182,8 @@
         </a:p>
       </dgm:t>
     </dgm:pt>
-    <dgm:pt modelId="{2101D05F-39FA-4E10-8C5C-A05734941020}" type="pres">
-      <dgm:prSet presAssocID="{6D36762B-FB57-4DEA-90CD-3F097F4D25CC}" presName="hierChild4" presStyleCnt="0"/>
-      <dgm:spPr/>
-    </dgm:pt>
-    <dgm:pt modelId="{659C28F5-4CB8-4027-B9BA-615248508F5C}" type="pres">
-      <dgm:prSet presAssocID="{6D36762B-FB57-4DEA-90CD-3F097F4D25CC}" presName="hierChild5" presStyleCnt="0"/>
-      <dgm:spPr/>
-    </dgm:pt>
-    <dgm:pt modelId="{5C2972FE-C97E-42B6-9A79-1CF8DC5B6AE4}" type="pres">
-      <dgm:prSet presAssocID="{FD513F68-9504-4F45-8DCD-794B58A4EE29}" presName="Name37" presStyleLbl="parChTrans1D3" presStyleIdx="10" presStyleCnt="22"/>
+    <dgm:pt modelId="{D9ED388C-CEBD-4853-9A3E-C27037FF2C56}" type="pres">
+      <dgm:prSet presAssocID="{6D36762B-FB57-4DEA-90CD-3F097F4D25CC}" presName="rootConnector" presStyleLbl="node3" presStyleIdx="9" presStyleCnt="22"/>
       <dgm:spPr/>
       <dgm:t>
         <a:bodyPr/>
@@ -4205,24 +4193,16 @@
         </a:p>
       </dgm:t>
     </dgm:pt>
-    <dgm:pt modelId="{029DB9A8-AFD4-472F-9968-B633CD346629}" type="pres">
-      <dgm:prSet presAssocID="{EB3B4FD7-4B93-4B6A-85DA-411D4E46D809}" presName="hierRoot2" presStyleCnt="0">
-        <dgm:presLayoutVars>
-          <dgm:hierBranch val="init"/>
-        </dgm:presLayoutVars>
-      </dgm:prSet>
-      <dgm:spPr/>
-    </dgm:pt>
-    <dgm:pt modelId="{BDBCFFDF-4FA0-4430-A44A-82B37C77E4AF}" type="pres">
-      <dgm:prSet presAssocID="{EB3B4FD7-4B93-4B6A-85DA-411D4E46D809}" presName="rootComposite" presStyleCnt="0"/>
-      <dgm:spPr/>
-    </dgm:pt>
-    <dgm:pt modelId="{BF212140-F00B-41BB-95FA-AB60DEA3AD26}" type="pres">
-      <dgm:prSet presAssocID="{EB3B4FD7-4B93-4B6A-85DA-411D4E46D809}" presName="rootText" presStyleLbl="node3" presStyleIdx="10" presStyleCnt="22">
-        <dgm:presLayoutVars>
-          <dgm:chPref val="3"/>
-        </dgm:presLayoutVars>
-      </dgm:prSet>
+    <dgm:pt modelId="{2101D05F-39FA-4E10-8C5C-A05734941020}" type="pres">
+      <dgm:prSet presAssocID="{6D36762B-FB57-4DEA-90CD-3F097F4D25CC}" presName="hierChild4" presStyleCnt="0"/>
+      <dgm:spPr/>
+    </dgm:pt>
+    <dgm:pt modelId="{659C28F5-4CB8-4027-B9BA-615248508F5C}" type="pres">
+      <dgm:prSet presAssocID="{6D36762B-FB57-4DEA-90CD-3F097F4D25CC}" presName="hierChild5" presStyleCnt="0"/>
+      <dgm:spPr/>
+    </dgm:pt>
+    <dgm:pt modelId="{5C2972FE-C97E-42B6-9A79-1CF8DC5B6AE4}" type="pres">
+      <dgm:prSet presAssocID="{FD513F68-9504-4F45-8DCD-794B58A4EE29}" presName="Name37" presStyleLbl="parChTrans1D3" presStyleIdx="10" presStyleCnt="22"/>
       <dgm:spPr/>
       <dgm:t>
         <a:bodyPr/>
@@ -4232,8 +4212,24 @@
         </a:p>
       </dgm:t>
     </dgm:pt>
-    <dgm:pt modelId="{586BD3CC-D024-49AE-98A9-57447680C793}" type="pres">
-      <dgm:prSet presAssocID="{EB3B4FD7-4B93-4B6A-85DA-411D4E46D809}" presName="rootConnector" presStyleLbl="node3" presStyleIdx="10" presStyleCnt="22"/>
+    <dgm:pt modelId="{029DB9A8-AFD4-472F-9968-B633CD346629}" type="pres">
+      <dgm:prSet presAssocID="{EB3B4FD7-4B93-4B6A-85DA-411D4E46D809}" presName="hierRoot2" presStyleCnt="0">
+        <dgm:presLayoutVars>
+          <dgm:hierBranch val="init"/>
+        </dgm:presLayoutVars>
+      </dgm:prSet>
+      <dgm:spPr/>
+    </dgm:pt>
+    <dgm:pt modelId="{BDBCFFDF-4FA0-4430-A44A-82B37C77E4AF}" type="pres">
+      <dgm:prSet presAssocID="{EB3B4FD7-4B93-4B6A-85DA-411D4E46D809}" presName="rootComposite" presStyleCnt="0"/>
+      <dgm:spPr/>
+    </dgm:pt>
+    <dgm:pt modelId="{BF212140-F00B-41BB-95FA-AB60DEA3AD26}" type="pres">
+      <dgm:prSet presAssocID="{EB3B4FD7-4B93-4B6A-85DA-411D4E46D809}" presName="rootText" presStyleLbl="node3" presStyleIdx="10" presStyleCnt="22">
+        <dgm:presLayoutVars>
+          <dgm:chPref val="3"/>
+        </dgm:presLayoutVars>
+      </dgm:prSet>
       <dgm:spPr/>
       <dgm:t>
         <a:bodyPr/>
@@ -4243,20 +4239,8 @@
         </a:p>
       </dgm:t>
     </dgm:pt>
-    <dgm:pt modelId="{6D4B136B-BD17-4ED1-B616-FBD7159E18F9}" type="pres">
-      <dgm:prSet presAssocID="{EB3B4FD7-4B93-4B6A-85DA-411D4E46D809}" presName="hierChild4" presStyleCnt="0"/>
-      <dgm:spPr/>
-    </dgm:pt>
-    <dgm:pt modelId="{B1ECB62F-82BA-4FB2-A8C8-FC69141DD972}" type="pres">
-      <dgm:prSet presAssocID="{EB3B4FD7-4B93-4B6A-85DA-411D4E46D809}" presName="hierChild5" presStyleCnt="0"/>
-      <dgm:spPr/>
-    </dgm:pt>
-    <dgm:pt modelId="{05C65E83-A4AE-4230-99CF-08B8C80E012D}" type="pres">
-      <dgm:prSet presAssocID="{B5CEA2D4-A899-4C2C-BA30-79C7F0302244}" presName="hierChild5" presStyleCnt="0"/>
-      <dgm:spPr/>
-    </dgm:pt>
-    <dgm:pt modelId="{C33C7A6C-C6C4-41AC-8DE1-8DDEFEB60920}" type="pres">
-      <dgm:prSet presAssocID="{FC3BE7C2-CAF1-4079-9560-5489769EFC27}" presName="Name37" presStyleLbl="parChTrans1D2" presStyleIdx="3" presStyleCnt="11"/>
+    <dgm:pt modelId="{586BD3CC-D024-49AE-98A9-57447680C793}" type="pres">
+      <dgm:prSet presAssocID="{EB3B4FD7-4B93-4B6A-85DA-411D4E46D809}" presName="rootConnector" presStyleLbl="node3" presStyleIdx="10" presStyleCnt="22"/>
       <dgm:spPr/>
       <dgm:t>
         <a:bodyPr/>
@@ -4266,24 +4250,20 @@
         </a:p>
       </dgm:t>
     </dgm:pt>
-    <dgm:pt modelId="{5D513A80-7CAD-4D4B-B0AB-4A43A3DAE6F5}" type="pres">
-      <dgm:prSet presAssocID="{3045B1B2-DC0A-4607-ACC9-6EA0209878F6}" presName="hierRoot2" presStyleCnt="0">
-        <dgm:presLayoutVars>
-          <dgm:hierBranch val="init"/>
-        </dgm:presLayoutVars>
-      </dgm:prSet>
-      <dgm:spPr/>
-    </dgm:pt>
-    <dgm:pt modelId="{0CB56511-5D56-4220-AAA8-E6B351624CD4}" type="pres">
-      <dgm:prSet presAssocID="{3045B1B2-DC0A-4607-ACC9-6EA0209878F6}" presName="rootComposite" presStyleCnt="0"/>
-      <dgm:spPr/>
-    </dgm:pt>
-    <dgm:pt modelId="{A3596C5C-D5BF-4D1F-99EE-77880EC19FC8}" type="pres">
-      <dgm:prSet presAssocID="{3045B1B2-DC0A-4607-ACC9-6EA0209878F6}" presName="rootText" presStyleLbl="node2" presStyleIdx="3" presStyleCnt="9">
-        <dgm:presLayoutVars>
-          <dgm:chPref val="3"/>
-        </dgm:presLayoutVars>
-      </dgm:prSet>
+    <dgm:pt modelId="{6D4B136B-BD17-4ED1-B616-FBD7159E18F9}" type="pres">
+      <dgm:prSet presAssocID="{EB3B4FD7-4B93-4B6A-85DA-411D4E46D809}" presName="hierChild4" presStyleCnt="0"/>
+      <dgm:spPr/>
+    </dgm:pt>
+    <dgm:pt modelId="{B1ECB62F-82BA-4FB2-A8C8-FC69141DD972}" type="pres">
+      <dgm:prSet presAssocID="{EB3B4FD7-4B93-4B6A-85DA-411D4E46D809}" presName="hierChild5" presStyleCnt="0"/>
+      <dgm:spPr/>
+    </dgm:pt>
+    <dgm:pt modelId="{05C65E83-A4AE-4230-99CF-08B8C80E012D}" type="pres">
+      <dgm:prSet presAssocID="{B5CEA2D4-A899-4C2C-BA30-79C7F0302244}" presName="hierChild5" presStyleCnt="0"/>
+      <dgm:spPr/>
+    </dgm:pt>
+    <dgm:pt modelId="{C33C7A6C-C6C4-41AC-8DE1-8DDEFEB60920}" type="pres">
+      <dgm:prSet presAssocID="{FC3BE7C2-CAF1-4079-9560-5489769EFC27}" presName="Name37" presStyleLbl="parChTrans1D2" presStyleIdx="3" presStyleCnt="11"/>
       <dgm:spPr/>
       <dgm:t>
         <a:bodyPr/>
@@ -4293,8 +4273,24 @@
         </a:p>
       </dgm:t>
     </dgm:pt>
-    <dgm:pt modelId="{B6A114D4-4B75-4F1E-A379-E402CD10E6C4}" type="pres">
-      <dgm:prSet presAssocID="{3045B1B2-DC0A-4607-ACC9-6EA0209878F6}" presName="rootConnector" presStyleLbl="node2" presStyleIdx="3" presStyleCnt="9"/>
+    <dgm:pt modelId="{5D513A80-7CAD-4D4B-B0AB-4A43A3DAE6F5}" type="pres">
+      <dgm:prSet presAssocID="{3045B1B2-DC0A-4607-ACC9-6EA0209878F6}" presName="hierRoot2" presStyleCnt="0">
+        <dgm:presLayoutVars>
+          <dgm:hierBranch val="init"/>
+        </dgm:presLayoutVars>
+      </dgm:prSet>
+      <dgm:spPr/>
+    </dgm:pt>
+    <dgm:pt modelId="{0CB56511-5D56-4220-AAA8-E6B351624CD4}" type="pres">
+      <dgm:prSet presAssocID="{3045B1B2-DC0A-4607-ACC9-6EA0209878F6}" presName="rootComposite" presStyleCnt="0"/>
+      <dgm:spPr/>
+    </dgm:pt>
+    <dgm:pt modelId="{A3596C5C-D5BF-4D1F-99EE-77880EC19FC8}" type="pres">
+      <dgm:prSet presAssocID="{3045B1B2-DC0A-4607-ACC9-6EA0209878F6}" presName="rootText" presStyleLbl="node2" presStyleIdx="3" presStyleCnt="9">
+        <dgm:presLayoutVars>
+          <dgm:chPref val="3"/>
+        </dgm:presLayoutVars>
+      </dgm:prSet>
       <dgm:spPr/>
       <dgm:t>
         <a:bodyPr/>
@@ -4304,12 +4300,8 @@
         </a:p>
       </dgm:t>
     </dgm:pt>
-    <dgm:pt modelId="{B553E628-A975-4BD3-A2F3-84861B4D6D9E}" type="pres">
-      <dgm:prSet presAssocID="{3045B1B2-DC0A-4607-ACC9-6EA0209878F6}" presName="hierChild4" presStyleCnt="0"/>
-      <dgm:spPr/>
-    </dgm:pt>
-    <dgm:pt modelId="{E9FA3E35-E17C-402A-9F06-8A140AF13D6A}" type="pres">
-      <dgm:prSet presAssocID="{AA3915FE-4491-42CC-A1AF-70CBC148FF59}" presName="Name37" presStyleLbl="parChTrans1D3" presStyleIdx="11" presStyleCnt="22"/>
+    <dgm:pt modelId="{B6A114D4-4B75-4F1E-A379-E402CD10E6C4}" type="pres">
+      <dgm:prSet presAssocID="{3045B1B2-DC0A-4607-ACC9-6EA0209878F6}" presName="rootConnector" presStyleLbl="node2" presStyleIdx="3" presStyleCnt="9"/>
       <dgm:spPr/>
       <dgm:t>
         <a:bodyPr/>
@@ -4319,24 +4311,12 @@
         </a:p>
       </dgm:t>
     </dgm:pt>
-    <dgm:pt modelId="{BBB7AA51-10E3-42EA-8B26-E059F852E331}" type="pres">
-      <dgm:prSet presAssocID="{5C8EBEB2-45CA-4875-B2C1-3A80FFD2AC67}" presName="hierRoot2" presStyleCnt="0">
-        <dgm:presLayoutVars>
-          <dgm:hierBranch val="init"/>
-        </dgm:presLayoutVars>
-      </dgm:prSet>
-      <dgm:spPr/>
-    </dgm:pt>
-    <dgm:pt modelId="{7873E1F9-1199-4CEE-8D9D-22DD60D218C3}" type="pres">
-      <dgm:prSet presAssocID="{5C8EBEB2-45CA-4875-B2C1-3A80FFD2AC67}" presName="rootComposite" presStyleCnt="0"/>
-      <dgm:spPr/>
-    </dgm:pt>
-    <dgm:pt modelId="{37209606-A253-48BC-A588-886B49BABBD1}" type="pres">
-      <dgm:prSet presAssocID="{5C8EBEB2-45CA-4875-B2C1-3A80FFD2AC67}" presName="rootText" presStyleLbl="node3" presStyleIdx="11" presStyleCnt="22">
-        <dgm:presLayoutVars>
-          <dgm:chPref val="3"/>
-        </dgm:presLayoutVars>
-      </dgm:prSet>
+    <dgm:pt modelId="{B553E628-A975-4BD3-A2F3-84861B4D6D9E}" type="pres">
+      <dgm:prSet presAssocID="{3045B1B2-DC0A-4607-ACC9-6EA0209878F6}" presName="hierChild4" presStyleCnt="0"/>
+      <dgm:spPr/>
+    </dgm:pt>
+    <dgm:pt modelId="{E9FA3E35-E17C-402A-9F06-8A140AF13D6A}" type="pres">
+      <dgm:prSet presAssocID="{AA3915FE-4491-42CC-A1AF-70CBC148FF59}" presName="Name37" presStyleLbl="parChTrans1D3" presStyleIdx="11" presStyleCnt="22"/>
       <dgm:spPr/>
       <dgm:t>
         <a:bodyPr/>
@@ -4346,8 +4326,24 @@
         </a:p>
       </dgm:t>
     </dgm:pt>
-    <dgm:pt modelId="{08D8DD80-F8DB-42D4-8B5F-8F3E6B33839A}" type="pres">
-      <dgm:prSet presAssocID="{5C8EBEB2-45CA-4875-B2C1-3A80FFD2AC67}" presName="rootConnector" presStyleLbl="node3" presStyleIdx="11" presStyleCnt="22"/>
+    <dgm:pt modelId="{BBB7AA51-10E3-42EA-8B26-E059F852E331}" type="pres">
+      <dgm:prSet presAssocID="{5C8EBEB2-45CA-4875-B2C1-3A80FFD2AC67}" presName="hierRoot2" presStyleCnt="0">
+        <dgm:presLayoutVars>
+          <dgm:hierBranch val="init"/>
+        </dgm:presLayoutVars>
+      </dgm:prSet>
+      <dgm:spPr/>
+    </dgm:pt>
+    <dgm:pt modelId="{7873E1F9-1199-4CEE-8D9D-22DD60D218C3}" type="pres">
+      <dgm:prSet presAssocID="{5C8EBEB2-45CA-4875-B2C1-3A80FFD2AC67}" presName="rootComposite" presStyleCnt="0"/>
+      <dgm:spPr/>
+    </dgm:pt>
+    <dgm:pt modelId="{37209606-A253-48BC-A588-886B49BABBD1}" type="pres">
+      <dgm:prSet presAssocID="{5C8EBEB2-45CA-4875-B2C1-3A80FFD2AC67}" presName="rootText" presStyleLbl="node3" presStyleIdx="11" presStyleCnt="22">
+        <dgm:presLayoutVars>
+          <dgm:chPref val="3"/>
+        </dgm:presLayoutVars>
+      </dgm:prSet>
       <dgm:spPr/>
       <dgm:t>
         <a:bodyPr/>
@@ -4357,16 +4353,8 @@
         </a:p>
       </dgm:t>
     </dgm:pt>
-    <dgm:pt modelId="{5F733385-5AF5-4C90-8219-3DCF80FDD410}" type="pres">
-      <dgm:prSet presAssocID="{5C8EBEB2-45CA-4875-B2C1-3A80FFD2AC67}" presName="hierChild4" presStyleCnt="0"/>
-      <dgm:spPr/>
-    </dgm:pt>
-    <dgm:pt modelId="{7EBD43EB-B113-4E7B-B839-28889D8C15B3}" type="pres">
-      <dgm:prSet presAssocID="{5C8EBEB2-45CA-4875-B2C1-3A80FFD2AC67}" presName="hierChild5" presStyleCnt="0"/>
-      <dgm:spPr/>
-    </dgm:pt>
-    <dgm:pt modelId="{90856F93-6928-4F29-A715-1CCE16DEB8CE}" type="pres">
-      <dgm:prSet presAssocID="{7C6E53BB-7621-4B9E-B8AB-2A5789109803}" presName="Name37" presStyleLbl="parChTrans1D3" presStyleIdx="12" presStyleCnt="22"/>
+    <dgm:pt modelId="{08D8DD80-F8DB-42D4-8B5F-8F3E6B33839A}" type="pres">
+      <dgm:prSet presAssocID="{5C8EBEB2-45CA-4875-B2C1-3A80FFD2AC67}" presName="rootConnector" presStyleLbl="node3" presStyleIdx="11" presStyleCnt="22"/>
       <dgm:spPr/>
       <dgm:t>
         <a:bodyPr/>
@@ -4376,24 +4364,16 @@
         </a:p>
       </dgm:t>
     </dgm:pt>
-    <dgm:pt modelId="{6436DFFC-DB5F-43AF-944B-A8500EA79D89}" type="pres">
-      <dgm:prSet presAssocID="{0C48992A-DA9E-416D-B351-F6CF3917497B}" presName="hierRoot2" presStyleCnt="0">
-        <dgm:presLayoutVars>
-          <dgm:hierBranch val="init"/>
-        </dgm:presLayoutVars>
-      </dgm:prSet>
-      <dgm:spPr/>
-    </dgm:pt>
-    <dgm:pt modelId="{06B6B56B-26F1-4A18-ABBB-DE7D12578495}" type="pres">
-      <dgm:prSet presAssocID="{0C48992A-DA9E-416D-B351-F6CF3917497B}" presName="rootComposite" presStyleCnt="0"/>
-      <dgm:spPr/>
-    </dgm:pt>
-    <dgm:pt modelId="{ADD27B8D-46D3-4588-BB73-49AC77C35FF6}" type="pres">
-      <dgm:prSet presAssocID="{0C48992A-DA9E-416D-B351-F6CF3917497B}" presName="rootText" presStyleLbl="node3" presStyleIdx="12" presStyleCnt="22">
-        <dgm:presLayoutVars>
-          <dgm:chPref val="3"/>
-        </dgm:presLayoutVars>
-      </dgm:prSet>
+    <dgm:pt modelId="{5F733385-5AF5-4C90-8219-3DCF80FDD410}" type="pres">
+      <dgm:prSet presAssocID="{5C8EBEB2-45CA-4875-B2C1-3A80FFD2AC67}" presName="hierChild4" presStyleCnt="0"/>
+      <dgm:spPr/>
+    </dgm:pt>
+    <dgm:pt modelId="{7EBD43EB-B113-4E7B-B839-28889D8C15B3}" type="pres">
+      <dgm:prSet presAssocID="{5C8EBEB2-45CA-4875-B2C1-3A80FFD2AC67}" presName="hierChild5" presStyleCnt="0"/>
+      <dgm:spPr/>
+    </dgm:pt>
+    <dgm:pt modelId="{90856F93-6928-4F29-A715-1CCE16DEB8CE}" type="pres">
+      <dgm:prSet presAssocID="{7C6E53BB-7621-4B9E-B8AB-2A5789109803}" presName="Name37" presStyleLbl="parChTrans1D3" presStyleIdx="12" presStyleCnt="22"/>
       <dgm:spPr/>
       <dgm:t>
         <a:bodyPr/>
@@ -4403,8 +4383,24 @@
         </a:p>
       </dgm:t>
     </dgm:pt>
-    <dgm:pt modelId="{B8EF8860-201E-4A47-880F-FE1C62264548}" type="pres">
-      <dgm:prSet presAssocID="{0C48992A-DA9E-416D-B351-F6CF3917497B}" presName="rootConnector" presStyleLbl="node3" presStyleIdx="12" presStyleCnt="22"/>
+    <dgm:pt modelId="{6436DFFC-DB5F-43AF-944B-A8500EA79D89}" type="pres">
+      <dgm:prSet presAssocID="{0C48992A-DA9E-416D-B351-F6CF3917497B}" presName="hierRoot2" presStyleCnt="0">
+        <dgm:presLayoutVars>
+          <dgm:hierBranch val="init"/>
+        </dgm:presLayoutVars>
+      </dgm:prSet>
+      <dgm:spPr/>
+    </dgm:pt>
+    <dgm:pt modelId="{06B6B56B-26F1-4A18-ABBB-DE7D12578495}" type="pres">
+      <dgm:prSet presAssocID="{0C48992A-DA9E-416D-B351-F6CF3917497B}" presName="rootComposite" presStyleCnt="0"/>
+      <dgm:spPr/>
+    </dgm:pt>
+    <dgm:pt modelId="{ADD27B8D-46D3-4588-BB73-49AC77C35FF6}" type="pres">
+      <dgm:prSet presAssocID="{0C48992A-DA9E-416D-B351-F6CF3917497B}" presName="rootText" presStyleLbl="node3" presStyleIdx="12" presStyleCnt="22">
+        <dgm:presLayoutVars>
+          <dgm:chPref val="3"/>
+        </dgm:presLayoutVars>
+      </dgm:prSet>
       <dgm:spPr/>
       <dgm:t>
         <a:bodyPr/>
@@ -4414,16 +4410,8 @@
         </a:p>
       </dgm:t>
     </dgm:pt>
-    <dgm:pt modelId="{22C2C446-3698-44EA-8A84-27402E150089}" type="pres">
-      <dgm:prSet presAssocID="{0C48992A-DA9E-416D-B351-F6CF3917497B}" presName="hierChild4" presStyleCnt="0"/>
-      <dgm:spPr/>
-    </dgm:pt>
-    <dgm:pt modelId="{763C1F19-DB7D-4C8C-A033-C5C8C7FDEA4B}" type="pres">
-      <dgm:prSet presAssocID="{0C48992A-DA9E-416D-B351-F6CF3917497B}" presName="hierChild5" presStyleCnt="0"/>
-      <dgm:spPr/>
-    </dgm:pt>
-    <dgm:pt modelId="{8AAA2FD4-9B65-444C-904F-66481EA57F57}" type="pres">
-      <dgm:prSet presAssocID="{882C9CBD-8965-4D73-98D7-54F437501BE5}" presName="Name37" presStyleLbl="parChTrans1D3" presStyleIdx="13" presStyleCnt="22"/>
+    <dgm:pt modelId="{B8EF8860-201E-4A47-880F-FE1C62264548}" type="pres">
+      <dgm:prSet presAssocID="{0C48992A-DA9E-416D-B351-F6CF3917497B}" presName="rootConnector" presStyleLbl="node3" presStyleIdx="12" presStyleCnt="22"/>
       <dgm:spPr/>
       <dgm:t>
         <a:bodyPr/>
@@ -4433,24 +4421,16 @@
         </a:p>
       </dgm:t>
     </dgm:pt>
-    <dgm:pt modelId="{7C1FDA1D-55AA-4551-BB92-896CFDA521A9}" type="pres">
-      <dgm:prSet presAssocID="{3F86936B-1FD6-48A0-A250-2B1EB4CB5592}" presName="hierRoot2" presStyleCnt="0">
-        <dgm:presLayoutVars>
-          <dgm:hierBranch val="init"/>
-        </dgm:presLayoutVars>
-      </dgm:prSet>
-      <dgm:spPr/>
-    </dgm:pt>
-    <dgm:pt modelId="{D47FDC61-E5F3-412C-A22E-40F8898C43E2}" type="pres">
-      <dgm:prSet presAssocID="{3F86936B-1FD6-48A0-A250-2B1EB4CB5592}" presName="rootComposite" presStyleCnt="0"/>
-      <dgm:spPr/>
-    </dgm:pt>
-    <dgm:pt modelId="{95757365-1776-4A05-B177-ECC651A46341}" type="pres">
-      <dgm:prSet presAssocID="{3F86936B-1FD6-48A0-A250-2B1EB4CB5592}" presName="rootText" presStyleLbl="node3" presStyleIdx="13" presStyleCnt="22">
-        <dgm:presLayoutVars>
-          <dgm:chPref val="3"/>
-        </dgm:presLayoutVars>
-      </dgm:prSet>
+    <dgm:pt modelId="{22C2C446-3698-44EA-8A84-27402E150089}" type="pres">
+      <dgm:prSet presAssocID="{0C48992A-DA9E-416D-B351-F6CF3917497B}" presName="hierChild4" presStyleCnt="0"/>
+      <dgm:spPr/>
+    </dgm:pt>
+    <dgm:pt modelId="{763C1F19-DB7D-4C8C-A033-C5C8C7FDEA4B}" type="pres">
+      <dgm:prSet presAssocID="{0C48992A-DA9E-416D-B351-F6CF3917497B}" presName="hierChild5" presStyleCnt="0"/>
+      <dgm:spPr/>
+    </dgm:pt>
+    <dgm:pt modelId="{8AAA2FD4-9B65-444C-904F-66481EA57F57}" type="pres">
+      <dgm:prSet presAssocID="{882C9CBD-8965-4D73-98D7-54F437501BE5}" presName="Name37" presStyleLbl="parChTrans1D3" presStyleIdx="13" presStyleCnt="22"/>
       <dgm:spPr/>
       <dgm:t>
         <a:bodyPr/>
@@ -4460,8 +4440,24 @@
         </a:p>
       </dgm:t>
     </dgm:pt>
-    <dgm:pt modelId="{E522034E-B4F4-45A6-9472-9FE4651F335F}" type="pres">
-      <dgm:prSet presAssocID="{3F86936B-1FD6-48A0-A250-2B1EB4CB5592}" presName="rootConnector" presStyleLbl="node3" presStyleIdx="13" presStyleCnt="22"/>
+    <dgm:pt modelId="{7C1FDA1D-55AA-4551-BB92-896CFDA521A9}" type="pres">
+      <dgm:prSet presAssocID="{3F86936B-1FD6-48A0-A250-2B1EB4CB5592}" presName="hierRoot2" presStyleCnt="0">
+        <dgm:presLayoutVars>
+          <dgm:hierBranch val="init"/>
+        </dgm:presLayoutVars>
+      </dgm:prSet>
+      <dgm:spPr/>
+    </dgm:pt>
+    <dgm:pt modelId="{D47FDC61-E5F3-412C-A22E-40F8898C43E2}" type="pres">
+      <dgm:prSet presAssocID="{3F86936B-1FD6-48A0-A250-2B1EB4CB5592}" presName="rootComposite" presStyleCnt="0"/>
+      <dgm:spPr/>
+    </dgm:pt>
+    <dgm:pt modelId="{95757365-1776-4A05-B177-ECC651A46341}" type="pres">
+      <dgm:prSet presAssocID="{3F86936B-1FD6-48A0-A250-2B1EB4CB5592}" presName="rootText" presStyleLbl="node3" presStyleIdx="13" presStyleCnt="22">
+        <dgm:presLayoutVars>
+          <dgm:chPref val="3"/>
+        </dgm:presLayoutVars>
+      </dgm:prSet>
       <dgm:spPr/>
       <dgm:t>
         <a:bodyPr/>
@@ -4471,16 +4467,8 @@
         </a:p>
       </dgm:t>
     </dgm:pt>
-    <dgm:pt modelId="{26CE5E99-6453-4849-BB74-3464E366B986}" type="pres">
-      <dgm:prSet presAssocID="{3F86936B-1FD6-48A0-A250-2B1EB4CB5592}" presName="hierChild4" presStyleCnt="0"/>
-      <dgm:spPr/>
-    </dgm:pt>
-    <dgm:pt modelId="{98613811-8BDB-4F41-8C07-CEF0BB115AFC}" type="pres">
-      <dgm:prSet presAssocID="{3F86936B-1FD6-48A0-A250-2B1EB4CB5592}" presName="hierChild5" presStyleCnt="0"/>
-      <dgm:spPr/>
-    </dgm:pt>
-    <dgm:pt modelId="{4E5E3395-7D78-4F0F-8BA4-0CA66D4382A3}" type="pres">
-      <dgm:prSet presAssocID="{13F23037-5BD1-4678-8671-2EBB7A37F8AB}" presName="Name37" presStyleLbl="parChTrans1D3" presStyleIdx="14" presStyleCnt="22"/>
+    <dgm:pt modelId="{E522034E-B4F4-45A6-9472-9FE4651F335F}" type="pres">
+      <dgm:prSet presAssocID="{3F86936B-1FD6-48A0-A250-2B1EB4CB5592}" presName="rootConnector" presStyleLbl="node3" presStyleIdx="13" presStyleCnt="22"/>
       <dgm:spPr/>
       <dgm:t>
         <a:bodyPr/>
@@ -4490,24 +4478,16 @@
         </a:p>
       </dgm:t>
     </dgm:pt>
-    <dgm:pt modelId="{1F784A67-4A0D-4B84-8052-896486C4E215}" type="pres">
-      <dgm:prSet presAssocID="{3741E197-C607-4BAC-A29B-066FB2751C91}" presName="hierRoot2" presStyleCnt="0">
-        <dgm:presLayoutVars>
-          <dgm:hierBranch val="init"/>
-        </dgm:presLayoutVars>
-      </dgm:prSet>
-      <dgm:spPr/>
-    </dgm:pt>
-    <dgm:pt modelId="{A0DEF0D8-3C17-4B5F-94A6-FBD4EF2F5216}" type="pres">
-      <dgm:prSet presAssocID="{3741E197-C607-4BAC-A29B-066FB2751C91}" presName="rootComposite" presStyleCnt="0"/>
-      <dgm:spPr/>
-    </dgm:pt>
-    <dgm:pt modelId="{4304F539-04CE-41DE-AB0A-040F37901232}" type="pres">
-      <dgm:prSet presAssocID="{3741E197-C607-4BAC-A29B-066FB2751C91}" presName="rootText" presStyleLbl="node3" presStyleIdx="14" presStyleCnt="22">
-        <dgm:presLayoutVars>
-          <dgm:chPref val="3"/>
-        </dgm:presLayoutVars>
-      </dgm:prSet>
+    <dgm:pt modelId="{26CE5E99-6453-4849-BB74-3464E366B986}" type="pres">
+      <dgm:prSet presAssocID="{3F86936B-1FD6-48A0-A250-2B1EB4CB5592}" presName="hierChild4" presStyleCnt="0"/>
+      <dgm:spPr/>
+    </dgm:pt>
+    <dgm:pt modelId="{98613811-8BDB-4F41-8C07-CEF0BB115AFC}" type="pres">
+      <dgm:prSet presAssocID="{3F86936B-1FD6-48A0-A250-2B1EB4CB5592}" presName="hierChild5" presStyleCnt="0"/>
+      <dgm:spPr/>
+    </dgm:pt>
+    <dgm:pt modelId="{4E5E3395-7D78-4F0F-8BA4-0CA66D4382A3}" type="pres">
+      <dgm:prSet presAssocID="{13F23037-5BD1-4678-8671-2EBB7A37F8AB}" presName="Name37" presStyleLbl="parChTrans1D3" presStyleIdx="14" presStyleCnt="22"/>
       <dgm:spPr/>
       <dgm:t>
         <a:bodyPr/>
@@ -4517,8 +4497,24 @@
         </a:p>
       </dgm:t>
     </dgm:pt>
-    <dgm:pt modelId="{C0E743B2-38B4-4FFD-8B35-ADA7FA1431B1}" type="pres">
-      <dgm:prSet presAssocID="{3741E197-C607-4BAC-A29B-066FB2751C91}" presName="rootConnector" presStyleLbl="node3" presStyleIdx="14" presStyleCnt="22"/>
+    <dgm:pt modelId="{1F784A67-4A0D-4B84-8052-896486C4E215}" type="pres">
+      <dgm:prSet presAssocID="{3741E197-C607-4BAC-A29B-066FB2751C91}" presName="hierRoot2" presStyleCnt="0">
+        <dgm:presLayoutVars>
+          <dgm:hierBranch val="init"/>
+        </dgm:presLayoutVars>
+      </dgm:prSet>
+      <dgm:spPr/>
+    </dgm:pt>
+    <dgm:pt modelId="{A0DEF0D8-3C17-4B5F-94A6-FBD4EF2F5216}" type="pres">
+      <dgm:prSet presAssocID="{3741E197-C607-4BAC-A29B-066FB2751C91}" presName="rootComposite" presStyleCnt="0"/>
+      <dgm:spPr/>
+    </dgm:pt>
+    <dgm:pt modelId="{4304F539-04CE-41DE-AB0A-040F37901232}" type="pres">
+      <dgm:prSet presAssocID="{3741E197-C607-4BAC-A29B-066FB2751C91}" presName="rootText" presStyleLbl="node3" presStyleIdx="14" presStyleCnt="22">
+        <dgm:presLayoutVars>
+          <dgm:chPref val="3"/>
+        </dgm:presLayoutVars>
+      </dgm:prSet>
       <dgm:spPr/>
       <dgm:t>
         <a:bodyPr/>
@@ -4528,16 +4524,8 @@
         </a:p>
       </dgm:t>
     </dgm:pt>
-    <dgm:pt modelId="{FC49F405-2879-4CC0-9F73-D60640EE0BBC}" type="pres">
-      <dgm:prSet presAssocID="{3741E197-C607-4BAC-A29B-066FB2751C91}" presName="hierChild4" presStyleCnt="0"/>
-      <dgm:spPr/>
-    </dgm:pt>
-    <dgm:pt modelId="{7456C37D-35F3-485A-A464-CBB0771448D8}" type="pres">
-      <dgm:prSet presAssocID="{3741E197-C607-4BAC-A29B-066FB2751C91}" presName="hierChild5" presStyleCnt="0"/>
-      <dgm:spPr/>
-    </dgm:pt>
-    <dgm:pt modelId="{0A62653C-0DF8-4EDF-A01B-23209F9F26F9}" type="pres">
-      <dgm:prSet presAssocID="{70C0C7BE-A049-472C-960B-F3918754FB25}" presName="Name37" presStyleLbl="parChTrans1D3" presStyleIdx="15" presStyleCnt="22"/>
+    <dgm:pt modelId="{C0E743B2-38B4-4FFD-8B35-ADA7FA1431B1}" type="pres">
+      <dgm:prSet presAssocID="{3741E197-C607-4BAC-A29B-066FB2751C91}" presName="rootConnector" presStyleLbl="node3" presStyleIdx="14" presStyleCnt="22"/>
       <dgm:spPr/>
       <dgm:t>
         <a:bodyPr/>
@@ -4547,24 +4535,16 @@
         </a:p>
       </dgm:t>
     </dgm:pt>
-    <dgm:pt modelId="{47C9178E-3EEA-40E0-B027-F05750A06937}" type="pres">
-      <dgm:prSet presAssocID="{1707DDAA-FF7D-469D-B0BB-E186BF94AAE6}" presName="hierRoot2" presStyleCnt="0">
-        <dgm:presLayoutVars>
-          <dgm:hierBranch val="init"/>
-        </dgm:presLayoutVars>
-      </dgm:prSet>
-      <dgm:spPr/>
-    </dgm:pt>
-    <dgm:pt modelId="{955E1EFA-A7A2-4F2B-9353-8FB58EA2090B}" type="pres">
-      <dgm:prSet presAssocID="{1707DDAA-FF7D-469D-B0BB-E186BF94AAE6}" presName="rootComposite" presStyleCnt="0"/>
-      <dgm:spPr/>
-    </dgm:pt>
-    <dgm:pt modelId="{9C2D6E1B-1D6A-40AE-936F-284B7321FF42}" type="pres">
-      <dgm:prSet presAssocID="{1707DDAA-FF7D-469D-B0BB-E186BF94AAE6}" presName="rootText" presStyleLbl="node3" presStyleIdx="15" presStyleCnt="22">
-        <dgm:presLayoutVars>
-          <dgm:chPref val="3"/>
-        </dgm:presLayoutVars>
-      </dgm:prSet>
+    <dgm:pt modelId="{FC49F405-2879-4CC0-9F73-D60640EE0BBC}" type="pres">
+      <dgm:prSet presAssocID="{3741E197-C607-4BAC-A29B-066FB2751C91}" presName="hierChild4" presStyleCnt="0"/>
+      <dgm:spPr/>
+    </dgm:pt>
+    <dgm:pt modelId="{7456C37D-35F3-485A-A464-CBB0771448D8}" type="pres">
+      <dgm:prSet presAssocID="{3741E197-C607-4BAC-A29B-066FB2751C91}" presName="hierChild5" presStyleCnt="0"/>
+      <dgm:spPr/>
+    </dgm:pt>
+    <dgm:pt modelId="{0A62653C-0DF8-4EDF-A01B-23209F9F26F9}" type="pres">
+      <dgm:prSet presAssocID="{70C0C7BE-A049-472C-960B-F3918754FB25}" presName="Name37" presStyleLbl="parChTrans1D3" presStyleIdx="15" presStyleCnt="22"/>
       <dgm:spPr/>
       <dgm:t>
         <a:bodyPr/>
@@ -4574,8 +4554,24 @@
         </a:p>
       </dgm:t>
     </dgm:pt>
-    <dgm:pt modelId="{3596B5AD-F16B-4ED3-96AA-D3FE4FDF760F}" type="pres">
-      <dgm:prSet presAssocID="{1707DDAA-FF7D-469D-B0BB-E186BF94AAE6}" presName="rootConnector" presStyleLbl="node3" presStyleIdx="15" presStyleCnt="22"/>
+    <dgm:pt modelId="{47C9178E-3EEA-40E0-B027-F05750A06937}" type="pres">
+      <dgm:prSet presAssocID="{1707DDAA-FF7D-469D-B0BB-E186BF94AAE6}" presName="hierRoot2" presStyleCnt="0">
+        <dgm:presLayoutVars>
+          <dgm:hierBranch val="init"/>
+        </dgm:presLayoutVars>
+      </dgm:prSet>
+      <dgm:spPr/>
+    </dgm:pt>
+    <dgm:pt modelId="{955E1EFA-A7A2-4F2B-9353-8FB58EA2090B}" type="pres">
+      <dgm:prSet presAssocID="{1707DDAA-FF7D-469D-B0BB-E186BF94AAE6}" presName="rootComposite" presStyleCnt="0"/>
+      <dgm:spPr/>
+    </dgm:pt>
+    <dgm:pt modelId="{9C2D6E1B-1D6A-40AE-936F-284B7321FF42}" type="pres">
+      <dgm:prSet presAssocID="{1707DDAA-FF7D-469D-B0BB-E186BF94AAE6}" presName="rootText" presStyleLbl="node3" presStyleIdx="15" presStyleCnt="22">
+        <dgm:presLayoutVars>
+          <dgm:chPref val="3"/>
+        </dgm:presLayoutVars>
+      </dgm:prSet>
       <dgm:spPr/>
       <dgm:t>
         <a:bodyPr/>
@@ -4585,20 +4581,8 @@
         </a:p>
       </dgm:t>
     </dgm:pt>
-    <dgm:pt modelId="{51F537C6-91CF-4569-9353-B9FDDB8E0EFB}" type="pres">
-      <dgm:prSet presAssocID="{1707DDAA-FF7D-469D-B0BB-E186BF94AAE6}" presName="hierChild4" presStyleCnt="0"/>
-      <dgm:spPr/>
-    </dgm:pt>
-    <dgm:pt modelId="{D71F5B4E-06A2-4606-8DFE-437ACD46F4D5}" type="pres">
-      <dgm:prSet presAssocID="{1707DDAA-FF7D-469D-B0BB-E186BF94AAE6}" presName="hierChild5" presStyleCnt="0"/>
-      <dgm:spPr/>
-    </dgm:pt>
-    <dgm:pt modelId="{E1F27DF0-6AED-4E08-865B-D4D290E65E15}" type="pres">
-      <dgm:prSet presAssocID="{3045B1B2-DC0A-4607-ACC9-6EA0209878F6}" presName="hierChild5" presStyleCnt="0"/>
-      <dgm:spPr/>
-    </dgm:pt>
-    <dgm:pt modelId="{CF5D86D5-9735-45A9-A995-59A8FC794786}" type="pres">
-      <dgm:prSet presAssocID="{EE9E4C87-A11C-4304-96D9-18778AF7F28E}" presName="Name37" presStyleLbl="parChTrans1D2" presStyleIdx="4" presStyleCnt="11"/>
+    <dgm:pt modelId="{3596B5AD-F16B-4ED3-96AA-D3FE4FDF760F}" type="pres">
+      <dgm:prSet presAssocID="{1707DDAA-FF7D-469D-B0BB-E186BF94AAE6}" presName="rootConnector" presStyleLbl="node3" presStyleIdx="15" presStyleCnt="22"/>
       <dgm:spPr/>
       <dgm:t>
         <a:bodyPr/>
@@ -4608,24 +4592,20 @@
         </a:p>
       </dgm:t>
     </dgm:pt>
-    <dgm:pt modelId="{6760AF69-2E37-4E67-B093-1B4DEB39C314}" type="pres">
-      <dgm:prSet presAssocID="{AB43DBA9-F5B3-4C40-82BF-D52A96D425F7}" presName="hierRoot2" presStyleCnt="0">
-        <dgm:presLayoutVars>
-          <dgm:hierBranch val="init"/>
-        </dgm:presLayoutVars>
-      </dgm:prSet>
-      <dgm:spPr/>
-    </dgm:pt>
-    <dgm:pt modelId="{36C6077C-548D-4369-9F92-B90B51C77CCA}" type="pres">
-      <dgm:prSet presAssocID="{AB43DBA9-F5B3-4C40-82BF-D52A96D425F7}" presName="rootComposite" presStyleCnt="0"/>
-      <dgm:spPr/>
-    </dgm:pt>
-    <dgm:pt modelId="{E3E0D748-1710-4B33-AF18-2F3C83F11CF1}" type="pres">
-      <dgm:prSet presAssocID="{AB43DBA9-F5B3-4C40-82BF-D52A96D425F7}" presName="rootText" presStyleLbl="node2" presStyleIdx="4" presStyleCnt="9">
-        <dgm:presLayoutVars>
-          <dgm:chPref val="3"/>
-        </dgm:presLayoutVars>
-      </dgm:prSet>
+    <dgm:pt modelId="{51F537C6-91CF-4569-9353-B9FDDB8E0EFB}" type="pres">
+      <dgm:prSet presAssocID="{1707DDAA-FF7D-469D-B0BB-E186BF94AAE6}" presName="hierChild4" presStyleCnt="0"/>
+      <dgm:spPr/>
+    </dgm:pt>
+    <dgm:pt modelId="{D71F5B4E-06A2-4606-8DFE-437ACD46F4D5}" type="pres">
+      <dgm:prSet presAssocID="{1707DDAA-FF7D-469D-B0BB-E186BF94AAE6}" presName="hierChild5" presStyleCnt="0"/>
+      <dgm:spPr/>
+    </dgm:pt>
+    <dgm:pt modelId="{E1F27DF0-6AED-4E08-865B-D4D290E65E15}" type="pres">
+      <dgm:prSet presAssocID="{3045B1B2-DC0A-4607-ACC9-6EA0209878F6}" presName="hierChild5" presStyleCnt="0"/>
+      <dgm:spPr/>
+    </dgm:pt>
+    <dgm:pt modelId="{CF5D86D5-9735-45A9-A995-59A8FC794786}" type="pres">
+      <dgm:prSet presAssocID="{EE9E4C87-A11C-4304-96D9-18778AF7F28E}" presName="Name37" presStyleLbl="parChTrans1D2" presStyleIdx="4" presStyleCnt="11"/>
       <dgm:spPr/>
       <dgm:t>
         <a:bodyPr/>
@@ -4635,8 +4615,24 @@
         </a:p>
       </dgm:t>
     </dgm:pt>
-    <dgm:pt modelId="{139F4A1C-33B8-4B28-A053-E30D08643F71}" type="pres">
-      <dgm:prSet presAssocID="{AB43DBA9-F5B3-4C40-82BF-D52A96D425F7}" presName="rootConnector" presStyleLbl="node2" presStyleIdx="4" presStyleCnt="9"/>
+    <dgm:pt modelId="{6760AF69-2E37-4E67-B093-1B4DEB39C314}" type="pres">
+      <dgm:prSet presAssocID="{AB43DBA9-F5B3-4C40-82BF-D52A96D425F7}" presName="hierRoot2" presStyleCnt="0">
+        <dgm:presLayoutVars>
+          <dgm:hierBranch val="init"/>
+        </dgm:presLayoutVars>
+      </dgm:prSet>
+      <dgm:spPr/>
+    </dgm:pt>
+    <dgm:pt modelId="{36C6077C-548D-4369-9F92-B90B51C77CCA}" type="pres">
+      <dgm:prSet presAssocID="{AB43DBA9-F5B3-4C40-82BF-D52A96D425F7}" presName="rootComposite" presStyleCnt="0"/>
+      <dgm:spPr/>
+    </dgm:pt>
+    <dgm:pt modelId="{E3E0D748-1710-4B33-AF18-2F3C83F11CF1}" type="pres">
+      <dgm:prSet presAssocID="{AB43DBA9-F5B3-4C40-82BF-D52A96D425F7}" presName="rootText" presStyleLbl="node2" presStyleIdx="4" presStyleCnt="9">
+        <dgm:presLayoutVars>
+          <dgm:chPref val="3"/>
+        </dgm:presLayoutVars>
+      </dgm:prSet>
       <dgm:spPr/>
       <dgm:t>
         <a:bodyPr/>
@@ -4646,16 +4642,8 @@
         </a:p>
       </dgm:t>
     </dgm:pt>
-    <dgm:pt modelId="{BFD16882-ABD2-46EB-92C7-3E5042710131}" type="pres">
-      <dgm:prSet presAssocID="{AB43DBA9-F5B3-4C40-82BF-D52A96D425F7}" presName="hierChild4" presStyleCnt="0"/>
-      <dgm:spPr/>
-    </dgm:pt>
-    <dgm:pt modelId="{E43A9C99-004D-46CB-9C7D-EE12AE5840EF}" type="pres">
-      <dgm:prSet presAssocID="{AB43DBA9-F5B3-4C40-82BF-D52A96D425F7}" presName="hierChild5" presStyleCnt="0"/>
-      <dgm:spPr/>
-    </dgm:pt>
-    <dgm:pt modelId="{F262803E-CFEC-49FE-80FB-BF7DB555A7BE}" type="pres">
-      <dgm:prSet presAssocID="{CC418A99-34CE-4F58-A0D7-696AF26529A1}" presName="Name37" presStyleLbl="parChTrans1D2" presStyleIdx="5" presStyleCnt="11"/>
+    <dgm:pt modelId="{139F4A1C-33B8-4B28-A053-E30D08643F71}" type="pres">
+      <dgm:prSet presAssocID="{AB43DBA9-F5B3-4C40-82BF-D52A96D425F7}" presName="rootConnector" presStyleLbl="node2" presStyleIdx="4" presStyleCnt="9"/>
       <dgm:spPr/>
       <dgm:t>
         <a:bodyPr/>
@@ -4665,24 +4653,16 @@
         </a:p>
       </dgm:t>
     </dgm:pt>
-    <dgm:pt modelId="{3D70EED6-7D5D-49B4-893E-FE64BF46B60C}" type="pres">
-      <dgm:prSet presAssocID="{46D32E76-4D85-46E4-8C07-C66241E47DA0}" presName="hierRoot2" presStyleCnt="0">
-        <dgm:presLayoutVars>
-          <dgm:hierBranch val="init"/>
-        </dgm:presLayoutVars>
-      </dgm:prSet>
-      <dgm:spPr/>
-    </dgm:pt>
-    <dgm:pt modelId="{34C23FA7-A17E-4CA9-A1E3-DE0F7E73526A}" type="pres">
-      <dgm:prSet presAssocID="{46D32E76-4D85-46E4-8C07-C66241E47DA0}" presName="rootComposite" presStyleCnt="0"/>
-      <dgm:spPr/>
-    </dgm:pt>
-    <dgm:pt modelId="{8556C2F1-BC1A-491E-8AA3-0804AD7B92FA}" type="pres">
-      <dgm:prSet presAssocID="{46D32E76-4D85-46E4-8C07-C66241E47DA0}" presName="rootText" presStyleLbl="node2" presStyleIdx="5" presStyleCnt="9">
-        <dgm:presLayoutVars>
-          <dgm:chPref val="3"/>
-        </dgm:presLayoutVars>
-      </dgm:prSet>
+    <dgm:pt modelId="{BFD16882-ABD2-46EB-92C7-3E5042710131}" type="pres">
+      <dgm:prSet presAssocID="{AB43DBA9-F5B3-4C40-82BF-D52A96D425F7}" presName="hierChild4" presStyleCnt="0"/>
+      <dgm:spPr/>
+    </dgm:pt>
+    <dgm:pt modelId="{E43A9C99-004D-46CB-9C7D-EE12AE5840EF}" type="pres">
+      <dgm:prSet presAssocID="{AB43DBA9-F5B3-4C40-82BF-D52A96D425F7}" presName="hierChild5" presStyleCnt="0"/>
+      <dgm:spPr/>
+    </dgm:pt>
+    <dgm:pt modelId="{F262803E-CFEC-49FE-80FB-BF7DB555A7BE}" type="pres">
+      <dgm:prSet presAssocID="{CC418A99-34CE-4F58-A0D7-696AF26529A1}" presName="Name37" presStyleLbl="parChTrans1D2" presStyleIdx="5" presStyleCnt="11"/>
       <dgm:spPr/>
       <dgm:t>
         <a:bodyPr/>
@@ -4692,8 +4672,24 @@
         </a:p>
       </dgm:t>
     </dgm:pt>
-    <dgm:pt modelId="{729B68CE-79E6-4786-9304-868050C8FA07}" type="pres">
-      <dgm:prSet presAssocID="{46D32E76-4D85-46E4-8C07-C66241E47DA0}" presName="rootConnector" presStyleLbl="node2" presStyleIdx="5" presStyleCnt="9"/>
+    <dgm:pt modelId="{3D70EED6-7D5D-49B4-893E-FE64BF46B60C}" type="pres">
+      <dgm:prSet presAssocID="{46D32E76-4D85-46E4-8C07-C66241E47DA0}" presName="hierRoot2" presStyleCnt="0">
+        <dgm:presLayoutVars>
+          <dgm:hierBranch val="init"/>
+        </dgm:presLayoutVars>
+      </dgm:prSet>
+      <dgm:spPr/>
+    </dgm:pt>
+    <dgm:pt modelId="{34C23FA7-A17E-4CA9-A1E3-DE0F7E73526A}" type="pres">
+      <dgm:prSet presAssocID="{46D32E76-4D85-46E4-8C07-C66241E47DA0}" presName="rootComposite" presStyleCnt="0"/>
+      <dgm:spPr/>
+    </dgm:pt>
+    <dgm:pt modelId="{8556C2F1-BC1A-491E-8AA3-0804AD7B92FA}" type="pres">
+      <dgm:prSet presAssocID="{46D32E76-4D85-46E4-8C07-C66241E47DA0}" presName="rootText" presStyleLbl="node2" presStyleIdx="5" presStyleCnt="9">
+        <dgm:presLayoutVars>
+          <dgm:chPref val="3"/>
+        </dgm:presLayoutVars>
+      </dgm:prSet>
       <dgm:spPr/>
       <dgm:t>
         <a:bodyPr/>
@@ -4703,16 +4699,8 @@
         </a:p>
       </dgm:t>
     </dgm:pt>
-    <dgm:pt modelId="{724E45FD-B130-4F00-B7DB-559B8ED5B473}" type="pres">
-      <dgm:prSet presAssocID="{46D32E76-4D85-46E4-8C07-C66241E47DA0}" presName="hierChild4" presStyleCnt="0"/>
-      <dgm:spPr/>
-    </dgm:pt>
-    <dgm:pt modelId="{4677A347-D6F5-4809-B0EA-DC823E3C3DF5}" type="pres">
-      <dgm:prSet presAssocID="{46D32E76-4D85-46E4-8C07-C66241E47DA0}" presName="hierChild5" presStyleCnt="0"/>
-      <dgm:spPr/>
-    </dgm:pt>
-    <dgm:pt modelId="{6FFED9C4-696B-4ABA-A003-AB2F5D1066AB}" type="pres">
-      <dgm:prSet presAssocID="{115D3D74-8A9E-46A5-8E17-2DD64D5CC212}" presName="Name37" presStyleLbl="parChTrans1D2" presStyleIdx="6" presStyleCnt="11"/>
+    <dgm:pt modelId="{729B68CE-79E6-4786-9304-868050C8FA07}" type="pres">
+      <dgm:prSet presAssocID="{46D32E76-4D85-46E4-8C07-C66241E47DA0}" presName="rootConnector" presStyleLbl="node2" presStyleIdx="5" presStyleCnt="9"/>
       <dgm:spPr/>
       <dgm:t>
         <a:bodyPr/>
@@ -4722,24 +4710,16 @@
         </a:p>
       </dgm:t>
     </dgm:pt>
-    <dgm:pt modelId="{CBF63633-CEAF-4686-A5A0-A1C6068CDFCF}" type="pres">
-      <dgm:prSet presAssocID="{2FD0ACBE-A9EE-439B-BDD7-7D04768F5ECB}" presName="hierRoot2" presStyleCnt="0">
-        <dgm:presLayoutVars>
-          <dgm:hierBranch val="init"/>
-        </dgm:presLayoutVars>
-      </dgm:prSet>
-      <dgm:spPr/>
-    </dgm:pt>
-    <dgm:pt modelId="{F3AFC82C-172F-4C59-916E-C0B16269B0F5}" type="pres">
-      <dgm:prSet presAssocID="{2FD0ACBE-A9EE-439B-BDD7-7D04768F5ECB}" presName="rootComposite" presStyleCnt="0"/>
-      <dgm:spPr/>
-    </dgm:pt>
-    <dgm:pt modelId="{7BD2452F-63BA-4404-A09F-0848D6551F58}" type="pres">
-      <dgm:prSet presAssocID="{2FD0ACBE-A9EE-439B-BDD7-7D04768F5ECB}" presName="rootText" presStyleLbl="node2" presStyleIdx="6" presStyleCnt="9">
-        <dgm:presLayoutVars>
-          <dgm:chPref val="3"/>
-        </dgm:presLayoutVars>
-      </dgm:prSet>
+    <dgm:pt modelId="{724E45FD-B130-4F00-B7DB-559B8ED5B473}" type="pres">
+      <dgm:prSet presAssocID="{46D32E76-4D85-46E4-8C07-C66241E47DA0}" presName="hierChild4" presStyleCnt="0"/>
+      <dgm:spPr/>
+    </dgm:pt>
+    <dgm:pt modelId="{4677A347-D6F5-4809-B0EA-DC823E3C3DF5}" type="pres">
+      <dgm:prSet presAssocID="{46D32E76-4D85-46E4-8C07-C66241E47DA0}" presName="hierChild5" presStyleCnt="0"/>
+      <dgm:spPr/>
+    </dgm:pt>
+    <dgm:pt modelId="{6FFED9C4-696B-4ABA-A003-AB2F5D1066AB}" type="pres">
+      <dgm:prSet presAssocID="{115D3D74-8A9E-46A5-8E17-2DD64D5CC212}" presName="Name37" presStyleLbl="parChTrans1D2" presStyleIdx="6" presStyleCnt="11"/>
       <dgm:spPr/>
       <dgm:t>
         <a:bodyPr/>
@@ -4749,8 +4729,24 @@
         </a:p>
       </dgm:t>
     </dgm:pt>
-    <dgm:pt modelId="{A135AE1E-C7DE-4D38-BF64-3DB4EBB55480}" type="pres">
-      <dgm:prSet presAssocID="{2FD0ACBE-A9EE-439B-BDD7-7D04768F5ECB}" presName="rootConnector" presStyleLbl="node2" presStyleIdx="6" presStyleCnt="9"/>
+    <dgm:pt modelId="{CBF63633-CEAF-4686-A5A0-A1C6068CDFCF}" type="pres">
+      <dgm:prSet presAssocID="{2FD0ACBE-A9EE-439B-BDD7-7D04768F5ECB}" presName="hierRoot2" presStyleCnt="0">
+        <dgm:presLayoutVars>
+          <dgm:hierBranch val="init"/>
+        </dgm:presLayoutVars>
+      </dgm:prSet>
+      <dgm:spPr/>
+    </dgm:pt>
+    <dgm:pt modelId="{F3AFC82C-172F-4C59-916E-C0B16269B0F5}" type="pres">
+      <dgm:prSet presAssocID="{2FD0ACBE-A9EE-439B-BDD7-7D04768F5ECB}" presName="rootComposite" presStyleCnt="0"/>
+      <dgm:spPr/>
+    </dgm:pt>
+    <dgm:pt modelId="{7BD2452F-63BA-4404-A09F-0848D6551F58}" type="pres">
+      <dgm:prSet presAssocID="{2FD0ACBE-A9EE-439B-BDD7-7D04768F5ECB}" presName="rootText" presStyleLbl="node2" presStyleIdx="6" presStyleCnt="9">
+        <dgm:presLayoutVars>
+          <dgm:chPref val="3"/>
+        </dgm:presLayoutVars>
+      </dgm:prSet>
       <dgm:spPr/>
       <dgm:t>
         <a:bodyPr/>
@@ -4760,12 +4756,8 @@
         </a:p>
       </dgm:t>
     </dgm:pt>
-    <dgm:pt modelId="{99039FCB-C585-49F0-AE9C-1202B682CE33}" type="pres">
-      <dgm:prSet presAssocID="{2FD0ACBE-A9EE-439B-BDD7-7D04768F5ECB}" presName="hierChild4" presStyleCnt="0"/>
-      <dgm:spPr/>
-    </dgm:pt>
-    <dgm:pt modelId="{F6AF1D9D-BBE8-4B97-95BF-FA0015EF42D6}" type="pres">
-      <dgm:prSet presAssocID="{4AC75C96-6CDF-4654-8237-F7788401C076}" presName="Name37" presStyleLbl="parChTrans1D3" presStyleIdx="16" presStyleCnt="22"/>
+    <dgm:pt modelId="{A135AE1E-C7DE-4D38-BF64-3DB4EBB55480}" type="pres">
+      <dgm:prSet presAssocID="{2FD0ACBE-A9EE-439B-BDD7-7D04768F5ECB}" presName="rootConnector" presStyleLbl="node2" presStyleIdx="6" presStyleCnt="9"/>
       <dgm:spPr/>
       <dgm:t>
         <a:bodyPr/>
@@ -4775,24 +4767,12 @@
         </a:p>
       </dgm:t>
     </dgm:pt>
-    <dgm:pt modelId="{AB1BCA7E-621B-4DF3-A5AC-A1AB7D13E395}" type="pres">
-      <dgm:prSet presAssocID="{BD1DDD68-A030-4E56-A78C-C045A20D5260}" presName="hierRoot2" presStyleCnt="0">
-        <dgm:presLayoutVars>
-          <dgm:hierBranch val="init"/>
-        </dgm:presLayoutVars>
-      </dgm:prSet>
-      <dgm:spPr/>
-    </dgm:pt>
-    <dgm:pt modelId="{6D274AE3-4638-4322-BEDB-EB3F8530387B}" type="pres">
-      <dgm:prSet presAssocID="{BD1DDD68-A030-4E56-A78C-C045A20D5260}" presName="rootComposite" presStyleCnt="0"/>
-      <dgm:spPr/>
-    </dgm:pt>
-    <dgm:pt modelId="{BBD8B560-3529-4560-B4F4-2FF262593363}" type="pres">
-      <dgm:prSet presAssocID="{BD1DDD68-A030-4E56-A78C-C045A20D5260}" presName="rootText" presStyleLbl="node3" presStyleIdx="16" presStyleCnt="22">
-        <dgm:presLayoutVars>
-          <dgm:chPref val="3"/>
-        </dgm:presLayoutVars>
-      </dgm:prSet>
+    <dgm:pt modelId="{99039FCB-C585-49F0-AE9C-1202B682CE33}" type="pres">
+      <dgm:prSet presAssocID="{2FD0ACBE-A9EE-439B-BDD7-7D04768F5ECB}" presName="hierChild4" presStyleCnt="0"/>
+      <dgm:spPr/>
+    </dgm:pt>
+    <dgm:pt modelId="{F6AF1D9D-BBE8-4B97-95BF-FA0015EF42D6}" type="pres">
+      <dgm:prSet presAssocID="{4AC75C96-6CDF-4654-8237-F7788401C076}" presName="Name37" presStyleLbl="parChTrans1D3" presStyleIdx="16" presStyleCnt="22"/>
       <dgm:spPr/>
       <dgm:t>
         <a:bodyPr/>
@@ -4802,8 +4782,24 @@
         </a:p>
       </dgm:t>
     </dgm:pt>
-    <dgm:pt modelId="{16A9F9D7-3787-4714-911F-99186952F738}" type="pres">
-      <dgm:prSet presAssocID="{BD1DDD68-A030-4E56-A78C-C045A20D5260}" presName="rootConnector" presStyleLbl="node3" presStyleIdx="16" presStyleCnt="22"/>
+    <dgm:pt modelId="{AB1BCA7E-621B-4DF3-A5AC-A1AB7D13E395}" type="pres">
+      <dgm:prSet presAssocID="{BD1DDD68-A030-4E56-A78C-C045A20D5260}" presName="hierRoot2" presStyleCnt="0">
+        <dgm:presLayoutVars>
+          <dgm:hierBranch val="init"/>
+        </dgm:presLayoutVars>
+      </dgm:prSet>
+      <dgm:spPr/>
+    </dgm:pt>
+    <dgm:pt modelId="{6D274AE3-4638-4322-BEDB-EB3F8530387B}" type="pres">
+      <dgm:prSet presAssocID="{BD1DDD68-A030-4E56-A78C-C045A20D5260}" presName="rootComposite" presStyleCnt="0"/>
+      <dgm:spPr/>
+    </dgm:pt>
+    <dgm:pt modelId="{BBD8B560-3529-4560-B4F4-2FF262593363}" type="pres">
+      <dgm:prSet presAssocID="{BD1DDD68-A030-4E56-A78C-C045A20D5260}" presName="rootText" presStyleLbl="node3" presStyleIdx="16" presStyleCnt="22">
+        <dgm:presLayoutVars>
+          <dgm:chPref val="3"/>
+        </dgm:presLayoutVars>
+      </dgm:prSet>
       <dgm:spPr/>
       <dgm:t>
         <a:bodyPr/>
@@ -4813,16 +4809,8 @@
         </a:p>
       </dgm:t>
     </dgm:pt>
-    <dgm:pt modelId="{D238C898-400E-44D6-982C-2A28C09A1253}" type="pres">
-      <dgm:prSet presAssocID="{BD1DDD68-A030-4E56-A78C-C045A20D5260}" presName="hierChild4" presStyleCnt="0"/>
-      <dgm:spPr/>
-    </dgm:pt>
-    <dgm:pt modelId="{AE6AA82D-B18A-4135-A179-D56DDA002428}" type="pres">
-      <dgm:prSet presAssocID="{BD1DDD68-A030-4E56-A78C-C045A20D5260}" presName="hierChild5" presStyleCnt="0"/>
-      <dgm:spPr/>
-    </dgm:pt>
-    <dgm:pt modelId="{24DB76FC-FDBB-4AED-BE5A-4E4AE56E9F1D}" type="pres">
-      <dgm:prSet presAssocID="{6667787B-8278-48F1-A8AA-4BBEBED29AC7}" presName="Name37" presStyleLbl="parChTrans1D3" presStyleIdx="17" presStyleCnt="22"/>
+    <dgm:pt modelId="{16A9F9D7-3787-4714-911F-99186952F738}" type="pres">
+      <dgm:prSet presAssocID="{BD1DDD68-A030-4E56-A78C-C045A20D5260}" presName="rootConnector" presStyleLbl="node3" presStyleIdx="16" presStyleCnt="22"/>
       <dgm:spPr/>
       <dgm:t>
         <a:bodyPr/>
@@ -4832,24 +4820,16 @@
         </a:p>
       </dgm:t>
     </dgm:pt>
-    <dgm:pt modelId="{4AE49B0E-3D25-446A-B72F-0B42263E7350}" type="pres">
-      <dgm:prSet presAssocID="{1FD30924-7ED0-4217-A609-81C912422B24}" presName="hierRoot2" presStyleCnt="0">
-        <dgm:presLayoutVars>
-          <dgm:hierBranch val="init"/>
-        </dgm:presLayoutVars>
-      </dgm:prSet>
-      <dgm:spPr/>
-    </dgm:pt>
-    <dgm:pt modelId="{805FE404-BBE9-4CEB-A822-CBACB603372B}" type="pres">
-      <dgm:prSet presAssocID="{1FD30924-7ED0-4217-A609-81C912422B24}" presName="rootComposite" presStyleCnt="0"/>
-      <dgm:spPr/>
-    </dgm:pt>
-    <dgm:pt modelId="{4A45F6A9-2CEE-4778-B464-5ADE39FD2424}" type="pres">
-      <dgm:prSet presAssocID="{1FD30924-7ED0-4217-A609-81C912422B24}" presName="rootText" presStyleLbl="node3" presStyleIdx="17" presStyleCnt="22">
-        <dgm:presLayoutVars>
-          <dgm:chPref val="3"/>
-        </dgm:presLayoutVars>
-      </dgm:prSet>
+    <dgm:pt modelId="{D238C898-400E-44D6-982C-2A28C09A1253}" type="pres">
+      <dgm:prSet presAssocID="{BD1DDD68-A030-4E56-A78C-C045A20D5260}" presName="hierChild4" presStyleCnt="0"/>
+      <dgm:spPr/>
+    </dgm:pt>
+    <dgm:pt modelId="{AE6AA82D-B18A-4135-A179-D56DDA002428}" type="pres">
+      <dgm:prSet presAssocID="{BD1DDD68-A030-4E56-A78C-C045A20D5260}" presName="hierChild5" presStyleCnt="0"/>
+      <dgm:spPr/>
+    </dgm:pt>
+    <dgm:pt modelId="{24DB76FC-FDBB-4AED-BE5A-4E4AE56E9F1D}" type="pres">
+      <dgm:prSet presAssocID="{6667787B-8278-48F1-A8AA-4BBEBED29AC7}" presName="Name37" presStyleLbl="parChTrans1D3" presStyleIdx="17" presStyleCnt="22"/>
       <dgm:spPr/>
       <dgm:t>
         <a:bodyPr/>
@@ -4859,8 +4839,24 @@
         </a:p>
       </dgm:t>
     </dgm:pt>
-    <dgm:pt modelId="{70DD15F4-9873-4C92-A83A-F5A2BD26FFD0}" type="pres">
-      <dgm:prSet presAssocID="{1FD30924-7ED0-4217-A609-81C912422B24}" presName="rootConnector" presStyleLbl="node3" presStyleIdx="17" presStyleCnt="22"/>
+    <dgm:pt modelId="{4AE49B0E-3D25-446A-B72F-0B42263E7350}" type="pres">
+      <dgm:prSet presAssocID="{1FD30924-7ED0-4217-A609-81C912422B24}" presName="hierRoot2" presStyleCnt="0">
+        <dgm:presLayoutVars>
+          <dgm:hierBranch val="init"/>
+        </dgm:presLayoutVars>
+      </dgm:prSet>
+      <dgm:spPr/>
+    </dgm:pt>
+    <dgm:pt modelId="{805FE404-BBE9-4CEB-A822-CBACB603372B}" type="pres">
+      <dgm:prSet presAssocID="{1FD30924-7ED0-4217-A609-81C912422B24}" presName="rootComposite" presStyleCnt="0"/>
+      <dgm:spPr/>
+    </dgm:pt>
+    <dgm:pt modelId="{4A45F6A9-2CEE-4778-B464-5ADE39FD2424}" type="pres">
+      <dgm:prSet presAssocID="{1FD30924-7ED0-4217-A609-81C912422B24}" presName="rootText" presStyleLbl="node3" presStyleIdx="17" presStyleCnt="22">
+        <dgm:presLayoutVars>
+          <dgm:chPref val="3"/>
+        </dgm:presLayoutVars>
+      </dgm:prSet>
       <dgm:spPr/>
       <dgm:t>
         <a:bodyPr/>
@@ -4870,16 +4866,8 @@
         </a:p>
       </dgm:t>
     </dgm:pt>
-    <dgm:pt modelId="{0241E1E0-0650-44C3-84B2-87CD3DBDFEBA}" type="pres">
-      <dgm:prSet presAssocID="{1FD30924-7ED0-4217-A609-81C912422B24}" presName="hierChild4" presStyleCnt="0"/>
-      <dgm:spPr/>
-    </dgm:pt>
-    <dgm:pt modelId="{9C2456F0-EDC3-4496-9957-F8552B263857}" type="pres">
-      <dgm:prSet presAssocID="{1FD30924-7ED0-4217-A609-81C912422B24}" presName="hierChild5" presStyleCnt="0"/>
-      <dgm:spPr/>
-    </dgm:pt>
-    <dgm:pt modelId="{4BD3313B-B6CB-42FE-90CB-13EA1BBA4C78}" type="pres">
-      <dgm:prSet presAssocID="{7EE8E44F-0C3A-4679-96F1-03029899B8F6}" presName="Name37" presStyleLbl="parChTrans1D3" presStyleIdx="18" presStyleCnt="22"/>
+    <dgm:pt modelId="{70DD15F4-9873-4C92-A83A-F5A2BD26FFD0}" type="pres">
+      <dgm:prSet presAssocID="{1FD30924-7ED0-4217-A609-81C912422B24}" presName="rootConnector" presStyleLbl="node3" presStyleIdx="17" presStyleCnt="22"/>
       <dgm:spPr/>
       <dgm:t>
         <a:bodyPr/>
@@ -4889,24 +4877,16 @@
         </a:p>
       </dgm:t>
     </dgm:pt>
-    <dgm:pt modelId="{978D7963-F22C-4E73-AB98-D7A91714309E}" type="pres">
-      <dgm:prSet presAssocID="{254F2FB9-B8B1-45E2-A82F-4EBBA8D47F7E}" presName="hierRoot2" presStyleCnt="0">
-        <dgm:presLayoutVars>
-          <dgm:hierBranch val="init"/>
-        </dgm:presLayoutVars>
-      </dgm:prSet>
-      <dgm:spPr/>
-    </dgm:pt>
-    <dgm:pt modelId="{CC2230CE-9794-4369-961F-671CFA1FF884}" type="pres">
-      <dgm:prSet presAssocID="{254F2FB9-B8B1-45E2-A82F-4EBBA8D47F7E}" presName="rootComposite" presStyleCnt="0"/>
-      <dgm:spPr/>
-    </dgm:pt>
-    <dgm:pt modelId="{AE0DAA20-8A17-469F-A2AE-7E1D1148B1A8}" type="pres">
-      <dgm:prSet presAssocID="{254F2FB9-B8B1-45E2-A82F-4EBBA8D47F7E}" presName="rootText" presStyleLbl="node3" presStyleIdx="18" presStyleCnt="22">
-        <dgm:presLayoutVars>
-          <dgm:chPref val="3"/>
-        </dgm:presLayoutVars>
-      </dgm:prSet>
+    <dgm:pt modelId="{0241E1E0-0650-44C3-84B2-87CD3DBDFEBA}" type="pres">
+      <dgm:prSet presAssocID="{1FD30924-7ED0-4217-A609-81C912422B24}" presName="hierChild4" presStyleCnt="0"/>
+      <dgm:spPr/>
+    </dgm:pt>
+    <dgm:pt modelId="{9C2456F0-EDC3-4496-9957-F8552B263857}" type="pres">
+      <dgm:prSet presAssocID="{1FD30924-7ED0-4217-A609-81C912422B24}" presName="hierChild5" presStyleCnt="0"/>
+      <dgm:spPr/>
+    </dgm:pt>
+    <dgm:pt modelId="{4BD3313B-B6CB-42FE-90CB-13EA1BBA4C78}" type="pres">
+      <dgm:prSet presAssocID="{7EE8E44F-0C3A-4679-96F1-03029899B8F6}" presName="Name37" presStyleLbl="parChTrans1D3" presStyleIdx="18" presStyleCnt="22"/>
       <dgm:spPr/>
       <dgm:t>
         <a:bodyPr/>
@@ -4916,8 +4896,24 @@
         </a:p>
       </dgm:t>
     </dgm:pt>
-    <dgm:pt modelId="{6320A880-F80E-4CF8-8C28-17D03A432C6C}" type="pres">
-      <dgm:prSet presAssocID="{254F2FB9-B8B1-45E2-A82F-4EBBA8D47F7E}" presName="rootConnector" presStyleLbl="node3" presStyleIdx="18" presStyleCnt="22"/>
+    <dgm:pt modelId="{978D7963-F22C-4E73-AB98-D7A91714309E}" type="pres">
+      <dgm:prSet presAssocID="{254F2FB9-B8B1-45E2-A82F-4EBBA8D47F7E}" presName="hierRoot2" presStyleCnt="0">
+        <dgm:presLayoutVars>
+          <dgm:hierBranch val="init"/>
+        </dgm:presLayoutVars>
+      </dgm:prSet>
+      <dgm:spPr/>
+    </dgm:pt>
+    <dgm:pt modelId="{CC2230CE-9794-4369-961F-671CFA1FF884}" type="pres">
+      <dgm:prSet presAssocID="{254F2FB9-B8B1-45E2-A82F-4EBBA8D47F7E}" presName="rootComposite" presStyleCnt="0"/>
+      <dgm:spPr/>
+    </dgm:pt>
+    <dgm:pt modelId="{AE0DAA20-8A17-469F-A2AE-7E1D1148B1A8}" type="pres">
+      <dgm:prSet presAssocID="{254F2FB9-B8B1-45E2-A82F-4EBBA8D47F7E}" presName="rootText" presStyleLbl="node3" presStyleIdx="18" presStyleCnt="22">
+        <dgm:presLayoutVars>
+          <dgm:chPref val="3"/>
+        </dgm:presLayoutVars>
+      </dgm:prSet>
       <dgm:spPr/>
       <dgm:t>
         <a:bodyPr/>
@@ -4927,20 +4923,8 @@
         </a:p>
       </dgm:t>
     </dgm:pt>
-    <dgm:pt modelId="{9CCC97E9-CE7E-45AC-8F5C-BB67ABD0A82E}" type="pres">
-      <dgm:prSet presAssocID="{254F2FB9-B8B1-45E2-A82F-4EBBA8D47F7E}" presName="hierChild4" presStyleCnt="0"/>
-      <dgm:spPr/>
-    </dgm:pt>
-    <dgm:pt modelId="{781EB760-614E-4194-A96F-462BD0B1BF56}" type="pres">
-      <dgm:prSet presAssocID="{254F2FB9-B8B1-45E2-A82F-4EBBA8D47F7E}" presName="hierChild5" presStyleCnt="0"/>
-      <dgm:spPr/>
-    </dgm:pt>
-    <dgm:pt modelId="{F80D34B0-0440-4265-B6BA-4A722CBB9B73}" type="pres">
-      <dgm:prSet presAssocID="{2FD0ACBE-A9EE-439B-BDD7-7D04768F5ECB}" presName="hierChild5" presStyleCnt="0"/>
-      <dgm:spPr/>
-    </dgm:pt>
-    <dgm:pt modelId="{D94F6F4E-3CAA-4D71-98C2-5B11B32EE224}" type="pres">
-      <dgm:prSet presAssocID="{58F003E5-0E8F-43B2-BD78-8704859781FC}" presName="Name37" presStyleLbl="parChTrans1D2" presStyleIdx="7" presStyleCnt="11"/>
+    <dgm:pt modelId="{6320A880-F80E-4CF8-8C28-17D03A432C6C}" type="pres">
+      <dgm:prSet presAssocID="{254F2FB9-B8B1-45E2-A82F-4EBBA8D47F7E}" presName="rootConnector" presStyleLbl="node3" presStyleIdx="18" presStyleCnt="22"/>
       <dgm:spPr/>
       <dgm:t>
         <a:bodyPr/>
@@ -4950,24 +4934,20 @@
         </a:p>
       </dgm:t>
     </dgm:pt>
-    <dgm:pt modelId="{2F63BBCD-3D8F-4CAC-83CB-485F82FCD0A7}" type="pres">
-      <dgm:prSet presAssocID="{402192EA-635B-4E5A-BC30-CBA091CCA687}" presName="hierRoot2" presStyleCnt="0">
-        <dgm:presLayoutVars>
-          <dgm:hierBranch val="init"/>
-        </dgm:presLayoutVars>
-      </dgm:prSet>
-      <dgm:spPr/>
-    </dgm:pt>
-    <dgm:pt modelId="{06D0B0BF-8FCC-405D-A036-7B14EA353F2A}" type="pres">
-      <dgm:prSet presAssocID="{402192EA-635B-4E5A-BC30-CBA091CCA687}" presName="rootComposite" presStyleCnt="0"/>
-      <dgm:spPr/>
-    </dgm:pt>
-    <dgm:pt modelId="{53F64DE1-C267-4768-9640-9F5FECF761EF}" type="pres">
-      <dgm:prSet presAssocID="{402192EA-635B-4E5A-BC30-CBA091CCA687}" presName="rootText" presStyleLbl="node2" presStyleIdx="7" presStyleCnt="9">
-        <dgm:presLayoutVars>
-          <dgm:chPref val="3"/>
-        </dgm:presLayoutVars>
-      </dgm:prSet>
+    <dgm:pt modelId="{9CCC97E9-CE7E-45AC-8F5C-BB67ABD0A82E}" type="pres">
+      <dgm:prSet presAssocID="{254F2FB9-B8B1-45E2-A82F-4EBBA8D47F7E}" presName="hierChild4" presStyleCnt="0"/>
+      <dgm:spPr/>
+    </dgm:pt>
+    <dgm:pt modelId="{781EB760-614E-4194-A96F-462BD0B1BF56}" type="pres">
+      <dgm:prSet presAssocID="{254F2FB9-B8B1-45E2-A82F-4EBBA8D47F7E}" presName="hierChild5" presStyleCnt="0"/>
+      <dgm:spPr/>
+    </dgm:pt>
+    <dgm:pt modelId="{F80D34B0-0440-4265-B6BA-4A722CBB9B73}" type="pres">
+      <dgm:prSet presAssocID="{2FD0ACBE-A9EE-439B-BDD7-7D04768F5ECB}" presName="hierChild5" presStyleCnt="0"/>
+      <dgm:spPr/>
+    </dgm:pt>
+    <dgm:pt modelId="{D94F6F4E-3CAA-4D71-98C2-5B11B32EE224}" type="pres">
+      <dgm:prSet presAssocID="{58F003E5-0E8F-43B2-BD78-8704859781FC}" presName="Name37" presStyleLbl="parChTrans1D2" presStyleIdx="7" presStyleCnt="11"/>
       <dgm:spPr/>
       <dgm:t>
         <a:bodyPr/>
@@ -4977,8 +4957,24 @@
         </a:p>
       </dgm:t>
     </dgm:pt>
-    <dgm:pt modelId="{831B417E-D813-4576-8428-B6F99D5216F6}" type="pres">
-      <dgm:prSet presAssocID="{402192EA-635B-4E5A-BC30-CBA091CCA687}" presName="rootConnector" presStyleLbl="node2" presStyleIdx="7" presStyleCnt="9"/>
+    <dgm:pt modelId="{2F63BBCD-3D8F-4CAC-83CB-485F82FCD0A7}" type="pres">
+      <dgm:prSet presAssocID="{402192EA-635B-4E5A-BC30-CBA091CCA687}" presName="hierRoot2" presStyleCnt="0">
+        <dgm:presLayoutVars>
+          <dgm:hierBranch val="init"/>
+        </dgm:presLayoutVars>
+      </dgm:prSet>
+      <dgm:spPr/>
+    </dgm:pt>
+    <dgm:pt modelId="{06D0B0BF-8FCC-405D-A036-7B14EA353F2A}" type="pres">
+      <dgm:prSet presAssocID="{402192EA-635B-4E5A-BC30-CBA091CCA687}" presName="rootComposite" presStyleCnt="0"/>
+      <dgm:spPr/>
+    </dgm:pt>
+    <dgm:pt modelId="{53F64DE1-C267-4768-9640-9F5FECF761EF}" type="pres">
+      <dgm:prSet presAssocID="{402192EA-635B-4E5A-BC30-CBA091CCA687}" presName="rootText" presStyleLbl="node2" presStyleIdx="7" presStyleCnt="9">
+        <dgm:presLayoutVars>
+          <dgm:chPref val="3"/>
+        </dgm:presLayoutVars>
+      </dgm:prSet>
       <dgm:spPr/>
       <dgm:t>
         <a:bodyPr/>
@@ -4988,12 +4984,8 @@
         </a:p>
       </dgm:t>
     </dgm:pt>
-    <dgm:pt modelId="{CD158F6F-10B2-4C9E-AF1B-C07B94799D91}" type="pres">
-      <dgm:prSet presAssocID="{402192EA-635B-4E5A-BC30-CBA091CCA687}" presName="hierChild4" presStyleCnt="0"/>
-      <dgm:spPr/>
-    </dgm:pt>
-    <dgm:pt modelId="{0845B1E8-7FE0-46CA-B690-B70A34907BDB}" type="pres">
-      <dgm:prSet presAssocID="{6558A57C-4982-4A47-B2B2-8AABE7345991}" presName="Name37" presStyleLbl="parChTrans1D3" presStyleIdx="19" presStyleCnt="22"/>
+    <dgm:pt modelId="{831B417E-D813-4576-8428-B6F99D5216F6}" type="pres">
+      <dgm:prSet presAssocID="{402192EA-635B-4E5A-BC30-CBA091CCA687}" presName="rootConnector" presStyleLbl="node2" presStyleIdx="7" presStyleCnt="9"/>
       <dgm:spPr/>
       <dgm:t>
         <a:bodyPr/>
@@ -5003,24 +4995,12 @@
         </a:p>
       </dgm:t>
     </dgm:pt>
-    <dgm:pt modelId="{B8CF2E81-34FA-48EA-A205-897AA9DF888D}" type="pres">
-      <dgm:prSet presAssocID="{0514F8A1-4B60-46B1-9B43-60C5F0627DF1}" presName="hierRoot2" presStyleCnt="0">
-        <dgm:presLayoutVars>
-          <dgm:hierBranch val="init"/>
-        </dgm:presLayoutVars>
-      </dgm:prSet>
-      <dgm:spPr/>
-    </dgm:pt>
-    <dgm:pt modelId="{036F361F-1715-466F-ACF2-3FF3DD70E273}" type="pres">
-      <dgm:prSet presAssocID="{0514F8A1-4B60-46B1-9B43-60C5F0627DF1}" presName="rootComposite" presStyleCnt="0"/>
-      <dgm:spPr/>
-    </dgm:pt>
-    <dgm:pt modelId="{8A46CCD3-1595-4057-9247-6F1A420CF6FC}" type="pres">
-      <dgm:prSet presAssocID="{0514F8A1-4B60-46B1-9B43-60C5F0627DF1}" presName="rootText" presStyleLbl="node3" presStyleIdx="19" presStyleCnt="22">
-        <dgm:presLayoutVars>
-          <dgm:chPref val="3"/>
-        </dgm:presLayoutVars>
-      </dgm:prSet>
+    <dgm:pt modelId="{CD158F6F-10B2-4C9E-AF1B-C07B94799D91}" type="pres">
+      <dgm:prSet presAssocID="{402192EA-635B-4E5A-BC30-CBA091CCA687}" presName="hierChild4" presStyleCnt="0"/>
+      <dgm:spPr/>
+    </dgm:pt>
+    <dgm:pt modelId="{0845B1E8-7FE0-46CA-B690-B70A34907BDB}" type="pres">
+      <dgm:prSet presAssocID="{6558A57C-4982-4A47-B2B2-8AABE7345991}" presName="Name37" presStyleLbl="parChTrans1D3" presStyleIdx="19" presStyleCnt="22"/>
       <dgm:spPr/>
       <dgm:t>
         <a:bodyPr/>
@@ -5030,8 +5010,24 @@
         </a:p>
       </dgm:t>
     </dgm:pt>
-    <dgm:pt modelId="{6FC30F81-EB7F-4DFC-9AA5-C2A37B459F04}" type="pres">
-      <dgm:prSet presAssocID="{0514F8A1-4B60-46B1-9B43-60C5F0627DF1}" presName="rootConnector" presStyleLbl="node3" presStyleIdx="19" presStyleCnt="22"/>
+    <dgm:pt modelId="{B8CF2E81-34FA-48EA-A205-897AA9DF888D}" type="pres">
+      <dgm:prSet presAssocID="{0514F8A1-4B60-46B1-9B43-60C5F0627DF1}" presName="hierRoot2" presStyleCnt="0">
+        <dgm:presLayoutVars>
+          <dgm:hierBranch val="init"/>
+        </dgm:presLayoutVars>
+      </dgm:prSet>
+      <dgm:spPr/>
+    </dgm:pt>
+    <dgm:pt modelId="{036F361F-1715-466F-ACF2-3FF3DD70E273}" type="pres">
+      <dgm:prSet presAssocID="{0514F8A1-4B60-46B1-9B43-60C5F0627DF1}" presName="rootComposite" presStyleCnt="0"/>
+      <dgm:spPr/>
+    </dgm:pt>
+    <dgm:pt modelId="{8A46CCD3-1595-4057-9247-6F1A420CF6FC}" type="pres">
+      <dgm:prSet presAssocID="{0514F8A1-4B60-46B1-9B43-60C5F0627DF1}" presName="rootText" presStyleLbl="node3" presStyleIdx="19" presStyleCnt="22">
+        <dgm:presLayoutVars>
+          <dgm:chPref val="3"/>
+        </dgm:presLayoutVars>
+      </dgm:prSet>
       <dgm:spPr/>
       <dgm:t>
         <a:bodyPr/>
@@ -5041,16 +5037,8 @@
         </a:p>
       </dgm:t>
     </dgm:pt>
-    <dgm:pt modelId="{73EA4B44-0E68-4394-9089-ED1A6FC5066B}" type="pres">
-      <dgm:prSet presAssocID="{0514F8A1-4B60-46B1-9B43-60C5F0627DF1}" presName="hierChild4" presStyleCnt="0"/>
-      <dgm:spPr/>
-    </dgm:pt>
-    <dgm:pt modelId="{E7A43B8C-E24C-4066-9CE5-94443DCDB162}" type="pres">
-      <dgm:prSet presAssocID="{0514F8A1-4B60-46B1-9B43-60C5F0627DF1}" presName="hierChild5" presStyleCnt="0"/>
-      <dgm:spPr/>
-    </dgm:pt>
-    <dgm:pt modelId="{D3CE8887-ABBE-448D-AE41-463E6DCE7983}" type="pres">
-      <dgm:prSet presAssocID="{04BB0C87-6F2D-4619-8302-191948EC74A6}" presName="Name37" presStyleLbl="parChTrans1D3" presStyleIdx="20" presStyleCnt="22"/>
+    <dgm:pt modelId="{6FC30F81-EB7F-4DFC-9AA5-C2A37B459F04}" type="pres">
+      <dgm:prSet presAssocID="{0514F8A1-4B60-46B1-9B43-60C5F0627DF1}" presName="rootConnector" presStyleLbl="node3" presStyleIdx="19" presStyleCnt="22"/>
       <dgm:spPr/>
       <dgm:t>
         <a:bodyPr/>
@@ -5060,24 +5048,16 @@
         </a:p>
       </dgm:t>
     </dgm:pt>
-    <dgm:pt modelId="{EFADD643-B7A1-49E6-86B1-61FFCFBA0C2A}" type="pres">
-      <dgm:prSet presAssocID="{1E3ABECC-8D21-4FCF-8F22-4047954C6620}" presName="hierRoot2" presStyleCnt="0">
-        <dgm:presLayoutVars>
-          <dgm:hierBranch val="init"/>
-        </dgm:presLayoutVars>
-      </dgm:prSet>
-      <dgm:spPr/>
-    </dgm:pt>
-    <dgm:pt modelId="{CA13AC6A-E63D-468D-ADDC-343C55AC567B}" type="pres">
-      <dgm:prSet presAssocID="{1E3ABECC-8D21-4FCF-8F22-4047954C6620}" presName="rootComposite" presStyleCnt="0"/>
-      <dgm:spPr/>
-    </dgm:pt>
-    <dgm:pt modelId="{F0432EA2-E586-4C57-9E74-B7DC627F4296}" type="pres">
-      <dgm:prSet presAssocID="{1E3ABECC-8D21-4FCF-8F22-4047954C6620}" presName="rootText" presStyleLbl="node3" presStyleIdx="20" presStyleCnt="22">
-        <dgm:presLayoutVars>
-          <dgm:chPref val="3"/>
-        </dgm:presLayoutVars>
-      </dgm:prSet>
+    <dgm:pt modelId="{73EA4B44-0E68-4394-9089-ED1A6FC5066B}" type="pres">
+      <dgm:prSet presAssocID="{0514F8A1-4B60-46B1-9B43-60C5F0627DF1}" presName="hierChild4" presStyleCnt="0"/>
+      <dgm:spPr/>
+    </dgm:pt>
+    <dgm:pt modelId="{E7A43B8C-E24C-4066-9CE5-94443DCDB162}" type="pres">
+      <dgm:prSet presAssocID="{0514F8A1-4B60-46B1-9B43-60C5F0627DF1}" presName="hierChild5" presStyleCnt="0"/>
+      <dgm:spPr/>
+    </dgm:pt>
+    <dgm:pt modelId="{D3CE8887-ABBE-448D-AE41-463E6DCE7983}" type="pres">
+      <dgm:prSet presAssocID="{04BB0C87-6F2D-4619-8302-191948EC74A6}" presName="Name37" presStyleLbl="parChTrans1D3" presStyleIdx="20" presStyleCnt="22"/>
       <dgm:spPr/>
       <dgm:t>
         <a:bodyPr/>
@@ -5087,8 +5067,24 @@
         </a:p>
       </dgm:t>
     </dgm:pt>
-    <dgm:pt modelId="{D27660A4-8C22-4AA8-8F93-D6A250C1942F}" type="pres">
-      <dgm:prSet presAssocID="{1E3ABECC-8D21-4FCF-8F22-4047954C6620}" presName="rootConnector" presStyleLbl="node3" presStyleIdx="20" presStyleCnt="22"/>
+    <dgm:pt modelId="{EFADD643-B7A1-49E6-86B1-61FFCFBA0C2A}" type="pres">
+      <dgm:prSet presAssocID="{1E3ABECC-8D21-4FCF-8F22-4047954C6620}" presName="hierRoot2" presStyleCnt="0">
+        <dgm:presLayoutVars>
+          <dgm:hierBranch val="init"/>
+        </dgm:presLayoutVars>
+      </dgm:prSet>
+      <dgm:spPr/>
+    </dgm:pt>
+    <dgm:pt modelId="{CA13AC6A-E63D-468D-ADDC-343C55AC567B}" type="pres">
+      <dgm:prSet presAssocID="{1E3ABECC-8D21-4FCF-8F22-4047954C6620}" presName="rootComposite" presStyleCnt="0"/>
+      <dgm:spPr/>
+    </dgm:pt>
+    <dgm:pt modelId="{F0432EA2-E586-4C57-9E74-B7DC627F4296}" type="pres">
+      <dgm:prSet presAssocID="{1E3ABECC-8D21-4FCF-8F22-4047954C6620}" presName="rootText" presStyleLbl="node3" presStyleIdx="20" presStyleCnt="22">
+        <dgm:presLayoutVars>
+          <dgm:chPref val="3"/>
+        </dgm:presLayoutVars>
+      </dgm:prSet>
       <dgm:spPr/>
       <dgm:t>
         <a:bodyPr/>
@@ -5098,16 +5094,8 @@
         </a:p>
       </dgm:t>
     </dgm:pt>
-    <dgm:pt modelId="{C98D9B85-BD5E-4A29-BBD5-D6CA4FB012F9}" type="pres">
-      <dgm:prSet presAssocID="{1E3ABECC-8D21-4FCF-8F22-4047954C6620}" presName="hierChild4" presStyleCnt="0"/>
-      <dgm:spPr/>
-    </dgm:pt>
-    <dgm:pt modelId="{01B8753B-B5E6-4CE5-9C96-B9BA9ADF2BA2}" type="pres">
-      <dgm:prSet presAssocID="{1E3ABECC-8D21-4FCF-8F22-4047954C6620}" presName="hierChild5" presStyleCnt="0"/>
-      <dgm:spPr/>
-    </dgm:pt>
-    <dgm:pt modelId="{08B4D769-2DB8-4026-BE5A-65BB0EFF9F14}" type="pres">
-      <dgm:prSet presAssocID="{0F3850D7-801C-4B55-B4EE-9750549084FF}" presName="Name37" presStyleLbl="parChTrans1D3" presStyleIdx="21" presStyleCnt="22"/>
+    <dgm:pt modelId="{D27660A4-8C22-4AA8-8F93-D6A250C1942F}" type="pres">
+      <dgm:prSet presAssocID="{1E3ABECC-8D21-4FCF-8F22-4047954C6620}" presName="rootConnector" presStyleLbl="node3" presStyleIdx="20" presStyleCnt="22"/>
       <dgm:spPr/>
       <dgm:t>
         <a:bodyPr/>
@@ -5117,24 +5105,16 @@
         </a:p>
       </dgm:t>
     </dgm:pt>
-    <dgm:pt modelId="{CFCF2D5C-0D50-4DDF-AC43-F05FE58AD953}" type="pres">
-      <dgm:prSet presAssocID="{412D8D73-F653-4132-AF48-FE332EE4AF61}" presName="hierRoot2" presStyleCnt="0">
-        <dgm:presLayoutVars>
-          <dgm:hierBranch val="init"/>
-        </dgm:presLayoutVars>
-      </dgm:prSet>
-      <dgm:spPr/>
-    </dgm:pt>
-    <dgm:pt modelId="{CFF51B01-D19B-4E11-A59F-1E7CEA1AE725}" type="pres">
-      <dgm:prSet presAssocID="{412D8D73-F653-4132-AF48-FE332EE4AF61}" presName="rootComposite" presStyleCnt="0"/>
-      <dgm:spPr/>
-    </dgm:pt>
-    <dgm:pt modelId="{FEE3C8F0-336B-4489-B1F3-DF952E1353C6}" type="pres">
-      <dgm:prSet presAssocID="{412D8D73-F653-4132-AF48-FE332EE4AF61}" presName="rootText" presStyleLbl="node3" presStyleIdx="21" presStyleCnt="22">
-        <dgm:presLayoutVars>
-          <dgm:chPref val="3"/>
-        </dgm:presLayoutVars>
-      </dgm:prSet>
+    <dgm:pt modelId="{C98D9B85-BD5E-4A29-BBD5-D6CA4FB012F9}" type="pres">
+      <dgm:prSet presAssocID="{1E3ABECC-8D21-4FCF-8F22-4047954C6620}" presName="hierChild4" presStyleCnt="0"/>
+      <dgm:spPr/>
+    </dgm:pt>
+    <dgm:pt modelId="{01B8753B-B5E6-4CE5-9C96-B9BA9ADF2BA2}" type="pres">
+      <dgm:prSet presAssocID="{1E3ABECC-8D21-4FCF-8F22-4047954C6620}" presName="hierChild5" presStyleCnt="0"/>
+      <dgm:spPr/>
+    </dgm:pt>
+    <dgm:pt modelId="{08B4D769-2DB8-4026-BE5A-65BB0EFF9F14}" type="pres">
+      <dgm:prSet presAssocID="{0F3850D7-801C-4B55-B4EE-9750549084FF}" presName="Name37" presStyleLbl="parChTrans1D3" presStyleIdx="21" presStyleCnt="22"/>
       <dgm:spPr/>
       <dgm:t>
         <a:bodyPr/>
@@ -5144,8 +5124,24 @@
         </a:p>
       </dgm:t>
     </dgm:pt>
-    <dgm:pt modelId="{C78F9AFE-E8E1-46DE-9FB8-48A10E9F107A}" type="pres">
-      <dgm:prSet presAssocID="{412D8D73-F653-4132-AF48-FE332EE4AF61}" presName="rootConnector" presStyleLbl="node3" presStyleIdx="21" presStyleCnt="22"/>
+    <dgm:pt modelId="{CFCF2D5C-0D50-4DDF-AC43-F05FE58AD953}" type="pres">
+      <dgm:prSet presAssocID="{412D8D73-F653-4132-AF48-FE332EE4AF61}" presName="hierRoot2" presStyleCnt="0">
+        <dgm:presLayoutVars>
+          <dgm:hierBranch val="init"/>
+        </dgm:presLayoutVars>
+      </dgm:prSet>
+      <dgm:spPr/>
+    </dgm:pt>
+    <dgm:pt modelId="{CFF51B01-D19B-4E11-A59F-1E7CEA1AE725}" type="pres">
+      <dgm:prSet presAssocID="{412D8D73-F653-4132-AF48-FE332EE4AF61}" presName="rootComposite" presStyleCnt="0"/>
+      <dgm:spPr/>
+    </dgm:pt>
+    <dgm:pt modelId="{FEE3C8F0-336B-4489-B1F3-DF952E1353C6}" type="pres">
+      <dgm:prSet presAssocID="{412D8D73-F653-4132-AF48-FE332EE4AF61}" presName="rootText" presStyleLbl="node3" presStyleIdx="21" presStyleCnt="22">
+        <dgm:presLayoutVars>
+          <dgm:chPref val="3"/>
+        </dgm:presLayoutVars>
+      </dgm:prSet>
       <dgm:spPr/>
       <dgm:t>
         <a:bodyPr/>
@@ -5155,20 +5151,8 @@
         </a:p>
       </dgm:t>
     </dgm:pt>
-    <dgm:pt modelId="{2619CB67-5AF5-4F30-B1EB-774137B54EC1}" type="pres">
-      <dgm:prSet presAssocID="{412D8D73-F653-4132-AF48-FE332EE4AF61}" presName="hierChild4" presStyleCnt="0"/>
-      <dgm:spPr/>
-    </dgm:pt>
-    <dgm:pt modelId="{7A2B42A9-214C-4B39-B889-9F16276607AA}" type="pres">
-      <dgm:prSet presAssocID="{412D8D73-F653-4132-AF48-FE332EE4AF61}" presName="hierChild5" presStyleCnt="0"/>
-      <dgm:spPr/>
-    </dgm:pt>
-    <dgm:pt modelId="{53D643AD-179A-44D4-B27F-8A46D42981DF}" type="pres">
-      <dgm:prSet presAssocID="{402192EA-635B-4E5A-BC30-CBA091CCA687}" presName="hierChild5" presStyleCnt="0"/>
-      <dgm:spPr/>
-    </dgm:pt>
-    <dgm:pt modelId="{E897A794-E666-4DCD-89D5-3E766B270427}" type="pres">
-      <dgm:prSet presAssocID="{8017E421-4010-47DD-B3A2-150D7F01784C}" presName="Name37" presStyleLbl="parChTrans1D2" presStyleIdx="8" presStyleCnt="11"/>
+    <dgm:pt modelId="{C78F9AFE-E8E1-46DE-9FB8-48A10E9F107A}" type="pres">
+      <dgm:prSet presAssocID="{412D8D73-F653-4132-AF48-FE332EE4AF61}" presName="rootConnector" presStyleLbl="node3" presStyleIdx="21" presStyleCnt="22"/>
       <dgm:spPr/>
       <dgm:t>
         <a:bodyPr/>
@@ -5178,24 +5162,20 @@
         </a:p>
       </dgm:t>
     </dgm:pt>
-    <dgm:pt modelId="{3A2FEFD5-F1ED-4536-BEE9-E10E554A74B2}" type="pres">
-      <dgm:prSet presAssocID="{02E8AF3B-DB86-4F9A-8D46-27D7319E4BB8}" presName="hierRoot2" presStyleCnt="0">
-        <dgm:presLayoutVars>
-          <dgm:hierBranch val="init"/>
-        </dgm:presLayoutVars>
-      </dgm:prSet>
-      <dgm:spPr/>
-    </dgm:pt>
-    <dgm:pt modelId="{F027BF0B-8C50-46A2-89C8-C9AF1F8B7553}" type="pres">
-      <dgm:prSet presAssocID="{02E8AF3B-DB86-4F9A-8D46-27D7319E4BB8}" presName="rootComposite" presStyleCnt="0"/>
-      <dgm:spPr/>
-    </dgm:pt>
-    <dgm:pt modelId="{0A9A1E76-FE42-4D99-8E38-8C153C3BEC71}" type="pres">
-      <dgm:prSet presAssocID="{02E8AF3B-DB86-4F9A-8D46-27D7319E4BB8}" presName="rootText" presStyleLbl="node2" presStyleIdx="8" presStyleCnt="9">
-        <dgm:presLayoutVars>
-          <dgm:chPref val="3"/>
-        </dgm:presLayoutVars>
-      </dgm:prSet>
+    <dgm:pt modelId="{2619CB67-5AF5-4F30-B1EB-774137B54EC1}" type="pres">
+      <dgm:prSet presAssocID="{412D8D73-F653-4132-AF48-FE332EE4AF61}" presName="hierChild4" presStyleCnt="0"/>
+      <dgm:spPr/>
+    </dgm:pt>
+    <dgm:pt modelId="{7A2B42A9-214C-4B39-B889-9F16276607AA}" type="pres">
+      <dgm:prSet presAssocID="{412D8D73-F653-4132-AF48-FE332EE4AF61}" presName="hierChild5" presStyleCnt="0"/>
+      <dgm:spPr/>
+    </dgm:pt>
+    <dgm:pt modelId="{53D643AD-179A-44D4-B27F-8A46D42981DF}" type="pres">
+      <dgm:prSet presAssocID="{402192EA-635B-4E5A-BC30-CBA091CCA687}" presName="hierChild5" presStyleCnt="0"/>
+      <dgm:spPr/>
+    </dgm:pt>
+    <dgm:pt modelId="{E897A794-E666-4DCD-89D5-3E766B270427}" type="pres">
+      <dgm:prSet presAssocID="{8017E421-4010-47DD-B3A2-150D7F01784C}" presName="Name37" presStyleLbl="parChTrans1D2" presStyleIdx="8" presStyleCnt="11"/>
       <dgm:spPr/>
       <dgm:t>
         <a:bodyPr/>
@@ -5205,8 +5185,24 @@
         </a:p>
       </dgm:t>
     </dgm:pt>
-    <dgm:pt modelId="{54823B34-9DA0-498C-B771-985D797ABA89}" type="pres">
-      <dgm:prSet presAssocID="{02E8AF3B-DB86-4F9A-8D46-27D7319E4BB8}" presName="rootConnector" presStyleLbl="node2" presStyleIdx="8" presStyleCnt="9"/>
+    <dgm:pt modelId="{3A2FEFD5-F1ED-4536-BEE9-E10E554A74B2}" type="pres">
+      <dgm:prSet presAssocID="{02E8AF3B-DB86-4F9A-8D46-27D7319E4BB8}" presName="hierRoot2" presStyleCnt="0">
+        <dgm:presLayoutVars>
+          <dgm:hierBranch val="init"/>
+        </dgm:presLayoutVars>
+      </dgm:prSet>
+      <dgm:spPr/>
+    </dgm:pt>
+    <dgm:pt modelId="{F027BF0B-8C50-46A2-89C8-C9AF1F8B7553}" type="pres">
+      <dgm:prSet presAssocID="{02E8AF3B-DB86-4F9A-8D46-27D7319E4BB8}" presName="rootComposite" presStyleCnt="0"/>
+      <dgm:spPr/>
+    </dgm:pt>
+    <dgm:pt modelId="{0A9A1E76-FE42-4D99-8E38-8C153C3BEC71}" type="pres">
+      <dgm:prSet presAssocID="{02E8AF3B-DB86-4F9A-8D46-27D7319E4BB8}" presName="rootText" presStyleLbl="node2" presStyleIdx="8" presStyleCnt="9">
+        <dgm:presLayoutVars>
+          <dgm:chPref val="3"/>
+        </dgm:presLayoutVars>
+      </dgm:prSet>
       <dgm:spPr/>
       <dgm:t>
         <a:bodyPr/>
@@ -5216,20 +5212,8 @@
         </a:p>
       </dgm:t>
     </dgm:pt>
-    <dgm:pt modelId="{6ED0094D-D384-47D1-A3DD-C2D120BE0417}" type="pres">
-      <dgm:prSet presAssocID="{02E8AF3B-DB86-4F9A-8D46-27D7319E4BB8}" presName="hierChild4" presStyleCnt="0"/>
-      <dgm:spPr/>
-    </dgm:pt>
-    <dgm:pt modelId="{F3213785-4314-4A2C-AED5-1038B88C8BEC}" type="pres">
-      <dgm:prSet presAssocID="{02E8AF3B-DB86-4F9A-8D46-27D7319E4BB8}" presName="hierChild5" presStyleCnt="0"/>
-      <dgm:spPr/>
-    </dgm:pt>
-    <dgm:pt modelId="{1C6BA4D2-F28C-4E72-9F28-088FF98A2C33}" type="pres">
-      <dgm:prSet presAssocID="{0274927B-4160-4899-AF19-9671AA211A2B}" presName="hierChild3" presStyleCnt="0"/>
-      <dgm:spPr/>
-    </dgm:pt>
-    <dgm:pt modelId="{FAA0A73B-BE57-4EBF-BC6E-02688DD94992}" type="pres">
-      <dgm:prSet presAssocID="{EF945DD0-6504-45B1-B65D-422FF7CEE416}" presName="Name111" presStyleLbl="parChTrans1D2" presStyleIdx="9" presStyleCnt="11"/>
+    <dgm:pt modelId="{54823B34-9DA0-498C-B771-985D797ABA89}" type="pres">
+      <dgm:prSet presAssocID="{02E8AF3B-DB86-4F9A-8D46-27D7319E4BB8}" presName="rootConnector" presStyleLbl="node2" presStyleIdx="8" presStyleCnt="9"/>
       <dgm:spPr/>
       <dgm:t>
         <a:bodyPr/>
@@ -5239,24 +5223,20 @@
         </a:p>
       </dgm:t>
     </dgm:pt>
-    <dgm:pt modelId="{83AB74E6-E702-4C1C-B220-F5629BD9DFBB}" type="pres">
-      <dgm:prSet presAssocID="{FDC9F48B-2A97-42BB-A94D-14DD284B616A}" presName="hierRoot3" presStyleCnt="0">
-        <dgm:presLayoutVars>
-          <dgm:hierBranch val="init"/>
-        </dgm:presLayoutVars>
-      </dgm:prSet>
-      <dgm:spPr/>
-    </dgm:pt>
-    <dgm:pt modelId="{B0A0B2F8-DC1D-40D8-84F3-E973F0AFD2A4}" type="pres">
-      <dgm:prSet presAssocID="{FDC9F48B-2A97-42BB-A94D-14DD284B616A}" presName="rootComposite3" presStyleCnt="0"/>
-      <dgm:spPr/>
-    </dgm:pt>
-    <dgm:pt modelId="{96A2D62A-7231-40B0-A064-11231D9FBD36}" type="pres">
-      <dgm:prSet presAssocID="{FDC9F48B-2A97-42BB-A94D-14DD284B616A}" presName="rootText3" presStyleLbl="asst1" presStyleIdx="0" presStyleCnt="2">
-        <dgm:presLayoutVars>
-          <dgm:chPref val="3"/>
-        </dgm:presLayoutVars>
-      </dgm:prSet>
+    <dgm:pt modelId="{6ED0094D-D384-47D1-A3DD-C2D120BE0417}" type="pres">
+      <dgm:prSet presAssocID="{02E8AF3B-DB86-4F9A-8D46-27D7319E4BB8}" presName="hierChild4" presStyleCnt="0"/>
+      <dgm:spPr/>
+    </dgm:pt>
+    <dgm:pt modelId="{F3213785-4314-4A2C-AED5-1038B88C8BEC}" type="pres">
+      <dgm:prSet presAssocID="{02E8AF3B-DB86-4F9A-8D46-27D7319E4BB8}" presName="hierChild5" presStyleCnt="0"/>
+      <dgm:spPr/>
+    </dgm:pt>
+    <dgm:pt modelId="{1C6BA4D2-F28C-4E72-9F28-088FF98A2C33}" type="pres">
+      <dgm:prSet presAssocID="{0274927B-4160-4899-AF19-9671AA211A2B}" presName="hierChild3" presStyleCnt="0"/>
+      <dgm:spPr/>
+    </dgm:pt>
+    <dgm:pt modelId="{FAA0A73B-BE57-4EBF-BC6E-02688DD94992}" type="pres">
+      <dgm:prSet presAssocID="{EF945DD0-6504-45B1-B65D-422FF7CEE416}" presName="Name111" presStyleLbl="parChTrans1D2" presStyleIdx="9" presStyleCnt="11"/>
       <dgm:spPr/>
       <dgm:t>
         <a:bodyPr/>
@@ -5266,8 +5246,24 @@
         </a:p>
       </dgm:t>
     </dgm:pt>
-    <dgm:pt modelId="{604E9955-A4D8-4EF3-AB62-04F2B6924221}" type="pres">
-      <dgm:prSet presAssocID="{FDC9F48B-2A97-42BB-A94D-14DD284B616A}" presName="rootConnector3" presStyleLbl="asst1" presStyleIdx="0" presStyleCnt="2"/>
+    <dgm:pt modelId="{83AB74E6-E702-4C1C-B220-F5629BD9DFBB}" type="pres">
+      <dgm:prSet presAssocID="{FDC9F48B-2A97-42BB-A94D-14DD284B616A}" presName="hierRoot3" presStyleCnt="0">
+        <dgm:presLayoutVars>
+          <dgm:hierBranch val="init"/>
+        </dgm:presLayoutVars>
+      </dgm:prSet>
+      <dgm:spPr/>
+    </dgm:pt>
+    <dgm:pt modelId="{B0A0B2F8-DC1D-40D8-84F3-E973F0AFD2A4}" type="pres">
+      <dgm:prSet presAssocID="{FDC9F48B-2A97-42BB-A94D-14DD284B616A}" presName="rootComposite3" presStyleCnt="0"/>
+      <dgm:spPr/>
+    </dgm:pt>
+    <dgm:pt modelId="{96A2D62A-7231-40B0-A064-11231D9FBD36}" type="pres">
+      <dgm:prSet presAssocID="{FDC9F48B-2A97-42BB-A94D-14DD284B616A}" presName="rootText3" presStyleLbl="asst1" presStyleIdx="0" presStyleCnt="2">
+        <dgm:presLayoutVars>
+          <dgm:chPref val="3"/>
+        </dgm:presLayoutVars>
+      </dgm:prSet>
       <dgm:spPr/>
       <dgm:t>
         <a:bodyPr/>
@@ -5277,16 +5273,8 @@
         </a:p>
       </dgm:t>
     </dgm:pt>
-    <dgm:pt modelId="{BED3382D-ECB2-4AC4-A267-94BF200C899C}" type="pres">
-      <dgm:prSet presAssocID="{FDC9F48B-2A97-42BB-A94D-14DD284B616A}" presName="hierChild6" presStyleCnt="0"/>
-      <dgm:spPr/>
-    </dgm:pt>
-    <dgm:pt modelId="{1B324C91-D76E-4B52-ABDE-EC18B0C5A2FE}" type="pres">
-      <dgm:prSet presAssocID="{FDC9F48B-2A97-42BB-A94D-14DD284B616A}" presName="hierChild7" presStyleCnt="0"/>
-      <dgm:spPr/>
-    </dgm:pt>
-    <dgm:pt modelId="{50B91C8F-9633-4F9D-970A-524716897861}" type="pres">
-      <dgm:prSet presAssocID="{E51BC5A4-9C0D-4258-B89D-D0AE1ABE08D8}" presName="Name111" presStyleLbl="parChTrans1D2" presStyleIdx="10" presStyleCnt="11"/>
+    <dgm:pt modelId="{604E9955-A4D8-4EF3-AB62-04F2B6924221}" type="pres">
+      <dgm:prSet presAssocID="{FDC9F48B-2A97-42BB-A94D-14DD284B616A}" presName="rootConnector3" presStyleLbl="asst1" presStyleIdx="0" presStyleCnt="2"/>
       <dgm:spPr/>
       <dgm:t>
         <a:bodyPr/>
@@ -5296,24 +5284,16 @@
         </a:p>
       </dgm:t>
     </dgm:pt>
-    <dgm:pt modelId="{77F30843-CD0E-419D-9FA8-B978A698CAA8}" type="pres">
-      <dgm:prSet presAssocID="{832D0428-C81C-4895-8335-E8EDA9233ED3}" presName="hierRoot3" presStyleCnt="0">
-        <dgm:presLayoutVars>
-          <dgm:hierBranch val="init"/>
-        </dgm:presLayoutVars>
-      </dgm:prSet>
-      <dgm:spPr/>
-    </dgm:pt>
-    <dgm:pt modelId="{0497B117-E244-400E-A65B-92E87F8B7F97}" type="pres">
-      <dgm:prSet presAssocID="{832D0428-C81C-4895-8335-E8EDA9233ED3}" presName="rootComposite3" presStyleCnt="0"/>
-      <dgm:spPr/>
-    </dgm:pt>
-    <dgm:pt modelId="{E5E7503A-7612-4B0C-A329-AB0202849CA8}" type="pres">
-      <dgm:prSet presAssocID="{832D0428-C81C-4895-8335-E8EDA9233ED3}" presName="rootText3" presStyleLbl="asst1" presStyleIdx="1" presStyleCnt="2" custScaleX="128457">
-        <dgm:presLayoutVars>
-          <dgm:chPref val="3"/>
-        </dgm:presLayoutVars>
-      </dgm:prSet>
+    <dgm:pt modelId="{BED3382D-ECB2-4AC4-A267-94BF200C899C}" type="pres">
+      <dgm:prSet presAssocID="{FDC9F48B-2A97-42BB-A94D-14DD284B616A}" presName="hierChild6" presStyleCnt="0"/>
+      <dgm:spPr/>
+    </dgm:pt>
+    <dgm:pt modelId="{1B324C91-D76E-4B52-ABDE-EC18B0C5A2FE}" type="pres">
+      <dgm:prSet presAssocID="{FDC9F48B-2A97-42BB-A94D-14DD284B616A}" presName="hierChild7" presStyleCnt="0"/>
+      <dgm:spPr/>
+    </dgm:pt>
+    <dgm:pt modelId="{50B91C8F-9633-4F9D-970A-524716897861}" type="pres">
+      <dgm:prSet presAssocID="{E51BC5A4-9C0D-4258-B89D-D0AE1ABE08D8}" presName="Name111" presStyleLbl="parChTrans1D2" presStyleIdx="10" presStyleCnt="11"/>
       <dgm:spPr/>
       <dgm:t>
         <a:bodyPr/>
@@ -5323,8 +5303,24 @@
         </a:p>
       </dgm:t>
     </dgm:pt>
-    <dgm:pt modelId="{149078CD-1B5B-412D-A0CE-202071623540}" type="pres">
-      <dgm:prSet presAssocID="{832D0428-C81C-4895-8335-E8EDA9233ED3}" presName="rootConnector3" presStyleLbl="asst1" presStyleIdx="1" presStyleCnt="2"/>
+    <dgm:pt modelId="{77F30843-CD0E-419D-9FA8-B978A698CAA8}" type="pres">
+      <dgm:prSet presAssocID="{832D0428-C81C-4895-8335-E8EDA9233ED3}" presName="hierRoot3" presStyleCnt="0">
+        <dgm:presLayoutVars>
+          <dgm:hierBranch val="init"/>
+        </dgm:presLayoutVars>
+      </dgm:prSet>
+      <dgm:spPr/>
+    </dgm:pt>
+    <dgm:pt modelId="{0497B117-E244-400E-A65B-92E87F8B7F97}" type="pres">
+      <dgm:prSet presAssocID="{832D0428-C81C-4895-8335-E8EDA9233ED3}" presName="rootComposite3" presStyleCnt="0"/>
+      <dgm:spPr/>
+    </dgm:pt>
+    <dgm:pt modelId="{E5E7503A-7612-4B0C-A329-AB0202849CA8}" type="pres">
+      <dgm:prSet presAssocID="{832D0428-C81C-4895-8335-E8EDA9233ED3}" presName="rootText3" presStyleLbl="asst1" presStyleIdx="1" presStyleCnt="2" custScaleX="128457">
+        <dgm:presLayoutVars>
+          <dgm:chPref val="3"/>
+        </dgm:presLayoutVars>
+      </dgm:prSet>
       <dgm:spPr/>
       <dgm:t>
         <a:bodyPr/>
@@ -5334,32 +5330,8 @@
         </a:p>
       </dgm:t>
     </dgm:pt>
-    <dgm:pt modelId="{8E8B7D85-5001-4717-BDA3-E4D9D9A000DB}" type="pres">
-      <dgm:prSet presAssocID="{832D0428-C81C-4895-8335-E8EDA9233ED3}" presName="hierChild6" presStyleCnt="0"/>
-      <dgm:spPr/>
-    </dgm:pt>
-    <dgm:pt modelId="{EF071D07-FA91-43BB-BD43-9E00BD381CAB}" type="pres">
-      <dgm:prSet presAssocID="{832D0428-C81C-4895-8335-E8EDA9233ED3}" presName="hierChild7" presStyleCnt="0"/>
-      <dgm:spPr/>
-    </dgm:pt>
-    <dgm:pt modelId="{17674B7A-6587-4DC4-A9DE-CB1967A30F82}" type="pres">
-      <dgm:prSet presAssocID="{C4DD8EDD-E995-4C25-AFF8-F83A3553FAF9}" presName="hierRoot1" presStyleCnt="0">
-        <dgm:presLayoutVars>
-          <dgm:hierBranch val="init"/>
-        </dgm:presLayoutVars>
-      </dgm:prSet>
-      <dgm:spPr/>
-    </dgm:pt>
-    <dgm:pt modelId="{579C5BB3-5D7A-4196-BF46-778DB623D8BB}" type="pres">
-      <dgm:prSet presAssocID="{C4DD8EDD-E995-4C25-AFF8-F83A3553FAF9}" presName="rootComposite1" presStyleCnt="0"/>
-      <dgm:spPr/>
-    </dgm:pt>
-    <dgm:pt modelId="{234957EB-CEAB-4D64-9578-75C67240B327}" type="pres">
-      <dgm:prSet presAssocID="{C4DD8EDD-E995-4C25-AFF8-F83A3553FAF9}" presName="rootText1" presStyleLbl="node0" presStyleIdx="1" presStyleCnt="4" custLinFactY="593831" custLinFactNeighborX="96942" custLinFactNeighborY="600000">
-        <dgm:presLayoutVars>
-          <dgm:chPref val="3"/>
-        </dgm:presLayoutVars>
-      </dgm:prSet>
+    <dgm:pt modelId="{149078CD-1B5B-412D-A0CE-202071623540}" type="pres">
+      <dgm:prSet presAssocID="{832D0428-C81C-4895-8335-E8EDA9233ED3}" presName="rootConnector3" presStyleLbl="asst1" presStyleIdx="1" presStyleCnt="2"/>
       <dgm:spPr/>
       <dgm:t>
         <a:bodyPr/>
@@ -5369,8 +5341,32 @@
         </a:p>
       </dgm:t>
     </dgm:pt>
-    <dgm:pt modelId="{5D30D3E5-3448-4B85-9084-9844DD694E7F}" type="pres">
-      <dgm:prSet presAssocID="{C4DD8EDD-E995-4C25-AFF8-F83A3553FAF9}" presName="rootConnector1" presStyleLbl="node1" presStyleIdx="0" presStyleCnt="0"/>
+    <dgm:pt modelId="{8E8B7D85-5001-4717-BDA3-E4D9D9A000DB}" type="pres">
+      <dgm:prSet presAssocID="{832D0428-C81C-4895-8335-E8EDA9233ED3}" presName="hierChild6" presStyleCnt="0"/>
+      <dgm:spPr/>
+    </dgm:pt>
+    <dgm:pt modelId="{EF071D07-FA91-43BB-BD43-9E00BD381CAB}" type="pres">
+      <dgm:prSet presAssocID="{832D0428-C81C-4895-8335-E8EDA9233ED3}" presName="hierChild7" presStyleCnt="0"/>
+      <dgm:spPr/>
+    </dgm:pt>
+    <dgm:pt modelId="{17674B7A-6587-4DC4-A9DE-CB1967A30F82}" type="pres">
+      <dgm:prSet presAssocID="{C4DD8EDD-E995-4C25-AFF8-F83A3553FAF9}" presName="hierRoot1" presStyleCnt="0">
+        <dgm:presLayoutVars>
+          <dgm:hierBranch val="init"/>
+        </dgm:presLayoutVars>
+      </dgm:prSet>
+      <dgm:spPr/>
+    </dgm:pt>
+    <dgm:pt modelId="{579C5BB3-5D7A-4196-BF46-778DB623D8BB}" type="pres">
+      <dgm:prSet presAssocID="{C4DD8EDD-E995-4C25-AFF8-F83A3553FAF9}" presName="rootComposite1" presStyleCnt="0"/>
+      <dgm:spPr/>
+    </dgm:pt>
+    <dgm:pt modelId="{234957EB-CEAB-4D64-9578-75C67240B327}" type="pres">
+      <dgm:prSet presAssocID="{C4DD8EDD-E995-4C25-AFF8-F83A3553FAF9}" presName="rootText1" presStyleLbl="node0" presStyleIdx="1" presStyleCnt="4" custLinFactY="593831" custLinFactNeighborX="96942" custLinFactNeighborY="600000">
+        <dgm:presLayoutVars>
+          <dgm:chPref val="3"/>
+        </dgm:presLayoutVars>
+      </dgm:prSet>
       <dgm:spPr/>
       <dgm:t>
         <a:bodyPr/>
@@ -5380,32 +5376,8 @@
         </a:p>
       </dgm:t>
     </dgm:pt>
-    <dgm:pt modelId="{AD7FB035-350C-450B-9470-79E55EFBFD5A}" type="pres">
-      <dgm:prSet presAssocID="{C4DD8EDD-E995-4C25-AFF8-F83A3553FAF9}" presName="hierChild2" presStyleCnt="0"/>
-      <dgm:spPr/>
-    </dgm:pt>
-    <dgm:pt modelId="{5823C67D-8D40-456A-8292-E20407F43290}" type="pres">
-      <dgm:prSet presAssocID="{C4DD8EDD-E995-4C25-AFF8-F83A3553FAF9}" presName="hierChild3" presStyleCnt="0"/>
-      <dgm:spPr/>
-    </dgm:pt>
-    <dgm:pt modelId="{42383659-BD8A-4D5E-A0B4-3C54F9BC30F0}" type="pres">
-      <dgm:prSet presAssocID="{99D9C4F3-84D0-4398-BA5C-83FCBD76B890}" presName="hierRoot1" presStyleCnt="0">
-        <dgm:presLayoutVars>
-          <dgm:hierBranch val="init"/>
-        </dgm:presLayoutVars>
-      </dgm:prSet>
-      <dgm:spPr/>
-    </dgm:pt>
-    <dgm:pt modelId="{419B1590-31D3-4AB3-B96F-8BBD6CEACBD2}" type="pres">
-      <dgm:prSet presAssocID="{99D9C4F3-84D0-4398-BA5C-83FCBD76B890}" presName="rootComposite1" presStyleCnt="0"/>
-      <dgm:spPr/>
-    </dgm:pt>
-    <dgm:pt modelId="{C4B0F77B-E2E0-457D-812E-29E9BE3E4085}" type="pres">
-      <dgm:prSet presAssocID="{99D9C4F3-84D0-4398-BA5C-83FCBD76B890}" presName="rootText1" presStyleLbl="node0" presStyleIdx="2" presStyleCnt="4" custLinFactX="2668" custLinFactY="594360" custLinFactNeighborX="100000" custLinFactNeighborY="600000">
-        <dgm:presLayoutVars>
-          <dgm:chPref val="3"/>
-        </dgm:presLayoutVars>
-      </dgm:prSet>
+    <dgm:pt modelId="{5D30D3E5-3448-4B85-9084-9844DD694E7F}" type="pres">
+      <dgm:prSet presAssocID="{C4DD8EDD-E995-4C25-AFF8-F83A3553FAF9}" presName="rootConnector1" presStyleLbl="node1" presStyleIdx="0" presStyleCnt="0"/>
       <dgm:spPr/>
       <dgm:t>
         <a:bodyPr/>
@@ -5415,8 +5387,32 @@
         </a:p>
       </dgm:t>
     </dgm:pt>
-    <dgm:pt modelId="{17805C60-C0CE-46BF-BA01-F8C5D9F70B79}" type="pres">
-      <dgm:prSet presAssocID="{99D9C4F3-84D0-4398-BA5C-83FCBD76B890}" presName="rootConnector1" presStyleLbl="node1" presStyleIdx="0" presStyleCnt="0"/>
+    <dgm:pt modelId="{AD7FB035-350C-450B-9470-79E55EFBFD5A}" type="pres">
+      <dgm:prSet presAssocID="{C4DD8EDD-E995-4C25-AFF8-F83A3553FAF9}" presName="hierChild2" presStyleCnt="0"/>
+      <dgm:spPr/>
+    </dgm:pt>
+    <dgm:pt modelId="{5823C67D-8D40-456A-8292-E20407F43290}" type="pres">
+      <dgm:prSet presAssocID="{C4DD8EDD-E995-4C25-AFF8-F83A3553FAF9}" presName="hierChild3" presStyleCnt="0"/>
+      <dgm:spPr/>
+    </dgm:pt>
+    <dgm:pt modelId="{42383659-BD8A-4D5E-A0B4-3C54F9BC30F0}" type="pres">
+      <dgm:prSet presAssocID="{99D9C4F3-84D0-4398-BA5C-83FCBD76B890}" presName="hierRoot1" presStyleCnt="0">
+        <dgm:presLayoutVars>
+          <dgm:hierBranch val="init"/>
+        </dgm:presLayoutVars>
+      </dgm:prSet>
+      <dgm:spPr/>
+    </dgm:pt>
+    <dgm:pt modelId="{419B1590-31D3-4AB3-B96F-8BBD6CEACBD2}" type="pres">
+      <dgm:prSet presAssocID="{99D9C4F3-84D0-4398-BA5C-83FCBD76B890}" presName="rootComposite1" presStyleCnt="0"/>
+      <dgm:spPr/>
+    </dgm:pt>
+    <dgm:pt modelId="{C4B0F77B-E2E0-457D-812E-29E9BE3E4085}" type="pres">
+      <dgm:prSet presAssocID="{99D9C4F3-84D0-4398-BA5C-83FCBD76B890}" presName="rootText1" presStyleLbl="node0" presStyleIdx="2" presStyleCnt="4" custLinFactX="2668" custLinFactY="594360" custLinFactNeighborX="100000" custLinFactNeighborY="600000">
+        <dgm:presLayoutVars>
+          <dgm:chPref val="3"/>
+        </dgm:presLayoutVars>
+      </dgm:prSet>
       <dgm:spPr/>
       <dgm:t>
         <a:bodyPr/>
@@ -5426,32 +5422,8 @@
         </a:p>
       </dgm:t>
     </dgm:pt>
-    <dgm:pt modelId="{D3550D3A-B726-4881-859A-D1FB5A448279}" type="pres">
-      <dgm:prSet presAssocID="{99D9C4F3-84D0-4398-BA5C-83FCBD76B890}" presName="hierChild2" presStyleCnt="0"/>
-      <dgm:spPr/>
-    </dgm:pt>
-    <dgm:pt modelId="{8F72FE43-F752-4814-BE5E-E968BF300466}" type="pres">
-      <dgm:prSet presAssocID="{99D9C4F3-84D0-4398-BA5C-83FCBD76B890}" presName="hierChild3" presStyleCnt="0"/>
-      <dgm:spPr/>
-    </dgm:pt>
-    <dgm:pt modelId="{F59D48A0-D306-46AE-8AF8-909D59CA2703}" type="pres">
-      <dgm:prSet presAssocID="{CF2D02B9-0D4C-438A-9A09-36265FCD126F}" presName="hierRoot1" presStyleCnt="0">
-        <dgm:presLayoutVars>
-          <dgm:hierBranch val="init"/>
-        </dgm:presLayoutVars>
-      </dgm:prSet>
-      <dgm:spPr/>
-    </dgm:pt>
-    <dgm:pt modelId="{2C9156BF-48DC-4A17-B7D9-2BC2C6BE0360}" type="pres">
-      <dgm:prSet presAssocID="{CF2D02B9-0D4C-438A-9A09-36265FCD126F}" presName="rootComposite1" presStyleCnt="0"/>
-      <dgm:spPr/>
-    </dgm:pt>
-    <dgm:pt modelId="{DC286486-1041-4CF2-B1D9-ED9F8D4CAF4B}" type="pres">
-      <dgm:prSet presAssocID="{CF2D02B9-0D4C-438A-9A09-36265FCD126F}" presName="rootText1" presStyleLbl="node0" presStyleIdx="3" presStyleCnt="4" custLinFactX="-100000" custLinFactY="598886" custLinFactNeighborX="-167789" custLinFactNeighborY="600000">
-        <dgm:presLayoutVars>
-          <dgm:chPref val="3"/>
-        </dgm:presLayoutVars>
-      </dgm:prSet>
+    <dgm:pt modelId="{17805C60-C0CE-46BF-BA01-F8C5D9F70B79}" type="pres">
+      <dgm:prSet presAssocID="{99D9C4F3-84D0-4398-BA5C-83FCBD76B890}" presName="rootConnector1" presStyleLbl="node1" presStyleIdx="0" presStyleCnt="0"/>
       <dgm:spPr/>
       <dgm:t>
         <a:bodyPr/>
@@ -5461,8 +5433,32 @@
         </a:p>
       </dgm:t>
     </dgm:pt>
-    <dgm:pt modelId="{D5DB1BF8-7727-41DB-8711-7758CBC1CD9E}" type="pres">
-      <dgm:prSet presAssocID="{CF2D02B9-0D4C-438A-9A09-36265FCD126F}" presName="rootConnector1" presStyleLbl="node1" presStyleIdx="0" presStyleCnt="0"/>
+    <dgm:pt modelId="{D3550D3A-B726-4881-859A-D1FB5A448279}" type="pres">
+      <dgm:prSet presAssocID="{99D9C4F3-84D0-4398-BA5C-83FCBD76B890}" presName="hierChild2" presStyleCnt="0"/>
+      <dgm:spPr/>
+    </dgm:pt>
+    <dgm:pt modelId="{8F72FE43-F752-4814-BE5E-E968BF300466}" type="pres">
+      <dgm:prSet presAssocID="{99D9C4F3-84D0-4398-BA5C-83FCBD76B890}" presName="hierChild3" presStyleCnt="0"/>
+      <dgm:spPr/>
+    </dgm:pt>
+    <dgm:pt modelId="{F59D48A0-D306-46AE-8AF8-909D59CA2703}" type="pres">
+      <dgm:prSet presAssocID="{CF2D02B9-0D4C-438A-9A09-36265FCD126F}" presName="hierRoot1" presStyleCnt="0">
+        <dgm:presLayoutVars>
+          <dgm:hierBranch val="init"/>
+        </dgm:presLayoutVars>
+      </dgm:prSet>
+      <dgm:spPr/>
+    </dgm:pt>
+    <dgm:pt modelId="{2C9156BF-48DC-4A17-B7D9-2BC2C6BE0360}" type="pres">
+      <dgm:prSet presAssocID="{CF2D02B9-0D4C-438A-9A09-36265FCD126F}" presName="rootComposite1" presStyleCnt="0"/>
+      <dgm:spPr/>
+    </dgm:pt>
+    <dgm:pt modelId="{DC286486-1041-4CF2-B1D9-ED9F8D4CAF4B}" type="pres">
+      <dgm:prSet presAssocID="{CF2D02B9-0D4C-438A-9A09-36265FCD126F}" presName="rootText1" presStyleLbl="node0" presStyleIdx="3" presStyleCnt="4" custLinFactX="-100000" custLinFactY="598886" custLinFactNeighborX="-167789" custLinFactNeighborY="600000">
+        <dgm:presLayoutVars>
+          <dgm:chPref val="3"/>
+        </dgm:presLayoutVars>
+      </dgm:prSet>
       <dgm:spPr/>
       <dgm:t>
         <a:bodyPr/>
@@ -5472,6 +5468,17 @@
         </a:p>
       </dgm:t>
     </dgm:pt>
+    <dgm:pt modelId="{D5DB1BF8-7727-41DB-8711-7758CBC1CD9E}" type="pres">
+      <dgm:prSet presAssocID="{CF2D02B9-0D4C-438A-9A09-36265FCD126F}" presName="rootConnector1" presStyleLbl="node1" presStyleIdx="0" presStyleCnt="0"/>
+      <dgm:spPr/>
+      <dgm:t>
+        <a:bodyPr/>
+        <a:lstStyle/>
+        <a:p>
+          <a:endParaRPr lang="en-US"/>
+        </a:p>
+      </dgm:t>
+    </dgm:pt>
     <dgm:pt modelId="{0CD5EC87-2CD7-4B11-AE5D-880A11810AB4}" type="pres">
       <dgm:prSet presAssocID="{CF2D02B9-0D4C-438A-9A09-36265FCD126F}" presName="hierChild2" presStyleCnt="0"/>
       <dgm:spPr/>
@@ -5482,151 +5489,151 @@
     </dgm:pt>
   </dgm:ptLst>
   <dgm:cxnLst>
+    <dgm:cxn modelId="{AF9C2987-1FBD-4546-AB70-7201AEAE8C72}" srcId="{0274927B-4160-4899-AF19-9671AA211A2B}" destId="{AB43DBA9-F5B3-4C40-82BF-D52A96D425F7}" srcOrd="6" destOrd="0" parTransId="{EE9E4C87-A11C-4304-96D9-18778AF7F28E}" sibTransId="{031A4502-0573-45B7-8D70-8DD44E424834}"/>
+    <dgm:cxn modelId="{280CB2AA-B792-4FC9-B95A-A2192FE6994E}" type="presOf" srcId="{2FD0ACBE-A9EE-439B-BDD7-7D04768F5ECB}" destId="{A135AE1E-C7DE-4D38-BF64-3DB4EBB55480}" srcOrd="1" destOrd="0" presId="urn:microsoft.com/office/officeart/2005/8/layout/orgChart1"/>
+    <dgm:cxn modelId="{6B0B129A-52DC-4084-9437-E590BB7F8029}" type="presOf" srcId="{3F86936B-1FD6-48A0-A250-2B1EB4CB5592}" destId="{95757365-1776-4A05-B177-ECC651A46341}" srcOrd="0" destOrd="0" presId="urn:microsoft.com/office/officeart/2005/8/layout/orgChart1"/>
+    <dgm:cxn modelId="{53F59307-5FBF-422B-9F83-0D71C87A73DC}" type="presOf" srcId="{1E3ABECC-8D21-4FCF-8F22-4047954C6620}" destId="{D27660A4-8C22-4AA8-8F93-D6A250C1942F}" srcOrd="1" destOrd="0" presId="urn:microsoft.com/office/officeart/2005/8/layout/orgChart1"/>
+    <dgm:cxn modelId="{36BDA124-864F-43FE-B765-FA109A9C0381}" srcId="{3045B1B2-DC0A-4607-ACC9-6EA0209878F6}" destId="{5C8EBEB2-45CA-4875-B2C1-3A80FFD2AC67}" srcOrd="0" destOrd="0" parTransId="{AA3915FE-4491-42CC-A1AF-70CBC148FF59}" sibTransId="{87CF262D-40B1-4CCD-A406-357431074C01}"/>
+    <dgm:cxn modelId="{1802E59F-02B8-4C9A-87ED-078267E1EDF2}" type="presOf" srcId="{A6569C1B-F779-4BE0-969E-A2AFB0425B84}" destId="{58FCFA12-57FF-4DDE-AA78-FD5F24D44BE5}" srcOrd="0" destOrd="0" presId="urn:microsoft.com/office/officeart/2005/8/layout/orgChart1"/>
+    <dgm:cxn modelId="{40727FD1-EDC9-4821-8A49-2C9BA11CC666}" type="presOf" srcId="{49114A9B-D2E0-4713-9DBF-1B7318FD9E27}" destId="{E3166F7C-DF17-441D-9FD5-AE90B21D5054}" srcOrd="0" destOrd="0" presId="urn:microsoft.com/office/officeart/2005/8/layout/orgChart1"/>
+    <dgm:cxn modelId="{61DCE5D3-7B15-4938-B75E-022005639926}" type="presOf" srcId="{AB43DBA9-F5B3-4C40-82BF-D52A96D425F7}" destId="{E3E0D748-1710-4B33-AF18-2F3C83F11CF1}" srcOrd="0" destOrd="0" presId="urn:microsoft.com/office/officeart/2005/8/layout/orgChart1"/>
+    <dgm:cxn modelId="{7E87572C-AE05-4E5D-93DE-CE05C6D95BF6}" type="presOf" srcId="{13F23037-5BD1-4678-8671-2EBB7A37F8AB}" destId="{4E5E3395-7D78-4F0F-8BA4-0CA66D4382A3}" srcOrd="0" destOrd="0" presId="urn:microsoft.com/office/officeart/2005/8/layout/orgChart1"/>
+    <dgm:cxn modelId="{B18964CA-6A07-4F6B-ABAD-30855C061384}" type="presOf" srcId="{A326D562-FC53-441D-9269-0AED7029A99A}" destId="{CFFDF423-B662-42D5-91DA-0A745D4CA88E}" srcOrd="0" destOrd="0" presId="urn:microsoft.com/office/officeart/2005/8/layout/orgChart1"/>
+    <dgm:cxn modelId="{1F992E74-4AA4-49BC-9BFB-4C4D6129C73B}" type="presOf" srcId="{6D36762B-FB57-4DEA-90CD-3F097F4D25CC}" destId="{D9ED388C-CEBD-4853-9A3E-C27037FF2C56}" srcOrd="1" destOrd="0" presId="urn:microsoft.com/office/officeart/2005/8/layout/orgChart1"/>
+    <dgm:cxn modelId="{BE3C66EF-27B9-4A99-A1E5-D071DE70B0FA}" type="presOf" srcId="{6558A57C-4982-4A47-B2B2-8AABE7345991}" destId="{0845B1E8-7FE0-46CA-B690-B70A34907BDB}" srcOrd="0" destOrd="0" presId="urn:microsoft.com/office/officeart/2005/8/layout/orgChart1"/>
+    <dgm:cxn modelId="{6B133501-15D8-40A4-9695-7BA636A69B74}" type="presOf" srcId="{99D9C4F3-84D0-4398-BA5C-83FCBD76B890}" destId="{C4B0F77B-E2E0-457D-812E-29E9BE3E4085}" srcOrd="0" destOrd="0" presId="urn:microsoft.com/office/officeart/2005/8/layout/orgChart1"/>
+    <dgm:cxn modelId="{D6803FCC-8BE9-4C25-8FEB-644A34BA37A8}" type="presOf" srcId="{7C6E53BB-7621-4B9E-B8AB-2A5789109803}" destId="{90856F93-6928-4F29-A715-1CCE16DEB8CE}" srcOrd="0" destOrd="0" presId="urn:microsoft.com/office/officeart/2005/8/layout/orgChart1"/>
+    <dgm:cxn modelId="{43349553-738B-4624-AAC5-F2B0E85215DE}" type="presOf" srcId="{F841F772-F263-44DB-AF9F-DD29A8A41A82}" destId="{2F56B4D2-400A-48F1-9F86-328A9D96FD6A}" srcOrd="0" destOrd="0" presId="urn:microsoft.com/office/officeart/2005/8/layout/orgChart1"/>
+    <dgm:cxn modelId="{7DD2DEBE-FD31-42D9-853D-A07CDDFC492A}" srcId="{54F52B91-96F3-4A93-8C51-4A8BFBEDFA33}" destId="{A326D562-FC53-441D-9269-0AED7029A99A}" srcOrd="2" destOrd="0" parTransId="{B9B43DA7-88E6-405B-80FE-1DEC167B1B1B}" sibTransId="{E384CD7F-CCD7-4EBB-B2D8-242295143101}"/>
+    <dgm:cxn modelId="{BB2DD168-BA68-42B7-AEDE-DAA9596301E3}" type="presOf" srcId="{04BB0C87-6F2D-4619-8302-191948EC74A6}" destId="{D3CE8887-ABBE-448D-AE41-463E6DCE7983}" srcOrd="0" destOrd="0" presId="urn:microsoft.com/office/officeart/2005/8/layout/orgChart1"/>
+    <dgm:cxn modelId="{78EA6624-3522-420F-9F83-ADC799C17C7B}" type="presOf" srcId="{46D32E76-4D85-46E4-8C07-C66241E47DA0}" destId="{729B68CE-79E6-4786-9304-868050C8FA07}" srcOrd="1" destOrd="0" presId="urn:microsoft.com/office/officeart/2005/8/layout/orgChart1"/>
+    <dgm:cxn modelId="{0E65277F-B1FD-4670-8F8A-49D36F192805}" type="presOf" srcId="{9212E598-9C44-43E3-A9F6-848C3F7B98C6}" destId="{629D144A-42A8-455E-BD11-F11473E53343}" srcOrd="0" destOrd="0" presId="urn:microsoft.com/office/officeart/2005/8/layout/orgChart1"/>
+    <dgm:cxn modelId="{518D6E0E-2DD8-408C-8483-42E5D888A3AB}" type="presOf" srcId="{54F52B91-96F3-4A93-8C51-4A8BFBEDFA33}" destId="{C2459311-6B3C-4BB4-94D4-CB66B518FA25}" srcOrd="1" destOrd="0" presId="urn:microsoft.com/office/officeart/2005/8/layout/orgChart1"/>
+    <dgm:cxn modelId="{0CD540AE-8D9B-489A-9102-FF2CA51BFADA}" type="presOf" srcId="{6667787B-8278-48F1-A8AA-4BBEBED29AC7}" destId="{24DB76FC-FDBB-4AED-BE5A-4E4AE56E9F1D}" srcOrd="0" destOrd="0" presId="urn:microsoft.com/office/officeart/2005/8/layout/orgChart1"/>
+    <dgm:cxn modelId="{B25AD49F-A8A5-4677-B9E3-424D2A8FE749}" type="presOf" srcId="{EB3B4FD7-4B93-4B6A-85DA-411D4E46D809}" destId="{586BD3CC-D024-49AE-98A9-57447680C793}" srcOrd="1" destOrd="0" presId="urn:microsoft.com/office/officeart/2005/8/layout/orgChart1"/>
+    <dgm:cxn modelId="{3054077A-94E7-4869-B8D3-3D9AA04F5C7F}" srcId="{2FD0ACBE-A9EE-439B-BDD7-7D04768F5ECB}" destId="{1FD30924-7ED0-4217-A609-81C912422B24}" srcOrd="1" destOrd="0" parTransId="{6667787B-8278-48F1-A8AA-4BBEBED29AC7}" sibTransId="{020A0A2D-B354-4262-9D66-D305EF074DEE}"/>
+    <dgm:cxn modelId="{527572C4-BA8D-459B-B847-E6CF4746ED33}" type="presOf" srcId="{8B86F944-694A-43B9-BD2C-86002A138388}" destId="{97C1ADA8-C573-433C-A903-2B5AF2D11025}" srcOrd="0" destOrd="0" presId="urn:microsoft.com/office/officeart/2005/8/layout/orgChart1"/>
+    <dgm:cxn modelId="{43A0D668-0B81-488C-B539-E05FDD4B788A}" type="presOf" srcId="{463DAE48-7CE6-4E11-AAB1-77194570CA13}" destId="{613C03D6-7054-4B73-96F2-78EDD8671AF2}" srcOrd="0" destOrd="0" presId="urn:microsoft.com/office/officeart/2005/8/layout/orgChart1"/>
+    <dgm:cxn modelId="{A5EA83FC-7CE6-4554-9859-FE4AF4EBBBB5}" type="presOf" srcId="{BC73FEC3-7BE4-4F76-A05A-FAEB1EC6BC05}" destId="{1256D7E3-FC8E-4DD7-B64E-2DF45B28EE68}" srcOrd="0" destOrd="0" presId="urn:microsoft.com/office/officeart/2005/8/layout/orgChart1"/>
+    <dgm:cxn modelId="{F250EFAB-3D5D-4FEF-8D4E-D6E61CBEBAF5}" type="presOf" srcId="{0274927B-4160-4899-AF19-9671AA211A2B}" destId="{AE5434BE-0902-49D1-B577-6595F8254C60}" srcOrd="1" destOrd="0" presId="urn:microsoft.com/office/officeart/2005/8/layout/orgChart1"/>
+    <dgm:cxn modelId="{AAA020C6-E2F1-4FCD-97BC-637EFFB70E8B}" srcId="{B5CEA2D4-A899-4C2C-BA30-79C7F0302244}" destId="{A9751E97-5308-409A-BD37-D117ED6BF809}" srcOrd="0" destOrd="0" parTransId="{B76B37EA-7611-4BE2-8A94-945B0806F9F6}" sibTransId="{9222EC89-35DE-4ED9-8619-5ACD4F38A454}"/>
+    <dgm:cxn modelId="{36109025-B4F3-4D97-BA31-38ECFB40F4A5}" type="presOf" srcId="{8017E421-4010-47DD-B3A2-150D7F01784C}" destId="{E897A794-E666-4DCD-89D5-3E766B270427}" srcOrd="0" destOrd="0" presId="urn:microsoft.com/office/officeart/2005/8/layout/orgChart1"/>
+    <dgm:cxn modelId="{E5AE437C-EB5E-46FF-A189-983EA9FF4034}" type="presOf" srcId="{F841F772-F263-44DB-AF9F-DD29A8A41A82}" destId="{EAAC0396-F5F9-4F12-82E3-06CCEE8D8411}" srcOrd="1" destOrd="0" presId="urn:microsoft.com/office/officeart/2005/8/layout/orgChart1"/>
+    <dgm:cxn modelId="{59F2FBD6-66C2-4E8D-A375-86461048AC51}" type="presOf" srcId="{3F86936B-1FD6-48A0-A250-2B1EB4CB5592}" destId="{E522034E-B4F4-45A6-9472-9FE4651F335F}" srcOrd="1" destOrd="0" presId="urn:microsoft.com/office/officeart/2005/8/layout/orgChart1"/>
+    <dgm:cxn modelId="{0DA38FD3-749D-4ECE-816A-2908C2CA4D80}" type="presOf" srcId="{402192EA-635B-4E5A-BC30-CBA091CCA687}" destId="{831B417E-D813-4576-8428-B6F99D5216F6}" srcOrd="1" destOrd="0" presId="urn:microsoft.com/office/officeart/2005/8/layout/orgChart1"/>
+    <dgm:cxn modelId="{7DC2941D-E610-4BCD-8652-284A35A1A2DA}" type="presOf" srcId="{3045B1B2-DC0A-4607-ACC9-6EA0209878F6}" destId="{B6A114D4-4B75-4F1E-A379-E402CD10E6C4}" srcOrd="1" destOrd="0" presId="urn:microsoft.com/office/officeart/2005/8/layout/orgChart1"/>
+    <dgm:cxn modelId="{61693362-8410-413A-9868-FDD1E89B4DE9}" type="presOf" srcId="{B9B43DA7-88E6-405B-80FE-1DEC167B1B1B}" destId="{013CEFBA-B0C8-4E53-B75F-CB4965CD6E21}" srcOrd="0" destOrd="0" presId="urn:microsoft.com/office/officeart/2005/8/layout/orgChart1"/>
+    <dgm:cxn modelId="{D407C968-7B37-4AC5-BAE5-53670733AE77}" srcId="{0274927B-4160-4899-AF19-9671AA211A2B}" destId="{3045B1B2-DC0A-4607-ACC9-6EA0209878F6}" srcOrd="5" destOrd="0" parTransId="{FC3BE7C2-CAF1-4079-9560-5489769EFC27}" sibTransId="{7575C62C-8AC3-4892-8DE6-501D67B8487C}"/>
+    <dgm:cxn modelId="{6BAEB582-5EBC-485A-9375-D2CE48F60D85}" type="presOf" srcId="{CF2D02B9-0D4C-438A-9A09-36265FCD126F}" destId="{D5DB1BF8-7727-41DB-8711-7758CBC1CD9E}" srcOrd="1" destOrd="0" presId="urn:microsoft.com/office/officeart/2005/8/layout/orgChart1"/>
+    <dgm:cxn modelId="{FD8439C0-460D-44BA-AF2D-10C4B6C1F6AF}" type="presOf" srcId="{58F003E5-0E8F-43B2-BD78-8704859781FC}" destId="{D94F6F4E-3CAA-4D71-98C2-5B11B32EE224}" srcOrd="0" destOrd="0" presId="urn:microsoft.com/office/officeart/2005/8/layout/orgChart1"/>
+    <dgm:cxn modelId="{E5408A45-9A01-47D5-B725-662A37C3340C}" srcId="{CF25F756-588F-4C1B-9591-BB613EE272CB}" destId="{99D9C4F3-84D0-4398-BA5C-83FCBD76B890}" srcOrd="2" destOrd="0" parTransId="{3A25750F-ADFB-4D21-B8B6-684EEA04E5D7}" sibTransId="{F42F600E-F4EB-47EA-A759-12F2ADD0ABF2}"/>
+    <dgm:cxn modelId="{179D3951-A2E5-4513-B07E-23B095C14982}" type="presOf" srcId="{0514F8A1-4B60-46B1-9B43-60C5F0627DF1}" destId="{6FC30F81-EB7F-4DFC-9AA5-C2A37B459F04}" srcOrd="1" destOrd="0" presId="urn:microsoft.com/office/officeart/2005/8/layout/orgChart1"/>
+    <dgm:cxn modelId="{FA77575B-894E-4037-9F99-97EBC6037E6F}" type="presOf" srcId="{BD1DDD68-A030-4E56-A78C-C045A20D5260}" destId="{BBD8B560-3529-4560-B4F4-2FF262593363}" srcOrd="0" destOrd="0" presId="urn:microsoft.com/office/officeart/2005/8/layout/orgChart1"/>
+    <dgm:cxn modelId="{AD460318-43C5-4994-AC55-63F6BCC51449}" type="presOf" srcId="{115D3D74-8A9E-46A5-8E17-2DD64D5CC212}" destId="{6FFED9C4-696B-4ABA-A003-AB2F5D1066AB}" srcOrd="0" destOrd="0" presId="urn:microsoft.com/office/officeart/2005/8/layout/orgChart1"/>
+    <dgm:cxn modelId="{B95814A0-0E64-4BBB-8434-FF723E8A37AA}" type="presOf" srcId="{0514F8A1-4B60-46B1-9B43-60C5F0627DF1}" destId="{8A46CCD3-1595-4057-9247-6F1A420CF6FC}" srcOrd="0" destOrd="0" presId="urn:microsoft.com/office/officeart/2005/8/layout/orgChart1"/>
+    <dgm:cxn modelId="{CFF3F06F-4905-4450-9C76-4D3CC843071A}" type="presOf" srcId="{1707DDAA-FF7D-469D-B0BB-E186BF94AAE6}" destId="{9C2D6E1B-1D6A-40AE-936F-284B7321FF42}" srcOrd="0" destOrd="0" presId="urn:microsoft.com/office/officeart/2005/8/layout/orgChart1"/>
+    <dgm:cxn modelId="{67FE6518-7368-4E51-BA48-96033F8EDC4C}" type="presOf" srcId="{9212E598-9C44-43E3-A9F6-848C3F7B98C6}" destId="{62F83636-57B9-481E-B7D7-8B7EBC51A031}" srcOrd="1" destOrd="0" presId="urn:microsoft.com/office/officeart/2005/8/layout/orgChart1"/>
+    <dgm:cxn modelId="{E665BA21-7FE8-48B2-96CF-DB793048864E}" type="presOf" srcId="{CF2D02B9-0D4C-438A-9A09-36265FCD126F}" destId="{DC286486-1041-4CF2-B1D9-ED9F8D4CAF4B}" srcOrd="0" destOrd="0" presId="urn:microsoft.com/office/officeart/2005/8/layout/orgChart1"/>
+    <dgm:cxn modelId="{597EA3C6-690C-4F99-ADC8-91DFADD01181}" srcId="{CF25F756-588F-4C1B-9591-BB613EE272CB}" destId="{CF2D02B9-0D4C-438A-9A09-36265FCD126F}" srcOrd="3" destOrd="0" parTransId="{4576AD9C-8D01-4FF0-8AC4-65179B9664FE}" sibTransId="{FA63D66A-DDD5-4F5D-B3BF-62E3A3C4FC88}"/>
+    <dgm:cxn modelId="{04BD9444-96F5-4F9F-96D6-6E5D8150702D}" srcId="{3045B1B2-DC0A-4607-ACC9-6EA0209878F6}" destId="{3741E197-C607-4BAC-A29B-066FB2751C91}" srcOrd="3" destOrd="0" parTransId="{13F23037-5BD1-4678-8671-2EBB7A37F8AB}" sibTransId="{74813959-29CD-4409-BACF-AE9B76174F0E}"/>
+    <dgm:cxn modelId="{FE49A724-E0FE-4FCF-A886-5484A9F8DD20}" type="presOf" srcId="{FDC9F48B-2A97-42BB-A94D-14DD284B616A}" destId="{96A2D62A-7231-40B0-A064-11231D9FBD36}" srcOrd="0" destOrd="0" presId="urn:microsoft.com/office/officeart/2005/8/layout/orgChart1"/>
+    <dgm:cxn modelId="{8FA63312-87F1-41CF-BC5D-7FAD2845B45B}" srcId="{54F52B91-96F3-4A93-8C51-4A8BFBEDFA33}" destId="{F841F772-F263-44DB-AF9F-DD29A8A41A82}" srcOrd="4" destOrd="0" parTransId="{A6569C1B-F779-4BE0-969E-A2AFB0425B84}" sibTransId="{7ACBF141-9D50-4E5D-AF94-B41447F98FD8}"/>
+    <dgm:cxn modelId="{7102A93F-B189-4FA5-93F3-64C97B0D5822}" type="presOf" srcId="{C7416EEA-DB93-48CB-9F21-97C8588E35DD}" destId="{A2F494B7-1FD7-47D3-91A2-9B488590CB64}" srcOrd="0" destOrd="0" presId="urn:microsoft.com/office/officeart/2005/8/layout/orgChart1"/>
+    <dgm:cxn modelId="{42B09E8C-E277-4CE8-BD53-7BE557AE411F}" srcId="{402192EA-635B-4E5A-BC30-CBA091CCA687}" destId="{1E3ABECC-8D21-4FCF-8F22-4047954C6620}" srcOrd="1" destOrd="0" parTransId="{04BB0C87-6F2D-4619-8302-191948EC74A6}" sibTransId="{1D40B57F-B1D3-4540-9467-5C23E68DD271}"/>
+    <dgm:cxn modelId="{9D58EBE9-B38C-439F-A03D-5FEF45F8D98B}" srcId="{3045B1B2-DC0A-4607-ACC9-6EA0209878F6}" destId="{1707DDAA-FF7D-469D-B0BB-E186BF94AAE6}" srcOrd="4" destOrd="0" parTransId="{70C0C7BE-A049-472C-960B-F3918754FB25}" sibTransId="{C3A86372-A69D-4D81-BEFE-2C5701038283}"/>
+    <dgm:cxn modelId="{470E3917-08F0-42CB-912C-B34C1DCEB9F2}" srcId="{B5CEA2D4-A899-4C2C-BA30-79C7F0302244}" destId="{EB3B4FD7-4B93-4B6A-85DA-411D4E46D809}" srcOrd="5" destOrd="0" parTransId="{FD513F68-9504-4F45-8DCD-794B58A4EE29}" sibTransId="{6D02A1A6-8951-4138-A89A-B2061701541A}"/>
+    <dgm:cxn modelId="{37658EFE-F86D-43A6-983E-D5B08E4D4F82}" type="presOf" srcId="{206FA317-2A95-4AFD-B801-ED2E3F52304B}" destId="{57F61604-BE15-4362-B346-71D638A88099}" srcOrd="1" destOrd="0" presId="urn:microsoft.com/office/officeart/2005/8/layout/orgChart1"/>
+    <dgm:cxn modelId="{85026290-96D5-4D0F-9075-6ECB10EE9BFA}" srcId="{B5CEA2D4-A899-4C2C-BA30-79C7F0302244}" destId="{49114A9B-D2E0-4713-9DBF-1B7318FD9E27}" srcOrd="3" destOrd="0" parTransId="{9511AE43-BA7F-49B2-BA3B-266CB9B06C28}" sibTransId="{E3FE093F-97A4-4DFF-8A60-A5C2CF1AA222}"/>
+    <dgm:cxn modelId="{5DC2F79B-22CC-4DDB-8AEC-3C49FF6F3C7F}" type="presOf" srcId="{412D8D73-F653-4132-AF48-FE332EE4AF61}" destId="{C78F9AFE-E8E1-46DE-9FB8-48A10E9F107A}" srcOrd="1" destOrd="0" presId="urn:microsoft.com/office/officeart/2005/8/layout/orgChart1"/>
+    <dgm:cxn modelId="{7007CF1C-F494-4E1D-A56C-93EDF0B4B9A5}" type="presOf" srcId="{EE9E4C87-A11C-4304-96D9-18778AF7F28E}" destId="{CF5D86D5-9735-45A9-A995-59A8FC794786}" srcOrd="0" destOrd="0" presId="urn:microsoft.com/office/officeart/2005/8/layout/orgChart1"/>
+    <dgm:cxn modelId="{75ADC4CC-1737-4686-9763-E65CC106FD7E}" type="presOf" srcId="{0C48992A-DA9E-416D-B351-F6CF3917497B}" destId="{B8EF8860-201E-4A47-880F-FE1C62264548}" srcOrd="1" destOrd="0" presId="urn:microsoft.com/office/officeart/2005/8/layout/orgChart1"/>
+    <dgm:cxn modelId="{C0C90986-7735-439D-8A8A-2DC2D098BFCD}" type="presOf" srcId="{3741E197-C607-4BAC-A29B-066FB2751C91}" destId="{4304F539-04CE-41DE-AB0A-040F37901232}" srcOrd="0" destOrd="0" presId="urn:microsoft.com/office/officeart/2005/8/layout/orgChart1"/>
+    <dgm:cxn modelId="{B5331952-654B-41E8-8B81-CA6847CA4AA3}" type="presOf" srcId="{0274927B-4160-4899-AF19-9671AA211A2B}" destId="{25FA3ADB-37ED-43D8-B4C9-DE7BAE16907E}" srcOrd="0" destOrd="0" presId="urn:microsoft.com/office/officeart/2005/8/layout/orgChart1"/>
+    <dgm:cxn modelId="{FAF0676E-7D8B-4FED-8FF1-8A24FE76F300}" type="presOf" srcId="{7EE8E44F-0C3A-4679-96F1-03029899B8F6}" destId="{4BD3313B-B6CB-42FE-90CB-13EA1BBA4C78}" srcOrd="0" destOrd="0" presId="urn:microsoft.com/office/officeart/2005/8/layout/orgChart1"/>
     <dgm:cxn modelId="{DC87FA28-54E7-4545-A239-D261A429C76F}" type="presOf" srcId="{37682145-075D-4526-BE74-A2FD14772674}" destId="{3C43E7A2-C899-4FF3-A54E-8B1DADF7F1D8}" srcOrd="0" destOrd="0" presId="urn:microsoft.com/office/officeart/2005/8/layout/orgChart1"/>
-    <dgm:cxn modelId="{F250EFAB-3D5D-4FEF-8D4E-D6E61CBEBAF5}" type="presOf" srcId="{0274927B-4160-4899-AF19-9671AA211A2B}" destId="{AE5434BE-0902-49D1-B577-6595F8254C60}" srcOrd="1" destOrd="0" presId="urn:microsoft.com/office/officeart/2005/8/layout/orgChart1"/>
+    <dgm:cxn modelId="{98F07B5B-75D3-49F7-94A0-F7D9A2F6451E}" srcId="{54F52B91-96F3-4A93-8C51-4A8BFBEDFA33}" destId="{BA44C836-44DF-4853-AFD4-C5FBD868FEDE}" srcOrd="1" destOrd="0" parTransId="{BC73FEC3-7BE4-4F76-A05A-FAEB1EC6BC05}" sibTransId="{6ADE4D33-09B9-4239-A019-D8A168ED53FD}"/>
+    <dgm:cxn modelId="{FE77CDC2-BF05-48F0-AF4F-F510D408A4E9}" type="presOf" srcId="{BD1DDD68-A030-4E56-A78C-C045A20D5260}" destId="{16A9F9D7-3787-4714-911F-99186952F738}" srcOrd="1" destOrd="0" presId="urn:microsoft.com/office/officeart/2005/8/layout/orgChart1"/>
+    <dgm:cxn modelId="{0283F55E-E9EF-483C-A91C-656CC9944F9F}" srcId="{0274927B-4160-4899-AF19-9671AA211A2B}" destId="{B5CEA2D4-A899-4C2C-BA30-79C7F0302244}" srcOrd="4" destOrd="0" parTransId="{8B86F944-694A-43B9-BD2C-86002A138388}" sibTransId="{8B06C467-0364-4F8F-862D-C3FE609451FC}"/>
+    <dgm:cxn modelId="{89534863-8CDE-4E9B-8D42-202BF890C8C2}" type="presOf" srcId="{882C9CBD-8965-4D73-98D7-54F437501BE5}" destId="{8AAA2FD4-9B65-444C-904F-66481EA57F57}" srcOrd="0" destOrd="0" presId="urn:microsoft.com/office/officeart/2005/8/layout/orgChart1"/>
+    <dgm:cxn modelId="{5B9F4857-AE66-49AE-97AF-AC08E3374E91}" type="presOf" srcId="{A9751E97-5308-409A-BD37-D117ED6BF809}" destId="{4F17F90F-8BD4-4804-A10D-0E0D98F92923}" srcOrd="1" destOrd="0" presId="urn:microsoft.com/office/officeart/2005/8/layout/orgChart1"/>
+    <dgm:cxn modelId="{631AAAC2-CDD0-4B57-8477-EA1EE501EAAD}" type="presOf" srcId="{C4DD8EDD-E995-4C25-AFF8-F83A3553FAF9}" destId="{234957EB-CEAB-4D64-9578-75C67240B327}" srcOrd="0" destOrd="0" presId="urn:microsoft.com/office/officeart/2005/8/layout/orgChart1"/>
+    <dgm:cxn modelId="{2AA672BA-28C9-442E-B3FE-5C27DD36CE00}" type="presOf" srcId="{AA3915FE-4491-42CC-A1AF-70CBC148FF59}" destId="{E9FA3E35-E17C-402A-9F06-8A140AF13D6A}" srcOrd="0" destOrd="0" presId="urn:microsoft.com/office/officeart/2005/8/layout/orgChart1"/>
+    <dgm:cxn modelId="{4FC66C13-652D-4D9E-894C-304BFF5B9D07}" type="presOf" srcId="{F3C2A341-069D-4991-8990-61DFFDB62E32}" destId="{41D8D129-29D8-4385-B786-894926FEDC42}" srcOrd="0" destOrd="0" presId="urn:microsoft.com/office/officeart/2005/8/layout/orgChart1"/>
+    <dgm:cxn modelId="{6C5B0C31-EC3E-400B-9C4A-4897F0AEBE09}" type="presOf" srcId="{254F2FB9-B8B1-45E2-A82F-4EBBA8D47F7E}" destId="{6320A880-F80E-4CF8-8C28-17D03A432C6C}" srcOrd="1" destOrd="0" presId="urn:microsoft.com/office/officeart/2005/8/layout/orgChart1"/>
+    <dgm:cxn modelId="{230E8C98-A79D-4272-A485-07086F14F80E}" type="presOf" srcId="{1FD30924-7ED0-4217-A609-81C912422B24}" destId="{4A45F6A9-2CEE-4778-B464-5ADE39FD2424}" srcOrd="0" destOrd="0" presId="urn:microsoft.com/office/officeart/2005/8/layout/orgChart1"/>
+    <dgm:cxn modelId="{1F78DAA5-930D-4A06-9D7C-F711202F05E2}" srcId="{2FD0ACBE-A9EE-439B-BDD7-7D04768F5ECB}" destId="{254F2FB9-B8B1-45E2-A82F-4EBBA8D47F7E}" srcOrd="2" destOrd="0" parTransId="{7EE8E44F-0C3A-4679-96F1-03029899B8F6}" sibTransId="{0F138ECC-36AB-47A5-86BF-E34CB11279B0}"/>
+    <dgm:cxn modelId="{DC60566E-3325-44A8-BF9D-E93CF24F4F1B}" type="presOf" srcId="{5C8EBEB2-45CA-4875-B2C1-3A80FFD2AC67}" destId="{08D8DD80-F8DB-42D4-8B5F-8F3E6B33839A}" srcOrd="1" destOrd="0" presId="urn:microsoft.com/office/officeart/2005/8/layout/orgChart1"/>
+    <dgm:cxn modelId="{CC6C2AB1-69AD-4C55-944B-2488ABAC2C31}" srcId="{54F52B91-96F3-4A93-8C51-4A8BFBEDFA33}" destId="{9212E598-9C44-43E3-A9F6-848C3F7B98C6}" srcOrd="0" destOrd="0" parTransId="{A3998B0F-A5C6-48FE-B0BC-BF0B7E2B7081}" sibTransId="{8F01BDFD-242D-4425-AA2F-94FB37A1DABF}"/>
+    <dgm:cxn modelId="{419E7F53-7DD8-4D1F-90D9-CDE59C63B3CF}" srcId="{0274927B-4160-4899-AF19-9671AA211A2B}" destId="{832D0428-C81C-4895-8335-E8EDA9233ED3}" srcOrd="1" destOrd="0" parTransId="{E51BC5A4-9C0D-4258-B89D-D0AE1ABE08D8}" sibTransId="{F6B1AA2B-235E-4C17-88CA-E0378EFC754E}"/>
+    <dgm:cxn modelId="{0881988A-2EFD-41E2-B661-F9FD54DF2A49}" type="presOf" srcId="{FDC9F48B-2A97-42BB-A94D-14DD284B616A}" destId="{604E9955-A4D8-4EF3-AB62-04F2B6924221}" srcOrd="1" destOrd="0" presId="urn:microsoft.com/office/officeart/2005/8/layout/orgChart1"/>
+    <dgm:cxn modelId="{BB975462-7C43-40C6-A560-006B7C6C9DCB}" type="presOf" srcId="{F6903CF6-6A4F-4541-A359-24FE5D01E33B}" destId="{FD7D4D9F-8B82-4134-A440-E709162FB101}" srcOrd="0" destOrd="0" presId="urn:microsoft.com/office/officeart/2005/8/layout/orgChart1"/>
+    <dgm:cxn modelId="{7954354A-A23E-42B6-840A-962221585393}" srcId="{CF25F756-588F-4C1B-9591-BB613EE272CB}" destId="{C4DD8EDD-E995-4C25-AFF8-F83A3553FAF9}" srcOrd="1" destOrd="0" parTransId="{0E88CAD0-4595-4D4B-A0AC-4CD7353C555C}" sibTransId="{A1AE32C3-045C-49F6-8F2E-1508D00C4D8D}"/>
+    <dgm:cxn modelId="{B8345951-406F-42FA-A46F-6C945752FE5D}" type="presOf" srcId="{54F52B91-96F3-4A93-8C51-4A8BFBEDFA33}" destId="{951AA7AC-1C1A-47BB-A6DA-7AE5C0C55E85}" srcOrd="0" destOrd="0" presId="urn:microsoft.com/office/officeart/2005/8/layout/orgChart1"/>
+    <dgm:cxn modelId="{5F8F7183-397E-40BF-A371-DEB724DECDB9}" type="presOf" srcId="{FC3BE7C2-CAF1-4079-9560-5489769EFC27}" destId="{C33C7A6C-C6C4-41AC-8DE1-8DDEFEB60920}" srcOrd="0" destOrd="0" presId="urn:microsoft.com/office/officeart/2005/8/layout/orgChart1"/>
+    <dgm:cxn modelId="{B920FDA4-A114-4410-B52A-4B8C6F900B9D}" srcId="{54F52B91-96F3-4A93-8C51-4A8BFBEDFA33}" destId="{37682145-075D-4526-BE74-A2FD14772674}" srcOrd="3" destOrd="0" parTransId="{C7416EEA-DB93-48CB-9F21-97C8588E35DD}" sibTransId="{070BD383-E262-4C90-83CA-403E164C32E9}"/>
+    <dgm:cxn modelId="{C913FD22-4830-479B-8D0B-C63B9BEF77E3}" srcId="{0274927B-4160-4899-AF19-9671AA211A2B}" destId="{402192EA-635B-4E5A-BC30-CBA091CCA687}" srcOrd="9" destOrd="0" parTransId="{58F003E5-0E8F-43B2-BD78-8704859781FC}" sibTransId="{6DD285F6-212B-4270-B8AA-A5F40C494517}"/>
+    <dgm:cxn modelId="{3C9B54B6-7468-4C20-8F01-615772B233DA}" type="presOf" srcId="{3741E197-C607-4BAC-A29B-066FB2751C91}" destId="{C0E743B2-38B4-4FFD-8B35-ADA7FA1431B1}" srcOrd="1" destOrd="0" presId="urn:microsoft.com/office/officeart/2005/8/layout/orgChart1"/>
+    <dgm:cxn modelId="{F8B2A970-117D-455E-9B31-C9412771ECCA}" type="presOf" srcId="{1B000D60-51F0-4F7C-BE26-B6213BFA4932}" destId="{ACAD718D-61C1-406A-BAF6-C6FC780B3F8C}" srcOrd="0" destOrd="0" presId="urn:microsoft.com/office/officeart/2005/8/layout/orgChart1"/>
+    <dgm:cxn modelId="{3086EF14-3781-4A75-BE4A-3CBD711C0607}" type="presOf" srcId="{0C48992A-DA9E-416D-B351-F6CF3917497B}" destId="{ADD27B8D-46D3-4588-BB73-49AC77C35FF6}" srcOrd="0" destOrd="0" presId="urn:microsoft.com/office/officeart/2005/8/layout/orgChart1"/>
     <dgm:cxn modelId="{BF3D53A9-EB47-4EDC-B33C-CA020814A1AF}" type="presOf" srcId="{412D8D73-F653-4132-AF48-FE332EE4AF61}" destId="{FEE3C8F0-336B-4489-B1F3-DF952E1353C6}" srcOrd="0" destOrd="0" presId="urn:microsoft.com/office/officeart/2005/8/layout/orgChart1"/>
+    <dgm:cxn modelId="{E2E06B8A-CEA9-4826-AF61-D3FED97C6E66}" type="presOf" srcId="{B76B37EA-7611-4BE2-8A94-945B0806F9F6}" destId="{4936C0EE-735B-4022-A21D-F437E8C8FB2C}" srcOrd="0" destOrd="0" presId="urn:microsoft.com/office/officeart/2005/8/layout/orgChart1"/>
+    <dgm:cxn modelId="{3B322B18-97A9-4562-B8AE-43DD53C3DEC2}" type="presOf" srcId="{E51BC5A4-9C0D-4258-B89D-D0AE1ABE08D8}" destId="{50B91C8F-9633-4F9D-970A-524716897861}" srcOrd="0" destOrd="0" presId="urn:microsoft.com/office/officeart/2005/8/layout/orgChart1"/>
+    <dgm:cxn modelId="{4F62E5FA-E573-4A1B-BD41-0E9869B668C9}" type="presOf" srcId="{A9751E97-5308-409A-BD37-D117ED6BF809}" destId="{15F2BC78-D50C-4AAD-8B4C-69F04EAC3A17}" srcOrd="0" destOrd="0" presId="urn:microsoft.com/office/officeart/2005/8/layout/orgChart1"/>
+    <dgm:cxn modelId="{F6B9E185-F40A-4EBC-848F-9E64DC052541}" type="presOf" srcId="{402192EA-635B-4E5A-BC30-CBA091CCA687}" destId="{53F64DE1-C267-4768-9640-9F5FECF761EF}" srcOrd="0" destOrd="0" presId="urn:microsoft.com/office/officeart/2005/8/layout/orgChart1"/>
+    <dgm:cxn modelId="{D2ABC662-1AF9-4909-B9FD-0244068A5D15}" srcId="{0274927B-4160-4899-AF19-9671AA211A2B}" destId="{FDC9F48B-2A97-42BB-A94D-14DD284B616A}" srcOrd="0" destOrd="0" parTransId="{EF945DD0-6504-45B1-B65D-422FF7CEE416}" sibTransId="{DFBEF7FD-6A4D-43F9-AEF4-4EB26978CE13}"/>
+    <dgm:cxn modelId="{689B0FDE-CB8E-4179-A867-4477D1AD48AA}" srcId="{0274927B-4160-4899-AF19-9671AA211A2B}" destId="{46D32E76-4D85-46E4-8C07-C66241E47DA0}" srcOrd="7" destOrd="0" parTransId="{CC418A99-34CE-4F58-A0D7-696AF26529A1}" sibTransId="{72CB8CFE-6056-44BB-83B7-7F6297D1FDAF}"/>
+    <dgm:cxn modelId="{D23E0F48-E45F-452B-8CFE-0960421C3460}" type="presOf" srcId="{1FD30924-7ED0-4217-A609-81C912422B24}" destId="{70DD15F4-9873-4C92-A83A-F5A2BD26FFD0}" srcOrd="1" destOrd="0" presId="urn:microsoft.com/office/officeart/2005/8/layout/orgChart1"/>
+    <dgm:cxn modelId="{AE8D0DAB-690F-46E9-8961-28D7AB9F49FB}" type="presOf" srcId="{2FD0ACBE-A9EE-439B-BDD7-7D04768F5ECB}" destId="{7BD2452F-63BA-4404-A09F-0848D6551F58}" srcOrd="0" destOrd="0" presId="urn:microsoft.com/office/officeart/2005/8/layout/orgChart1"/>
+    <dgm:cxn modelId="{9A2AE251-7015-47A0-A82E-AEB159DE60AA}" type="presOf" srcId="{AB43DBA9-F5B3-4C40-82BF-D52A96D425F7}" destId="{139F4A1C-33B8-4B28-A053-E30D08643F71}" srcOrd="1" destOrd="0" presId="urn:microsoft.com/office/officeart/2005/8/layout/orgChart1"/>
+    <dgm:cxn modelId="{C5368941-0513-4146-85AE-2FDC9E05624D}" type="presOf" srcId="{49114A9B-D2E0-4713-9DBF-1B7318FD9E27}" destId="{D5BAEF3F-BD35-4D7E-A4FF-F30965920AFA}" srcOrd="1" destOrd="0" presId="urn:microsoft.com/office/officeart/2005/8/layout/orgChart1"/>
+    <dgm:cxn modelId="{BC8BED82-C43C-41C2-A297-6E63B4A2516D}" type="presOf" srcId="{C4DD8EDD-E995-4C25-AFF8-F83A3553FAF9}" destId="{5D30D3E5-3448-4B85-9084-9844DD694E7F}" srcOrd="1" destOrd="0" presId="urn:microsoft.com/office/officeart/2005/8/layout/orgChart1"/>
+    <dgm:cxn modelId="{018B8375-43E6-4012-A8DB-C5EF53D4A254}" type="presOf" srcId="{6D36762B-FB57-4DEA-90CD-3F097F4D25CC}" destId="{92C0FB43-53F4-4321-BEF9-66199300F0E8}" srcOrd="0" destOrd="0" presId="urn:microsoft.com/office/officeart/2005/8/layout/orgChart1"/>
+    <dgm:cxn modelId="{86138418-D865-456C-9979-35352F147087}" type="presOf" srcId="{5C8EBEB2-45CA-4875-B2C1-3A80FFD2AC67}" destId="{37209606-A253-48BC-A588-886B49BABBD1}" srcOrd="0" destOrd="0" presId="urn:microsoft.com/office/officeart/2005/8/layout/orgChart1"/>
+    <dgm:cxn modelId="{0CA65E07-E810-4F3D-8ACA-44003628B23F}" type="presOf" srcId="{BA44C836-44DF-4853-AFD4-C5FBD868FEDE}" destId="{AC413AD4-05E8-4882-B724-048726377750}" srcOrd="0" destOrd="0" presId="urn:microsoft.com/office/officeart/2005/8/layout/orgChart1"/>
     <dgm:cxn modelId="{F4B36CE0-A6CC-4592-8B7C-5EEBF84220BF}" type="presOf" srcId="{254F2FB9-B8B1-45E2-A82F-4EBBA8D47F7E}" destId="{AE0DAA20-8A17-469F-A2AE-7E1D1148B1A8}" srcOrd="0" destOrd="0" presId="urn:microsoft.com/office/officeart/2005/8/layout/orgChart1"/>
-    <dgm:cxn modelId="{5F8F7183-397E-40BF-A371-DEB724DECDB9}" type="presOf" srcId="{FC3BE7C2-CAF1-4079-9560-5489769EFC27}" destId="{C33C7A6C-C6C4-41AC-8DE1-8DDEFEB60920}" srcOrd="0" destOrd="0" presId="urn:microsoft.com/office/officeart/2005/8/layout/orgChart1"/>
-    <dgm:cxn modelId="{F8B2A970-117D-455E-9B31-C9412771ECCA}" type="presOf" srcId="{1B000D60-51F0-4F7C-BE26-B6213BFA4932}" destId="{ACAD718D-61C1-406A-BAF6-C6FC780B3F8C}" srcOrd="0" destOrd="0" presId="urn:microsoft.com/office/officeart/2005/8/layout/orgChart1"/>
-    <dgm:cxn modelId="{0283F55E-E9EF-483C-A91C-656CC9944F9F}" srcId="{0274927B-4160-4899-AF19-9671AA211A2B}" destId="{B5CEA2D4-A899-4C2C-BA30-79C7F0302244}" srcOrd="4" destOrd="0" parTransId="{8B86F944-694A-43B9-BD2C-86002A138388}" sibTransId="{8B06C467-0364-4F8F-862D-C3FE609451FC}"/>
-    <dgm:cxn modelId="{1802E59F-02B8-4C9A-87ED-078267E1EDF2}" type="presOf" srcId="{A6569C1B-F779-4BE0-969E-A2AFB0425B84}" destId="{58FCFA12-57FF-4DDE-AA78-FD5F24D44BE5}" srcOrd="0" destOrd="0" presId="urn:microsoft.com/office/officeart/2005/8/layout/orgChart1"/>
-    <dgm:cxn modelId="{3086EF14-3781-4A75-BE4A-3CBD711C0607}" type="presOf" srcId="{0C48992A-DA9E-416D-B351-F6CF3917497B}" destId="{ADD27B8D-46D3-4588-BB73-49AC77C35FF6}" srcOrd="0" destOrd="0" presId="urn:microsoft.com/office/officeart/2005/8/layout/orgChart1"/>
-    <dgm:cxn modelId="{3054077A-94E7-4869-B8D3-3D9AA04F5C7F}" srcId="{2FD0ACBE-A9EE-439B-BDD7-7D04768F5ECB}" destId="{1FD30924-7ED0-4217-A609-81C912422B24}" srcOrd="1" destOrd="0" parTransId="{6667787B-8278-48F1-A8AA-4BBEBED29AC7}" sibTransId="{020A0A2D-B354-4262-9D66-D305EF074DEE}"/>
-    <dgm:cxn modelId="{0DA38FD3-749D-4ECE-816A-2908C2CA4D80}" type="presOf" srcId="{402192EA-635B-4E5A-BC30-CBA091CCA687}" destId="{831B417E-D813-4576-8428-B6F99D5216F6}" srcOrd="1" destOrd="0" presId="urn:microsoft.com/office/officeart/2005/8/layout/orgChart1"/>
+    <dgm:cxn modelId="{C068702E-A479-49D5-B649-4D48574991AA}" type="presOf" srcId="{A326D562-FC53-441D-9269-0AED7029A99A}" destId="{E6CB73C8-18AD-4E4D-AE69-1F66714D57E7}" srcOrd="1" destOrd="0" presId="urn:microsoft.com/office/officeart/2005/8/layout/orgChart1"/>
+    <dgm:cxn modelId="{E45A1D5E-F2D1-43DF-ACCB-A614361DE9F2}" type="presOf" srcId="{CC418A99-34CE-4F58-A0D7-696AF26529A1}" destId="{F262803E-CFEC-49FE-80FB-BF7DB555A7BE}" srcOrd="0" destOrd="0" presId="urn:microsoft.com/office/officeart/2005/8/layout/orgChart1"/>
     <dgm:cxn modelId="{66623FB8-931E-46E7-8044-8828CBD698CF}" type="presOf" srcId="{1E3ABECC-8D21-4FCF-8F22-4047954C6620}" destId="{F0432EA2-E586-4C57-9E74-B7DC627F4296}" srcOrd="0" destOrd="0" presId="urn:microsoft.com/office/officeart/2005/8/layout/orgChart1"/>
-    <dgm:cxn modelId="{3B322B18-97A9-4562-B8AE-43DD53C3DEC2}" type="presOf" srcId="{E51BC5A4-9C0D-4258-B89D-D0AE1ABE08D8}" destId="{50B91C8F-9633-4F9D-970A-524716897861}" srcOrd="0" destOrd="0" presId="urn:microsoft.com/office/officeart/2005/8/layout/orgChart1"/>
-    <dgm:cxn modelId="{D23E0F48-E45F-452B-8CFE-0960421C3460}" type="presOf" srcId="{1FD30924-7ED0-4217-A609-81C912422B24}" destId="{70DD15F4-9873-4C92-A83A-F5A2BD26FFD0}" srcOrd="1" destOrd="0" presId="urn:microsoft.com/office/officeart/2005/8/layout/orgChart1"/>
+    <dgm:cxn modelId="{5CAC690D-9F55-4BE9-B588-1627A79DA2EE}" srcId="{2FD0ACBE-A9EE-439B-BDD7-7D04768F5ECB}" destId="{BD1DDD68-A030-4E56-A78C-C045A20D5260}" srcOrd="0" destOrd="0" parTransId="{4AC75C96-6CDF-4654-8237-F7788401C076}" sibTransId="{2A6CE0CF-4746-4229-9777-1B3C17C91DE0}"/>
+    <dgm:cxn modelId="{1EE40FC0-F1BD-4263-BAD4-CC6F348231B7}" type="presOf" srcId="{B5CEA2D4-A899-4C2C-BA30-79C7F0302244}" destId="{E6677268-D00C-4D1B-A6D9-295F28778097}" srcOrd="0" destOrd="0" presId="urn:microsoft.com/office/officeart/2005/8/layout/orgChart1"/>
+    <dgm:cxn modelId="{4BD61198-FE72-4108-8862-3C1E1BE2E555}" type="presOf" srcId="{C88AE6E3-0700-4F24-88F8-01A94F1EFDD0}" destId="{1D844913-ECD1-4382-9097-101154A0FCC7}" srcOrd="0" destOrd="0" presId="urn:microsoft.com/office/officeart/2005/8/layout/orgChart1"/>
+    <dgm:cxn modelId="{8483C8D2-1419-4A30-9BD1-5286CA25BFEE}" srcId="{0274927B-4160-4899-AF19-9671AA211A2B}" destId="{02E8AF3B-DB86-4F9A-8D46-27D7319E4BB8}" srcOrd="10" destOrd="0" parTransId="{8017E421-4010-47DD-B3A2-150D7F01784C}" sibTransId="{4CCAA9F6-7FF4-460F-8B35-21E70EA635D7}"/>
+    <dgm:cxn modelId="{6D18F23A-B8E9-40E0-8200-ED7CD56BB661}" type="presOf" srcId="{C88AE6E3-0700-4F24-88F8-01A94F1EFDD0}" destId="{20D19837-0E96-49A9-A9CC-3C434CEB5CA5}" srcOrd="1" destOrd="0" presId="urn:microsoft.com/office/officeart/2005/8/layout/orgChart1"/>
+    <dgm:cxn modelId="{7E14F6EE-543A-4DFC-B59A-863DA63B9650}" type="presOf" srcId="{99D9C4F3-84D0-4398-BA5C-83FCBD76B890}" destId="{17805C60-C0CE-46BF-BA01-F8C5D9F70B79}" srcOrd="1" destOrd="0" presId="urn:microsoft.com/office/officeart/2005/8/layout/orgChart1"/>
+    <dgm:cxn modelId="{15A8AFED-3CBE-4887-B5A3-BAA849729CEF}" type="presOf" srcId="{46D32E76-4D85-46E4-8C07-C66241E47DA0}" destId="{8556C2F1-BC1A-491E-8AA3-0804AD7B92FA}" srcOrd="0" destOrd="0" presId="urn:microsoft.com/office/officeart/2005/8/layout/orgChart1"/>
+    <dgm:cxn modelId="{813B0836-45E5-494D-AF6A-D39BD059002D}" type="presOf" srcId="{EB3B4FD7-4B93-4B6A-85DA-411D4E46D809}" destId="{BF212140-F00B-41BB-95FA-AB60DEA3AD26}" srcOrd="0" destOrd="0" presId="urn:microsoft.com/office/officeart/2005/8/layout/orgChart1"/>
+    <dgm:cxn modelId="{99306810-C422-4A11-B504-A746C310C603}" srcId="{CF25F756-588F-4C1B-9591-BB613EE272CB}" destId="{0274927B-4160-4899-AF19-9671AA211A2B}" srcOrd="0" destOrd="0" parTransId="{2AED433D-0597-4258-B441-18772D8834FD}" sibTransId="{A88DCB20-EF2C-4111-AE84-9D6560A02F3F}"/>
+    <dgm:cxn modelId="{FD50899F-F26F-4C11-83D7-40684D29EC93}" srcId="{B5CEA2D4-A899-4C2C-BA30-79C7F0302244}" destId="{6D36762B-FB57-4DEA-90CD-3F097F4D25CC}" srcOrd="4" destOrd="0" parTransId="{F3C2A341-069D-4991-8990-61DFFDB62E32}" sibTransId="{AED57AF9-10F1-4CD6-9667-9BB1699AF639}"/>
+    <dgm:cxn modelId="{C008063F-1F1E-4934-8A59-A7B4187AD825}" srcId="{B5CEA2D4-A899-4C2C-BA30-79C7F0302244}" destId="{206FA317-2A95-4AFD-B801-ED2E3F52304B}" srcOrd="1" destOrd="0" parTransId="{463DAE48-7CE6-4E11-AAB1-77194570CA13}" sibTransId="{D951AF62-7ECE-4764-8F28-FC9C836D48FD}"/>
+    <dgm:cxn modelId="{38EEAE5E-BE61-432A-AD98-11B56DFE10F7}" srcId="{3045B1B2-DC0A-4607-ACC9-6EA0209878F6}" destId="{3F86936B-1FD6-48A0-A250-2B1EB4CB5592}" srcOrd="2" destOrd="0" parTransId="{882C9CBD-8965-4D73-98D7-54F437501BE5}" sibTransId="{D879D27F-8D76-420C-B068-F16896F28251}"/>
+    <dgm:cxn modelId="{2CF812D9-A1D6-4C9A-9AE5-DF4CD1A1373E}" type="presOf" srcId="{F7A70203-5488-40A0-9132-52AF0CCC0865}" destId="{0AD1E2AE-974D-4F7C-AFCD-74206E1B3B56}" srcOrd="0" destOrd="0" presId="urn:microsoft.com/office/officeart/2005/8/layout/orgChart1"/>
+    <dgm:cxn modelId="{4B71338B-B9D8-4098-B4E4-7C6EC0EF8BB9}" type="presOf" srcId="{37682145-075D-4526-BE74-A2FD14772674}" destId="{F2328742-AD42-44F6-93EE-FB64E22017C9}" srcOrd="1" destOrd="0" presId="urn:microsoft.com/office/officeart/2005/8/layout/orgChart1"/>
+    <dgm:cxn modelId="{0C669FE1-EEE0-4409-9179-F88DF46C55B0}" type="presOf" srcId="{206FA317-2A95-4AFD-B801-ED2E3F52304B}" destId="{5EE94A07-DE5A-4F7A-A8DD-16D552E2D98E}" srcOrd="0" destOrd="0" presId="urn:microsoft.com/office/officeart/2005/8/layout/orgChart1"/>
+    <dgm:cxn modelId="{8E9CFEEB-5D61-4D13-9A60-1CA5AD437D9F}" type="presOf" srcId="{04A842A6-3D2B-45FE-B6D1-65F0829EE722}" destId="{641A9226-B231-4E8E-9C55-F68651D94D4E}" srcOrd="0" destOrd="0" presId="urn:microsoft.com/office/officeart/2005/8/layout/orgChart1"/>
+    <dgm:cxn modelId="{721B8B6A-B60A-4FC9-B228-A79D3958DB03}" srcId="{3045B1B2-DC0A-4607-ACC9-6EA0209878F6}" destId="{0C48992A-DA9E-416D-B351-F6CF3917497B}" srcOrd="1" destOrd="0" parTransId="{7C6E53BB-7621-4B9E-B8AB-2A5789109803}" sibTransId="{BEFB7897-8604-43A3-978F-CBD7C072936F}"/>
+    <dgm:cxn modelId="{95C04DC4-A3AA-4D1D-A2BC-2C4FC4C95D09}" type="presOf" srcId="{BA44C836-44DF-4853-AFD4-C5FBD868FEDE}" destId="{798AF196-C9E6-4068-8D9C-E6C02EBD0190}" srcOrd="1" destOrd="0" presId="urn:microsoft.com/office/officeart/2005/8/layout/orgChart1"/>
+    <dgm:cxn modelId="{37B5C6F7-86B6-4B9F-AE70-934CB0BB92DB}" type="presOf" srcId="{832D0428-C81C-4895-8335-E8EDA9233ED3}" destId="{149078CD-1B5B-412D-A0CE-202071623540}" srcOrd="1" destOrd="0" presId="urn:microsoft.com/office/officeart/2005/8/layout/orgChart1"/>
+    <dgm:cxn modelId="{742D2062-A4FD-4CB2-9479-40D34C47DA72}" type="presOf" srcId="{FD513F68-9504-4F45-8DCD-794B58A4EE29}" destId="{5C2972FE-C97E-42B6-9A79-1CF8DC5B6AE4}" srcOrd="0" destOrd="0" presId="urn:microsoft.com/office/officeart/2005/8/layout/orgChart1"/>
+    <dgm:cxn modelId="{33A35940-4742-4DE8-99CF-AF2EECBD1489}" type="presOf" srcId="{4AC75C96-6CDF-4654-8237-F7788401C076}" destId="{F6AF1D9D-BBE8-4B97-95BF-FA0015EF42D6}" srcOrd="0" destOrd="0" presId="urn:microsoft.com/office/officeart/2005/8/layout/orgChart1"/>
+    <dgm:cxn modelId="{0577416B-B4C3-4654-8F13-8D8E24A33E34}" srcId="{0274927B-4160-4899-AF19-9671AA211A2B}" destId="{2FD0ACBE-A9EE-439B-BDD7-7D04768F5ECB}" srcOrd="8" destOrd="0" parTransId="{115D3D74-8A9E-46A5-8E17-2DD64D5CC212}" sibTransId="{47B2DB87-A5FE-4B74-B4D7-E946093551B1}"/>
+    <dgm:cxn modelId="{C75EBC64-2510-4A51-8131-3111C1333D5C}" type="presOf" srcId="{EF945DD0-6504-45B1-B65D-422FF7CEE416}" destId="{FAA0A73B-BE57-4EBF-BC6E-02688DD94992}" srcOrd="0" destOrd="0" presId="urn:microsoft.com/office/officeart/2005/8/layout/orgChart1"/>
+    <dgm:cxn modelId="{822968A5-3549-4F8C-A2A0-B202B9481C29}" type="presOf" srcId="{9511AE43-BA7F-49B2-BA3B-266CB9B06C28}" destId="{539C9AB9-A71B-47D2-BAFA-A26EF16D35E9}" srcOrd="0" destOrd="0" presId="urn:microsoft.com/office/officeart/2005/8/layout/orgChart1"/>
+    <dgm:cxn modelId="{4434AF9F-A12B-4261-84E5-1A9E0125AD32}" type="presOf" srcId="{04A842A6-3D2B-45FE-B6D1-65F0829EE722}" destId="{03285AB4-389B-4A8E-A739-E4FB594C24BF}" srcOrd="1" destOrd="0" presId="urn:microsoft.com/office/officeart/2005/8/layout/orgChart1"/>
+    <dgm:cxn modelId="{E6BE837F-4910-4A69-9D48-65CA9F929710}" type="presOf" srcId="{CF25F756-588F-4C1B-9591-BB613EE272CB}" destId="{DB6D70D1-1334-4D38-846C-FFDB7A9BF7E5}" srcOrd="0" destOrd="0" presId="urn:microsoft.com/office/officeart/2005/8/layout/orgChart1"/>
+    <dgm:cxn modelId="{F7F13506-2B9D-4500-85CB-8395DC2ED769}" type="presOf" srcId="{3045B1B2-DC0A-4607-ACC9-6EA0209878F6}" destId="{A3596C5C-D5BF-4D1F-99EE-77880EC19FC8}" srcOrd="0" destOrd="0" presId="urn:microsoft.com/office/officeart/2005/8/layout/orgChart1"/>
+    <dgm:cxn modelId="{7589C0EA-F1D2-480F-B5E5-C964736EEE91}" srcId="{0274927B-4160-4899-AF19-9671AA211A2B}" destId="{54F52B91-96F3-4A93-8C51-4A8BFBEDFA33}" srcOrd="3" destOrd="0" parTransId="{1B000D60-51F0-4F7C-BE26-B6213BFA4932}" sibTransId="{336023B5-0FCD-49A8-BFE0-A6F3DC26439F}"/>
+    <dgm:cxn modelId="{6599F7E2-3E16-4051-8CA2-C2423E791985}" srcId="{B5CEA2D4-A899-4C2C-BA30-79C7F0302244}" destId="{04A842A6-3D2B-45FE-B6D1-65F0829EE722}" srcOrd="2" destOrd="0" parTransId="{F6903CF6-6A4F-4541-A359-24FE5D01E33B}" sibTransId="{B14EF6FE-A1CE-4C76-A341-23F4013BAF2C}"/>
+    <dgm:cxn modelId="{3D94E4F5-FA5D-48A7-822A-3E3729C83107}" type="presOf" srcId="{02E8AF3B-DB86-4F9A-8D46-27D7319E4BB8}" destId="{0A9A1E76-FE42-4D99-8E38-8C153C3BEC71}" srcOrd="0" destOrd="0" presId="urn:microsoft.com/office/officeart/2005/8/layout/orgChart1"/>
+    <dgm:cxn modelId="{DCDE5DE1-6C54-49B6-829A-7D27B87A3D18}" srcId="{402192EA-635B-4E5A-BC30-CBA091CCA687}" destId="{0514F8A1-4B60-46B1-9B43-60C5F0627DF1}" srcOrd="0" destOrd="0" parTransId="{6558A57C-4982-4A47-B2B2-8AABE7345991}" sibTransId="{5B3A3CB9-257B-4EAE-AA31-FB1004E25F63}"/>
     <dgm:cxn modelId="{3CEBD8B4-F2DF-41D3-B809-282525D2021C}" type="presOf" srcId="{A3998B0F-A5C6-48FE-B0BC-BF0B7E2B7081}" destId="{76159509-0BB5-44D0-976C-3983E2A2D266}" srcOrd="0" destOrd="0" presId="urn:microsoft.com/office/officeart/2005/8/layout/orgChart1"/>
-    <dgm:cxn modelId="{2AA672BA-28C9-442E-B3FE-5C27DD36CE00}" type="presOf" srcId="{AA3915FE-4491-42CC-A1AF-70CBC148FF59}" destId="{E9FA3E35-E17C-402A-9F06-8A140AF13D6A}" srcOrd="0" destOrd="0" presId="urn:microsoft.com/office/officeart/2005/8/layout/orgChart1"/>
-    <dgm:cxn modelId="{FA77575B-894E-4037-9F99-97EBC6037E6F}" type="presOf" srcId="{BD1DDD68-A030-4E56-A78C-C045A20D5260}" destId="{BBD8B560-3529-4560-B4F4-2FF262593363}" srcOrd="0" destOrd="0" presId="urn:microsoft.com/office/officeart/2005/8/layout/orgChart1"/>
-    <dgm:cxn modelId="{C068702E-A479-49D5-B649-4D48574991AA}" type="presOf" srcId="{A326D562-FC53-441D-9269-0AED7029A99A}" destId="{E6CB73C8-18AD-4E4D-AE69-1F66714D57E7}" srcOrd="1" destOrd="0" presId="urn:microsoft.com/office/officeart/2005/8/layout/orgChart1"/>
-    <dgm:cxn modelId="{59F2FBD6-66C2-4E8D-A375-86461048AC51}" type="presOf" srcId="{3F86936B-1FD6-48A0-A250-2B1EB4CB5592}" destId="{E522034E-B4F4-45A6-9472-9FE4651F335F}" srcOrd="1" destOrd="0" presId="urn:microsoft.com/office/officeart/2005/8/layout/orgChart1"/>
-    <dgm:cxn modelId="{AD460318-43C5-4994-AC55-63F6BCC51449}" type="presOf" srcId="{115D3D74-8A9E-46A5-8E17-2DD64D5CC212}" destId="{6FFED9C4-696B-4ABA-A003-AB2F5D1066AB}" srcOrd="0" destOrd="0" presId="urn:microsoft.com/office/officeart/2005/8/layout/orgChart1"/>
-    <dgm:cxn modelId="{67FE6518-7368-4E51-BA48-96033F8EDC4C}" type="presOf" srcId="{9212E598-9C44-43E3-A9F6-848C3F7B98C6}" destId="{62F83636-57B9-481E-B7D7-8B7EBC51A031}" srcOrd="1" destOrd="0" presId="urn:microsoft.com/office/officeart/2005/8/layout/orgChart1"/>
-    <dgm:cxn modelId="{8E9CFEEB-5D61-4D13-9A60-1CA5AD437D9F}" type="presOf" srcId="{04A842A6-3D2B-45FE-B6D1-65F0829EE722}" destId="{641A9226-B231-4E8E-9C55-F68651D94D4E}" srcOrd="0" destOrd="0" presId="urn:microsoft.com/office/officeart/2005/8/layout/orgChart1"/>
-    <dgm:cxn modelId="{E5AE437C-EB5E-46FF-A189-983EA9FF4034}" type="presOf" srcId="{F841F772-F263-44DB-AF9F-DD29A8A41A82}" destId="{EAAC0396-F5F9-4F12-82E3-06CCEE8D8411}" srcOrd="1" destOrd="0" presId="urn:microsoft.com/office/officeart/2005/8/layout/orgChart1"/>
-    <dgm:cxn modelId="{37658EFE-F86D-43A6-983E-D5B08E4D4F82}" type="presOf" srcId="{206FA317-2A95-4AFD-B801-ED2E3F52304B}" destId="{57F61604-BE15-4362-B346-71D638A88099}" srcOrd="1" destOrd="0" presId="urn:microsoft.com/office/officeart/2005/8/layout/orgChart1"/>
-    <dgm:cxn modelId="{89534863-8CDE-4E9B-8D42-202BF890C8C2}" type="presOf" srcId="{882C9CBD-8965-4D73-98D7-54F437501BE5}" destId="{8AAA2FD4-9B65-444C-904F-66481EA57F57}" srcOrd="0" destOrd="0" presId="urn:microsoft.com/office/officeart/2005/8/layout/orgChart1"/>
-    <dgm:cxn modelId="{40727FD1-EDC9-4821-8A49-2C9BA11CC666}" type="presOf" srcId="{49114A9B-D2E0-4713-9DBF-1B7318FD9E27}" destId="{E3166F7C-DF17-441D-9FD5-AE90B21D5054}" srcOrd="0" destOrd="0" presId="urn:microsoft.com/office/officeart/2005/8/layout/orgChart1"/>
-    <dgm:cxn modelId="{230E8C98-A79D-4272-A485-07086F14F80E}" type="presOf" srcId="{1FD30924-7ED0-4217-A609-81C912422B24}" destId="{4A45F6A9-2CEE-4778-B464-5ADE39FD2424}" srcOrd="0" destOrd="0" presId="urn:microsoft.com/office/officeart/2005/8/layout/orgChart1"/>
-    <dgm:cxn modelId="{9A2AE251-7015-47A0-A82E-AEB159DE60AA}" type="presOf" srcId="{AB43DBA9-F5B3-4C40-82BF-D52A96D425F7}" destId="{139F4A1C-33B8-4B28-A053-E30D08643F71}" srcOrd="1" destOrd="0" presId="urn:microsoft.com/office/officeart/2005/8/layout/orgChart1"/>
-    <dgm:cxn modelId="{E2E06B8A-CEA9-4826-AF61-D3FED97C6E66}" type="presOf" srcId="{B76B37EA-7611-4BE2-8A94-945B0806F9F6}" destId="{4936C0EE-735B-4022-A21D-F437E8C8FB2C}" srcOrd="0" destOrd="0" presId="urn:microsoft.com/office/officeart/2005/8/layout/orgChart1"/>
-    <dgm:cxn modelId="{7589C0EA-F1D2-480F-B5E5-C964736EEE91}" srcId="{0274927B-4160-4899-AF19-9671AA211A2B}" destId="{54F52B91-96F3-4A93-8C51-4A8BFBEDFA33}" srcOrd="3" destOrd="0" parTransId="{1B000D60-51F0-4F7C-BE26-B6213BFA4932}" sibTransId="{336023B5-0FCD-49A8-BFE0-A6F3DC26439F}"/>
-    <dgm:cxn modelId="{6C5B0C31-EC3E-400B-9C4A-4897F0AEBE09}" type="presOf" srcId="{254F2FB9-B8B1-45E2-A82F-4EBBA8D47F7E}" destId="{6320A880-F80E-4CF8-8C28-17D03A432C6C}" srcOrd="1" destOrd="0" presId="urn:microsoft.com/office/officeart/2005/8/layout/orgChart1"/>
-    <dgm:cxn modelId="{AF9C2987-1FBD-4546-AB70-7201AEAE8C72}" srcId="{0274927B-4160-4899-AF19-9671AA211A2B}" destId="{AB43DBA9-F5B3-4C40-82BF-D52A96D425F7}" srcOrd="6" destOrd="0" parTransId="{EE9E4C87-A11C-4304-96D9-18778AF7F28E}" sibTransId="{031A4502-0573-45B7-8D70-8DD44E424834}"/>
-    <dgm:cxn modelId="{179D3951-A2E5-4513-B07E-23B095C14982}" type="presOf" srcId="{0514F8A1-4B60-46B1-9B43-60C5F0627DF1}" destId="{6FC30F81-EB7F-4DFC-9AA5-C2A37B459F04}" srcOrd="1" destOrd="0" presId="urn:microsoft.com/office/officeart/2005/8/layout/orgChart1"/>
-    <dgm:cxn modelId="{15A8AFED-3CBE-4887-B5A3-BAA849729CEF}" type="presOf" srcId="{46D32E76-4D85-46E4-8C07-C66241E47DA0}" destId="{8556C2F1-BC1A-491E-8AA3-0804AD7B92FA}" srcOrd="0" destOrd="0" presId="urn:microsoft.com/office/officeart/2005/8/layout/orgChart1"/>
-    <dgm:cxn modelId="{C75EBC64-2510-4A51-8131-3111C1333D5C}" type="presOf" srcId="{EF945DD0-6504-45B1-B65D-422FF7CEE416}" destId="{FAA0A73B-BE57-4EBF-BC6E-02688DD94992}" srcOrd="0" destOrd="0" presId="urn:microsoft.com/office/officeart/2005/8/layout/orgChart1"/>
-    <dgm:cxn modelId="{36BDA124-864F-43FE-B765-FA109A9C0381}" srcId="{3045B1B2-DC0A-4607-ACC9-6EA0209878F6}" destId="{5C8EBEB2-45CA-4875-B2C1-3A80FFD2AC67}" srcOrd="0" destOrd="0" parTransId="{AA3915FE-4491-42CC-A1AF-70CBC148FF59}" sibTransId="{87CF262D-40B1-4CCD-A406-357431074C01}"/>
-    <dgm:cxn modelId="{DCDE5DE1-6C54-49B6-829A-7D27B87A3D18}" srcId="{402192EA-635B-4E5A-BC30-CBA091CCA687}" destId="{0514F8A1-4B60-46B1-9B43-60C5F0627DF1}" srcOrd="0" destOrd="0" parTransId="{6558A57C-4982-4A47-B2B2-8AABE7345991}" sibTransId="{5B3A3CB9-257B-4EAE-AA31-FB1004E25F63}"/>
-    <dgm:cxn modelId="{FD50899F-F26F-4C11-83D7-40684D29EC93}" srcId="{B5CEA2D4-A899-4C2C-BA30-79C7F0302244}" destId="{6D36762B-FB57-4DEA-90CD-3F097F4D25CC}" srcOrd="4" destOrd="0" parTransId="{F3C2A341-069D-4991-8990-61DFFDB62E32}" sibTransId="{AED57AF9-10F1-4CD6-9667-9BB1699AF639}"/>
-    <dgm:cxn modelId="{78EA6624-3522-420F-9F83-ADC799C17C7B}" type="presOf" srcId="{46D32E76-4D85-46E4-8C07-C66241E47DA0}" destId="{729B68CE-79E6-4786-9304-868050C8FA07}" srcOrd="1" destOrd="0" presId="urn:microsoft.com/office/officeart/2005/8/layout/orgChart1"/>
-    <dgm:cxn modelId="{AAA020C6-E2F1-4FCD-97BC-637EFFB70E8B}" srcId="{B5CEA2D4-A899-4C2C-BA30-79C7F0302244}" destId="{A9751E97-5308-409A-BD37-D117ED6BF809}" srcOrd="0" destOrd="0" parTransId="{B76B37EA-7611-4BE2-8A94-945B0806F9F6}" sibTransId="{9222EC89-35DE-4ED9-8619-5ACD4F38A454}"/>
-    <dgm:cxn modelId="{9D58EBE9-B38C-439F-A03D-5FEF45F8D98B}" srcId="{3045B1B2-DC0A-4607-ACC9-6EA0209878F6}" destId="{1707DDAA-FF7D-469D-B0BB-E186BF94AAE6}" srcOrd="4" destOrd="0" parTransId="{70C0C7BE-A049-472C-960B-F3918754FB25}" sibTransId="{C3A86372-A69D-4D81-BEFE-2C5701038283}"/>
-    <dgm:cxn modelId="{822968A5-3549-4F8C-A2A0-B202B9481C29}" type="presOf" srcId="{9511AE43-BA7F-49B2-BA3B-266CB9B06C28}" destId="{539C9AB9-A71B-47D2-BAFA-A26EF16D35E9}" srcOrd="0" destOrd="0" presId="urn:microsoft.com/office/officeart/2005/8/layout/orgChart1"/>
-    <dgm:cxn modelId="{7954354A-A23E-42B6-840A-962221585393}" srcId="{CF25F756-588F-4C1B-9591-BB613EE272CB}" destId="{C4DD8EDD-E995-4C25-AFF8-F83A3553FAF9}" srcOrd="1" destOrd="0" parTransId="{0E88CAD0-4595-4D4B-A0AC-4CD7353C555C}" sibTransId="{A1AE32C3-045C-49F6-8F2E-1508D00C4D8D}"/>
+    <dgm:cxn modelId="{ECEA09B3-E84A-402E-B39E-314A30852662}" type="presOf" srcId="{B5CEA2D4-A899-4C2C-BA30-79C7F0302244}" destId="{2B0A4C06-23E2-4C10-ACD4-A1381D5956C7}" srcOrd="1" destOrd="0" presId="urn:microsoft.com/office/officeart/2005/8/layout/orgChart1"/>
+    <dgm:cxn modelId="{EB16C9F3-0336-47ED-95E3-123870197157}" type="presOf" srcId="{0F3850D7-801C-4B55-B4EE-9750549084FF}" destId="{08B4D769-2DB8-4026-BE5A-65BB0EFF9F14}" srcOrd="0" destOrd="0" presId="urn:microsoft.com/office/officeart/2005/8/layout/orgChart1"/>
+    <dgm:cxn modelId="{3C7E6FE5-35A2-4927-9EDD-A3EECBF24268}" type="presOf" srcId="{70C0C7BE-A049-472C-960B-F3918754FB25}" destId="{0A62653C-0DF8-4EDF-A01B-23209F9F26F9}" srcOrd="0" destOrd="0" presId="urn:microsoft.com/office/officeart/2005/8/layout/orgChart1"/>
+    <dgm:cxn modelId="{CB07464A-B6B4-4992-9502-BB5BC462F5BA}" type="presOf" srcId="{02E8AF3B-DB86-4F9A-8D46-27D7319E4BB8}" destId="{54823B34-9DA0-498C-B771-985D797ABA89}" srcOrd="1" destOrd="0" presId="urn:microsoft.com/office/officeart/2005/8/layout/orgChart1"/>
+    <dgm:cxn modelId="{0CFFA502-ED20-4CF9-974C-F5235549C5C0}" type="presOf" srcId="{832D0428-C81C-4895-8335-E8EDA9233ED3}" destId="{E5E7503A-7612-4B0C-A329-AB0202849CA8}" srcOrd="0" destOrd="0" presId="urn:microsoft.com/office/officeart/2005/8/layout/orgChart1"/>
+    <dgm:cxn modelId="{016013A9-4DB3-4A92-A3FF-346A8DD93180}" srcId="{402192EA-635B-4E5A-BC30-CBA091CCA687}" destId="{412D8D73-F653-4132-AF48-FE332EE4AF61}" srcOrd="2" destOrd="0" parTransId="{0F3850D7-801C-4B55-B4EE-9750549084FF}" sibTransId="{EFC177A6-1831-46A1-945C-32C74CF2CF26}"/>
     <dgm:cxn modelId="{95B101A9-67ED-481B-92C6-311D41EBC679}" type="presOf" srcId="{1707DDAA-FF7D-469D-B0BB-E186BF94AAE6}" destId="{3596B5AD-F16B-4ED3-96AA-D3FE4FDF760F}" srcOrd="1" destOrd="0" presId="urn:microsoft.com/office/officeart/2005/8/layout/orgChart1"/>
-    <dgm:cxn modelId="{86138418-D865-456C-9979-35352F147087}" type="presOf" srcId="{5C8EBEB2-45CA-4875-B2C1-3A80FFD2AC67}" destId="{37209606-A253-48BC-A588-886B49BABBD1}" srcOrd="0" destOrd="0" presId="urn:microsoft.com/office/officeart/2005/8/layout/orgChart1"/>
-    <dgm:cxn modelId="{0577416B-B4C3-4654-8F13-8D8E24A33E34}" srcId="{0274927B-4160-4899-AF19-9671AA211A2B}" destId="{2FD0ACBE-A9EE-439B-BDD7-7D04768F5ECB}" srcOrd="8" destOrd="0" parTransId="{115D3D74-8A9E-46A5-8E17-2DD64D5CC212}" sibTransId="{47B2DB87-A5FE-4B74-B4D7-E946093551B1}"/>
-    <dgm:cxn modelId="{1F992E74-4AA4-49BC-9BFB-4C4D6129C73B}" type="presOf" srcId="{6D36762B-FB57-4DEA-90CD-3F097F4D25CC}" destId="{D9ED388C-CEBD-4853-9A3E-C27037FF2C56}" srcOrd="1" destOrd="0" presId="urn:microsoft.com/office/officeart/2005/8/layout/orgChart1"/>
-    <dgm:cxn modelId="{FAF0676E-7D8B-4FED-8FF1-8A24FE76F300}" type="presOf" srcId="{7EE8E44F-0C3A-4679-96F1-03029899B8F6}" destId="{4BD3313B-B6CB-42FE-90CB-13EA1BBA4C78}" srcOrd="0" destOrd="0" presId="urn:microsoft.com/office/officeart/2005/8/layout/orgChart1"/>
-    <dgm:cxn modelId="{4B71338B-B9D8-4098-B4E4-7C6EC0EF8BB9}" type="presOf" srcId="{37682145-075D-4526-BE74-A2FD14772674}" destId="{F2328742-AD42-44F6-93EE-FB64E22017C9}" srcOrd="1" destOrd="0" presId="urn:microsoft.com/office/officeart/2005/8/layout/orgChart1"/>
-    <dgm:cxn modelId="{C0C90986-7735-439D-8A8A-2DC2D098BFCD}" type="presOf" srcId="{3741E197-C607-4BAC-A29B-066FB2751C91}" destId="{4304F539-04CE-41DE-AB0A-040F37901232}" srcOrd="0" destOrd="0" presId="urn:microsoft.com/office/officeart/2005/8/layout/orgChart1"/>
-    <dgm:cxn modelId="{4434AF9F-A12B-4261-84E5-1A9E0125AD32}" type="presOf" srcId="{04A842A6-3D2B-45FE-B6D1-65F0829EE722}" destId="{03285AB4-389B-4A8E-A739-E4FB594C24BF}" srcOrd="1" destOrd="0" presId="urn:microsoft.com/office/officeart/2005/8/layout/orgChart1"/>
-    <dgm:cxn modelId="{280CB2AA-B792-4FC9-B95A-A2192FE6994E}" type="presOf" srcId="{2FD0ACBE-A9EE-439B-BDD7-7D04768F5ECB}" destId="{A135AE1E-C7DE-4D38-BF64-3DB4EBB55480}" srcOrd="1" destOrd="0" presId="urn:microsoft.com/office/officeart/2005/8/layout/orgChart1"/>
-    <dgm:cxn modelId="{33A35940-4742-4DE8-99CF-AF2EECBD1489}" type="presOf" srcId="{4AC75C96-6CDF-4654-8237-F7788401C076}" destId="{F6AF1D9D-BBE8-4B97-95BF-FA0015EF42D6}" srcOrd="0" destOrd="0" presId="urn:microsoft.com/office/officeart/2005/8/layout/orgChart1"/>
-    <dgm:cxn modelId="{016013A9-4DB3-4A92-A3FF-346A8DD93180}" srcId="{402192EA-635B-4E5A-BC30-CBA091CCA687}" destId="{412D8D73-F653-4132-AF48-FE332EE4AF61}" srcOrd="2" destOrd="0" parTransId="{0F3850D7-801C-4B55-B4EE-9750549084FF}" sibTransId="{EFC177A6-1831-46A1-945C-32C74CF2CF26}"/>
-    <dgm:cxn modelId="{5CAC690D-9F55-4BE9-B588-1627A79DA2EE}" srcId="{2FD0ACBE-A9EE-439B-BDD7-7D04768F5ECB}" destId="{BD1DDD68-A030-4E56-A78C-C045A20D5260}" srcOrd="0" destOrd="0" parTransId="{4AC75C96-6CDF-4654-8237-F7788401C076}" sibTransId="{2A6CE0CF-4746-4229-9777-1B3C17C91DE0}"/>
-    <dgm:cxn modelId="{BB975462-7C43-40C6-A560-006B7C6C9DCB}" type="presOf" srcId="{F6903CF6-6A4F-4541-A359-24FE5D01E33B}" destId="{FD7D4D9F-8B82-4134-A440-E709162FB101}" srcOrd="0" destOrd="0" presId="urn:microsoft.com/office/officeart/2005/8/layout/orgChart1"/>
-    <dgm:cxn modelId="{61693362-8410-413A-9868-FDD1E89B4DE9}" type="presOf" srcId="{B9B43DA7-88E6-405B-80FE-1DEC167B1B1B}" destId="{013CEFBA-B0C8-4E53-B75F-CB4965CD6E21}" srcOrd="0" destOrd="0" presId="urn:microsoft.com/office/officeart/2005/8/layout/orgChart1"/>
-    <dgm:cxn modelId="{1F78DAA5-930D-4A06-9D7C-F711202F05E2}" srcId="{2FD0ACBE-A9EE-439B-BDD7-7D04768F5ECB}" destId="{254F2FB9-B8B1-45E2-A82F-4EBBA8D47F7E}" srcOrd="2" destOrd="0" parTransId="{7EE8E44F-0C3A-4679-96F1-03029899B8F6}" sibTransId="{0F138ECC-36AB-47A5-86BF-E34CB11279B0}"/>
-    <dgm:cxn modelId="{99306810-C422-4A11-B504-A746C310C603}" srcId="{CF25F756-588F-4C1B-9591-BB613EE272CB}" destId="{0274927B-4160-4899-AF19-9671AA211A2B}" srcOrd="0" destOrd="0" parTransId="{2AED433D-0597-4258-B441-18772D8834FD}" sibTransId="{A88DCB20-EF2C-4111-AE84-9D6560A02F3F}"/>
-    <dgm:cxn modelId="{95C04DC4-A3AA-4D1D-A2BC-2C4FC4C95D09}" type="presOf" srcId="{BA44C836-44DF-4853-AFD4-C5FBD868FEDE}" destId="{798AF196-C9E6-4068-8D9C-E6C02EBD0190}" srcOrd="1" destOrd="0" presId="urn:microsoft.com/office/officeart/2005/8/layout/orgChart1"/>
-    <dgm:cxn modelId="{B95814A0-0E64-4BBB-8434-FF723E8A37AA}" type="presOf" srcId="{0514F8A1-4B60-46B1-9B43-60C5F0627DF1}" destId="{8A46CCD3-1595-4057-9247-6F1A420CF6FC}" srcOrd="0" destOrd="0" presId="urn:microsoft.com/office/officeart/2005/8/layout/orgChart1"/>
-    <dgm:cxn modelId="{3C9B54B6-7468-4C20-8F01-615772B233DA}" type="presOf" srcId="{3741E197-C607-4BAC-A29B-066FB2751C91}" destId="{C0E743B2-38B4-4FFD-8B35-ADA7FA1431B1}" srcOrd="1" destOrd="0" presId="urn:microsoft.com/office/officeart/2005/8/layout/orgChart1"/>
-    <dgm:cxn modelId="{B18964CA-6A07-4F6B-ABAD-30855C061384}" type="presOf" srcId="{A326D562-FC53-441D-9269-0AED7029A99A}" destId="{CFFDF423-B662-42D5-91DA-0A745D4CA88E}" srcOrd="0" destOrd="0" presId="urn:microsoft.com/office/officeart/2005/8/layout/orgChart1"/>
-    <dgm:cxn modelId="{B8345951-406F-42FA-A46F-6C945752FE5D}" type="presOf" srcId="{54F52B91-96F3-4A93-8C51-4A8BFBEDFA33}" destId="{951AA7AC-1C1A-47BB-A6DA-7AE5C0C55E85}" srcOrd="0" destOrd="0" presId="urn:microsoft.com/office/officeart/2005/8/layout/orgChart1"/>
-    <dgm:cxn modelId="{0E65277F-B1FD-4670-8F8A-49D36F192805}" type="presOf" srcId="{9212E598-9C44-43E3-A9F6-848C3F7B98C6}" destId="{629D144A-42A8-455E-BD11-F11473E53343}" srcOrd="0" destOrd="0" presId="urn:microsoft.com/office/officeart/2005/8/layout/orgChart1"/>
-    <dgm:cxn modelId="{470E3917-08F0-42CB-912C-B34C1DCEB9F2}" srcId="{B5CEA2D4-A899-4C2C-BA30-79C7F0302244}" destId="{EB3B4FD7-4B93-4B6A-85DA-411D4E46D809}" srcOrd="5" destOrd="0" parTransId="{FD513F68-9504-4F45-8DCD-794B58A4EE29}" sibTransId="{6D02A1A6-8951-4138-A89A-B2061701541A}"/>
-    <dgm:cxn modelId="{FD8439C0-460D-44BA-AF2D-10C4B6C1F6AF}" type="presOf" srcId="{58F003E5-0E8F-43B2-BD78-8704859781FC}" destId="{D94F6F4E-3CAA-4D71-98C2-5B11B32EE224}" srcOrd="0" destOrd="0" presId="urn:microsoft.com/office/officeart/2005/8/layout/orgChart1"/>
-    <dgm:cxn modelId="{018B8375-43E6-4012-A8DB-C5EF53D4A254}" type="presOf" srcId="{6D36762B-FB57-4DEA-90CD-3F097F4D25CC}" destId="{92C0FB43-53F4-4321-BEF9-66199300F0E8}" srcOrd="0" destOrd="0" presId="urn:microsoft.com/office/officeart/2005/8/layout/orgChart1"/>
-    <dgm:cxn modelId="{8FA63312-87F1-41CF-BC5D-7FAD2845B45B}" srcId="{54F52B91-96F3-4A93-8C51-4A8BFBEDFA33}" destId="{F841F772-F263-44DB-AF9F-DD29A8A41A82}" srcOrd="4" destOrd="0" parTransId="{A6569C1B-F779-4BE0-969E-A2AFB0425B84}" sibTransId="{7ACBF141-9D50-4E5D-AF94-B41447F98FD8}"/>
-    <dgm:cxn modelId="{5DC2F79B-22CC-4DDB-8AEC-3C49FF6F3C7F}" type="presOf" srcId="{412D8D73-F653-4132-AF48-FE332EE4AF61}" destId="{C78F9AFE-E8E1-46DE-9FB8-48A10E9F107A}" srcOrd="1" destOrd="0" presId="urn:microsoft.com/office/officeart/2005/8/layout/orgChart1"/>
-    <dgm:cxn modelId="{DC60566E-3325-44A8-BF9D-E93CF24F4F1B}" type="presOf" srcId="{5C8EBEB2-45CA-4875-B2C1-3A80FFD2AC67}" destId="{08D8DD80-F8DB-42D4-8B5F-8F3E6B33839A}" srcOrd="1" destOrd="0" presId="urn:microsoft.com/office/officeart/2005/8/layout/orgChart1"/>
-    <dgm:cxn modelId="{6B0B129A-52DC-4084-9437-E590BB7F8029}" type="presOf" srcId="{3F86936B-1FD6-48A0-A250-2B1EB4CB5592}" destId="{95757365-1776-4A05-B177-ECC651A46341}" srcOrd="0" destOrd="0" presId="urn:microsoft.com/office/officeart/2005/8/layout/orgChart1"/>
-    <dgm:cxn modelId="{5B9F4857-AE66-49AE-97AF-AC08E3374E91}" type="presOf" srcId="{A9751E97-5308-409A-BD37-D117ED6BF809}" destId="{4F17F90F-8BD4-4804-A10D-0E0D98F92923}" srcOrd="1" destOrd="0" presId="urn:microsoft.com/office/officeart/2005/8/layout/orgChart1"/>
-    <dgm:cxn modelId="{75ADC4CC-1737-4686-9763-E65CC106FD7E}" type="presOf" srcId="{0C48992A-DA9E-416D-B351-F6CF3917497B}" destId="{B8EF8860-201E-4A47-880F-FE1C62264548}" srcOrd="1" destOrd="0" presId="urn:microsoft.com/office/officeart/2005/8/layout/orgChart1"/>
-    <dgm:cxn modelId="{BB2DD168-BA68-42B7-AEDE-DAA9596301E3}" type="presOf" srcId="{04BB0C87-6F2D-4619-8302-191948EC74A6}" destId="{D3CE8887-ABBE-448D-AE41-463E6DCE7983}" srcOrd="0" destOrd="0" presId="urn:microsoft.com/office/officeart/2005/8/layout/orgChart1"/>
-    <dgm:cxn modelId="{3D94E4F5-FA5D-48A7-822A-3E3729C83107}" type="presOf" srcId="{02E8AF3B-DB86-4F9A-8D46-27D7319E4BB8}" destId="{0A9A1E76-FE42-4D99-8E38-8C153C3BEC71}" srcOrd="0" destOrd="0" presId="urn:microsoft.com/office/officeart/2005/8/layout/orgChart1"/>
-    <dgm:cxn modelId="{E6BE837F-4910-4A69-9D48-65CA9F929710}" type="presOf" srcId="{CF25F756-588F-4C1B-9591-BB613EE272CB}" destId="{DB6D70D1-1334-4D38-846C-FFDB7A9BF7E5}" srcOrd="0" destOrd="0" presId="urn:microsoft.com/office/officeart/2005/8/layout/orgChart1"/>
-    <dgm:cxn modelId="{CFF3F06F-4905-4450-9C76-4D3CC843071A}" type="presOf" srcId="{1707DDAA-FF7D-469D-B0BB-E186BF94AAE6}" destId="{9C2D6E1B-1D6A-40AE-936F-284B7321FF42}" srcOrd="0" destOrd="0" presId="urn:microsoft.com/office/officeart/2005/8/layout/orgChart1"/>
-    <dgm:cxn modelId="{FE49A724-E0FE-4FCF-A886-5484A9F8DD20}" type="presOf" srcId="{FDC9F48B-2A97-42BB-A94D-14DD284B616A}" destId="{96A2D62A-7231-40B0-A064-11231D9FBD36}" srcOrd="0" destOrd="0" presId="urn:microsoft.com/office/officeart/2005/8/layout/orgChart1"/>
-    <dgm:cxn modelId="{3C7E6FE5-35A2-4927-9EDD-A3EECBF24268}" type="presOf" srcId="{70C0C7BE-A049-472C-960B-F3918754FB25}" destId="{0A62653C-0DF8-4EDF-A01B-23209F9F26F9}" srcOrd="0" destOrd="0" presId="urn:microsoft.com/office/officeart/2005/8/layout/orgChart1"/>
-    <dgm:cxn modelId="{C008063F-1F1E-4934-8A59-A7B4187AD825}" srcId="{B5CEA2D4-A899-4C2C-BA30-79C7F0302244}" destId="{206FA317-2A95-4AFD-B801-ED2E3F52304B}" srcOrd="1" destOrd="0" parTransId="{463DAE48-7CE6-4E11-AAB1-77194570CA13}" sibTransId="{D951AF62-7ECE-4764-8F28-FC9C836D48FD}"/>
-    <dgm:cxn modelId="{E665BA21-7FE8-48B2-96CF-DB793048864E}" type="presOf" srcId="{CF2D02B9-0D4C-438A-9A09-36265FCD126F}" destId="{DC286486-1041-4CF2-B1D9-ED9F8D4CAF4B}" srcOrd="0" destOrd="0" presId="urn:microsoft.com/office/officeart/2005/8/layout/orgChart1"/>
-    <dgm:cxn modelId="{EB16C9F3-0336-47ED-95E3-123870197157}" type="presOf" srcId="{0F3850D7-801C-4B55-B4EE-9750549084FF}" destId="{08B4D769-2DB8-4026-BE5A-65BB0EFF9F14}" srcOrd="0" destOrd="0" presId="urn:microsoft.com/office/officeart/2005/8/layout/orgChart1"/>
-    <dgm:cxn modelId="{7DD2DEBE-FD31-42D9-853D-A07CDDFC492A}" srcId="{54F52B91-96F3-4A93-8C51-4A8BFBEDFA33}" destId="{A326D562-FC53-441D-9269-0AED7029A99A}" srcOrd="2" destOrd="0" parTransId="{B9B43DA7-88E6-405B-80FE-1DEC167B1B1B}" sibTransId="{E384CD7F-CCD7-4EBB-B2D8-242295143101}"/>
-    <dgm:cxn modelId="{7007CF1C-F494-4E1D-A56C-93EDF0B4B9A5}" type="presOf" srcId="{EE9E4C87-A11C-4304-96D9-18778AF7F28E}" destId="{CF5D86D5-9735-45A9-A995-59A8FC794786}" srcOrd="0" destOrd="0" presId="urn:microsoft.com/office/officeart/2005/8/layout/orgChart1"/>
-    <dgm:cxn modelId="{42B09E8C-E277-4CE8-BD53-7BE557AE411F}" srcId="{402192EA-635B-4E5A-BC30-CBA091CCA687}" destId="{1E3ABECC-8D21-4FCF-8F22-4047954C6620}" srcOrd="1" destOrd="0" parTransId="{04BB0C87-6F2D-4619-8302-191948EC74A6}" sibTransId="{1D40B57F-B1D3-4540-9467-5C23E68DD271}"/>
-    <dgm:cxn modelId="{4BD61198-FE72-4108-8862-3C1E1BE2E555}" type="presOf" srcId="{C88AE6E3-0700-4F24-88F8-01A94F1EFDD0}" destId="{1D844913-ECD1-4382-9097-101154A0FCC7}" srcOrd="0" destOrd="0" presId="urn:microsoft.com/office/officeart/2005/8/layout/orgChart1"/>
-    <dgm:cxn modelId="{FE77CDC2-BF05-48F0-AF4F-F510D408A4E9}" type="presOf" srcId="{BD1DDD68-A030-4E56-A78C-C045A20D5260}" destId="{16A9F9D7-3787-4714-911F-99186952F738}" srcOrd="1" destOrd="0" presId="urn:microsoft.com/office/officeart/2005/8/layout/orgChart1"/>
-    <dgm:cxn modelId="{6599F7E2-3E16-4051-8CA2-C2423E791985}" srcId="{B5CEA2D4-A899-4C2C-BA30-79C7F0302244}" destId="{04A842A6-3D2B-45FE-B6D1-65F0829EE722}" srcOrd="2" destOrd="0" parTransId="{F6903CF6-6A4F-4541-A359-24FE5D01E33B}" sibTransId="{B14EF6FE-A1CE-4C76-A341-23F4013BAF2C}"/>
-    <dgm:cxn modelId="{4FC66C13-652D-4D9E-894C-304BFF5B9D07}" type="presOf" srcId="{F3C2A341-069D-4991-8990-61DFFDB62E32}" destId="{41D8D129-29D8-4385-B786-894926FEDC42}" srcOrd="0" destOrd="0" presId="urn:microsoft.com/office/officeart/2005/8/layout/orgChart1"/>
-    <dgm:cxn modelId="{0C669FE1-EEE0-4409-9179-F88DF46C55B0}" type="presOf" srcId="{206FA317-2A95-4AFD-B801-ED2E3F52304B}" destId="{5EE94A07-DE5A-4F7A-A8DD-16D552E2D98E}" srcOrd="0" destOrd="0" presId="urn:microsoft.com/office/officeart/2005/8/layout/orgChart1"/>
-    <dgm:cxn modelId="{6B133501-15D8-40A4-9695-7BA636A69B74}" type="presOf" srcId="{99D9C4F3-84D0-4398-BA5C-83FCBD76B890}" destId="{C4B0F77B-E2E0-457D-812E-29E9BE3E4085}" srcOrd="0" destOrd="0" presId="urn:microsoft.com/office/officeart/2005/8/layout/orgChart1"/>
-    <dgm:cxn modelId="{38EEAE5E-BE61-432A-AD98-11B56DFE10F7}" srcId="{3045B1B2-DC0A-4607-ACC9-6EA0209878F6}" destId="{3F86936B-1FD6-48A0-A250-2B1EB4CB5592}" srcOrd="2" destOrd="0" parTransId="{882C9CBD-8965-4D73-98D7-54F437501BE5}" sibTransId="{D879D27F-8D76-420C-B068-F16896F28251}"/>
-    <dgm:cxn modelId="{0CFFA502-ED20-4CF9-974C-F5235549C5C0}" type="presOf" srcId="{832D0428-C81C-4895-8335-E8EDA9233ED3}" destId="{E5E7503A-7612-4B0C-A329-AB0202849CA8}" srcOrd="0" destOrd="0" presId="urn:microsoft.com/office/officeart/2005/8/layout/orgChart1"/>
-    <dgm:cxn modelId="{527572C4-BA8D-459B-B847-E6CF4746ED33}" type="presOf" srcId="{8B86F944-694A-43B9-BD2C-86002A138388}" destId="{97C1ADA8-C573-433C-A903-2B5AF2D11025}" srcOrd="0" destOrd="0" presId="urn:microsoft.com/office/officeart/2005/8/layout/orgChart1"/>
-    <dgm:cxn modelId="{8483C8D2-1419-4A30-9BD1-5286CA25BFEE}" srcId="{0274927B-4160-4899-AF19-9671AA211A2B}" destId="{02E8AF3B-DB86-4F9A-8D46-27D7319E4BB8}" srcOrd="10" destOrd="0" parTransId="{8017E421-4010-47DD-B3A2-150D7F01784C}" sibTransId="{4CCAA9F6-7FF4-460F-8B35-21E70EA635D7}"/>
-    <dgm:cxn modelId="{0881988A-2EFD-41E2-B661-F9FD54DF2A49}" type="presOf" srcId="{FDC9F48B-2A97-42BB-A94D-14DD284B616A}" destId="{604E9955-A4D8-4EF3-AB62-04F2B6924221}" srcOrd="1" destOrd="0" presId="urn:microsoft.com/office/officeart/2005/8/layout/orgChart1"/>
-    <dgm:cxn modelId="{6D18F23A-B8E9-40E0-8200-ED7CD56BB661}" type="presOf" srcId="{C88AE6E3-0700-4F24-88F8-01A94F1EFDD0}" destId="{20D19837-0E96-49A9-A9CC-3C434CEB5CA5}" srcOrd="1" destOrd="0" presId="urn:microsoft.com/office/officeart/2005/8/layout/orgChart1"/>
-    <dgm:cxn modelId="{E5408A45-9A01-47D5-B725-662A37C3340C}" srcId="{CF25F756-588F-4C1B-9591-BB613EE272CB}" destId="{99D9C4F3-84D0-4398-BA5C-83FCBD76B890}" srcOrd="2" destOrd="0" parTransId="{3A25750F-ADFB-4D21-B8B6-684EEA04E5D7}" sibTransId="{F42F600E-F4EB-47EA-A759-12F2ADD0ABF2}"/>
-    <dgm:cxn modelId="{61DCE5D3-7B15-4938-B75E-022005639926}" type="presOf" srcId="{AB43DBA9-F5B3-4C40-82BF-D52A96D425F7}" destId="{E3E0D748-1710-4B33-AF18-2F3C83F11CF1}" srcOrd="0" destOrd="0" presId="urn:microsoft.com/office/officeart/2005/8/layout/orgChart1"/>
-    <dgm:cxn modelId="{7E14F6EE-543A-4DFC-B59A-863DA63B9650}" type="presOf" srcId="{99D9C4F3-84D0-4398-BA5C-83FCBD76B890}" destId="{17805C60-C0CE-46BF-BA01-F8C5D9F70B79}" srcOrd="1" destOrd="0" presId="urn:microsoft.com/office/officeart/2005/8/layout/orgChart1"/>
-    <dgm:cxn modelId="{B5331952-654B-41E8-8B81-CA6847CA4AA3}" type="presOf" srcId="{0274927B-4160-4899-AF19-9671AA211A2B}" destId="{25FA3ADB-37ED-43D8-B4C9-DE7BAE16907E}" srcOrd="0" destOrd="0" presId="urn:microsoft.com/office/officeart/2005/8/layout/orgChart1"/>
-    <dgm:cxn modelId="{742D2062-A4FD-4CB2-9479-40D34C47DA72}" type="presOf" srcId="{FD513F68-9504-4F45-8DCD-794B58A4EE29}" destId="{5C2972FE-C97E-42B6-9A79-1CF8DC5B6AE4}" srcOrd="0" destOrd="0" presId="urn:microsoft.com/office/officeart/2005/8/layout/orgChart1"/>
-    <dgm:cxn modelId="{CB07464A-B6B4-4992-9502-BB5BC462F5BA}" type="presOf" srcId="{02E8AF3B-DB86-4F9A-8D46-27D7319E4BB8}" destId="{54823B34-9DA0-498C-B771-985D797ABA89}" srcOrd="1" destOrd="0" presId="urn:microsoft.com/office/officeart/2005/8/layout/orgChart1"/>
-    <dgm:cxn modelId="{518D6E0E-2DD8-408C-8483-42E5D888A3AB}" type="presOf" srcId="{54F52B91-96F3-4A93-8C51-4A8BFBEDFA33}" destId="{C2459311-6B3C-4BB4-94D4-CB66B518FA25}" srcOrd="1" destOrd="0" presId="urn:microsoft.com/office/officeart/2005/8/layout/orgChart1"/>
-    <dgm:cxn modelId="{631AAAC2-CDD0-4B57-8477-EA1EE501EAAD}" type="presOf" srcId="{C4DD8EDD-E995-4C25-AFF8-F83A3553FAF9}" destId="{234957EB-CEAB-4D64-9578-75C67240B327}" srcOrd="0" destOrd="0" presId="urn:microsoft.com/office/officeart/2005/8/layout/orgChart1"/>
-    <dgm:cxn modelId="{ECEA09B3-E84A-402E-B39E-314A30852662}" type="presOf" srcId="{B5CEA2D4-A899-4C2C-BA30-79C7F0302244}" destId="{2B0A4C06-23E2-4C10-ACD4-A1381D5956C7}" srcOrd="1" destOrd="0" presId="urn:microsoft.com/office/officeart/2005/8/layout/orgChart1"/>
-    <dgm:cxn modelId="{43349553-738B-4624-AAC5-F2B0E85215DE}" type="presOf" srcId="{F841F772-F263-44DB-AF9F-DD29A8A41A82}" destId="{2F56B4D2-400A-48F1-9F86-328A9D96FD6A}" srcOrd="0" destOrd="0" presId="urn:microsoft.com/office/officeart/2005/8/layout/orgChart1"/>
-    <dgm:cxn modelId="{6BAEB582-5EBC-485A-9375-D2CE48F60D85}" type="presOf" srcId="{CF2D02B9-0D4C-438A-9A09-36265FCD126F}" destId="{D5DB1BF8-7727-41DB-8711-7758CBC1CD9E}" srcOrd="1" destOrd="0" presId="urn:microsoft.com/office/officeart/2005/8/layout/orgChart1"/>
     <dgm:cxn modelId="{E5F2F7F3-DE38-4F3B-9FD9-E04636928AB0}" srcId="{0274927B-4160-4899-AF19-9671AA211A2B}" destId="{C88AE6E3-0700-4F24-88F8-01A94F1EFDD0}" srcOrd="2" destOrd="0" parTransId="{F7A70203-5488-40A0-9132-52AF0CCC0865}" sibTransId="{78980ABB-0FED-49B9-BE6C-FAFA6324EC58}"/>
-    <dgm:cxn modelId="{B25AD49F-A8A5-4677-B9E3-424D2A8FE749}" type="presOf" srcId="{EB3B4FD7-4B93-4B6A-85DA-411D4E46D809}" destId="{586BD3CC-D024-49AE-98A9-57447680C793}" srcOrd="1" destOrd="0" presId="urn:microsoft.com/office/officeart/2005/8/layout/orgChart1"/>
-    <dgm:cxn modelId="{D6803FCC-8BE9-4C25-8FEB-644A34BA37A8}" type="presOf" srcId="{7C6E53BB-7621-4B9E-B8AB-2A5789109803}" destId="{90856F93-6928-4F29-A715-1CCE16DEB8CE}" srcOrd="0" destOrd="0" presId="urn:microsoft.com/office/officeart/2005/8/layout/orgChart1"/>
-    <dgm:cxn modelId="{98F07B5B-75D3-49F7-94A0-F7D9A2F6451E}" srcId="{54F52B91-96F3-4A93-8C51-4A8BFBEDFA33}" destId="{BA44C836-44DF-4853-AFD4-C5FBD868FEDE}" srcOrd="1" destOrd="0" parTransId="{BC73FEC3-7BE4-4F76-A05A-FAEB1EC6BC05}" sibTransId="{6ADE4D33-09B9-4239-A019-D8A168ED53FD}"/>
-    <dgm:cxn modelId="{D2ABC662-1AF9-4909-B9FD-0244068A5D15}" srcId="{0274927B-4160-4899-AF19-9671AA211A2B}" destId="{FDC9F48B-2A97-42BB-A94D-14DD284B616A}" srcOrd="0" destOrd="0" parTransId="{EF945DD0-6504-45B1-B65D-422FF7CEE416}" sibTransId="{DFBEF7FD-6A4D-43F9-AEF4-4EB26978CE13}"/>
-    <dgm:cxn modelId="{0CD540AE-8D9B-489A-9102-FF2CA51BFADA}" type="presOf" srcId="{6667787B-8278-48F1-A8AA-4BBEBED29AC7}" destId="{24DB76FC-FDBB-4AED-BE5A-4E4AE56E9F1D}" srcOrd="0" destOrd="0" presId="urn:microsoft.com/office/officeart/2005/8/layout/orgChart1"/>
-    <dgm:cxn modelId="{B920FDA4-A114-4410-B52A-4B8C6F900B9D}" srcId="{54F52B91-96F3-4A93-8C51-4A8BFBEDFA33}" destId="{37682145-075D-4526-BE74-A2FD14772674}" srcOrd="3" destOrd="0" parTransId="{C7416EEA-DB93-48CB-9F21-97C8588E35DD}" sibTransId="{070BD383-E262-4C90-83CA-403E164C32E9}"/>
-    <dgm:cxn modelId="{36109025-B4F3-4D97-BA31-38ECFB40F4A5}" type="presOf" srcId="{8017E421-4010-47DD-B3A2-150D7F01784C}" destId="{E897A794-E666-4DCD-89D5-3E766B270427}" srcOrd="0" destOrd="0" presId="urn:microsoft.com/office/officeart/2005/8/layout/orgChart1"/>
-    <dgm:cxn modelId="{1EE40FC0-F1BD-4263-BAD4-CC6F348231B7}" type="presOf" srcId="{B5CEA2D4-A899-4C2C-BA30-79C7F0302244}" destId="{E6677268-D00C-4D1B-A6D9-295F28778097}" srcOrd="0" destOrd="0" presId="urn:microsoft.com/office/officeart/2005/8/layout/orgChart1"/>
-    <dgm:cxn modelId="{2CF812D9-A1D6-4C9A-9AE5-DF4CD1A1373E}" type="presOf" srcId="{F7A70203-5488-40A0-9132-52AF0CCC0865}" destId="{0AD1E2AE-974D-4F7C-AFCD-74206E1B3B56}" srcOrd="0" destOrd="0" presId="urn:microsoft.com/office/officeart/2005/8/layout/orgChart1"/>
-    <dgm:cxn modelId="{43A0D668-0B81-488C-B539-E05FDD4B788A}" type="presOf" srcId="{463DAE48-7CE6-4E11-AAB1-77194570CA13}" destId="{613C03D6-7054-4B73-96F2-78EDD8671AF2}" srcOrd="0" destOrd="0" presId="urn:microsoft.com/office/officeart/2005/8/layout/orgChart1"/>
-    <dgm:cxn modelId="{04BD9444-96F5-4F9F-96D6-6E5D8150702D}" srcId="{3045B1B2-DC0A-4607-ACC9-6EA0209878F6}" destId="{3741E197-C607-4BAC-A29B-066FB2751C91}" srcOrd="3" destOrd="0" parTransId="{13F23037-5BD1-4678-8671-2EBB7A37F8AB}" sibTransId="{74813959-29CD-4409-BACF-AE9B76174F0E}"/>
-    <dgm:cxn modelId="{D407C968-7B37-4AC5-BAE5-53670733AE77}" srcId="{0274927B-4160-4899-AF19-9671AA211A2B}" destId="{3045B1B2-DC0A-4607-ACC9-6EA0209878F6}" srcOrd="5" destOrd="0" parTransId="{FC3BE7C2-CAF1-4079-9560-5489769EFC27}" sibTransId="{7575C62C-8AC3-4892-8DE6-501D67B8487C}"/>
-    <dgm:cxn modelId="{37B5C6F7-86B6-4B9F-AE70-934CB0BB92DB}" type="presOf" srcId="{832D0428-C81C-4895-8335-E8EDA9233ED3}" destId="{149078CD-1B5B-412D-A0CE-202071623540}" srcOrd="1" destOrd="0" presId="urn:microsoft.com/office/officeart/2005/8/layout/orgChart1"/>
-    <dgm:cxn modelId="{7DC2941D-E610-4BCD-8652-284A35A1A2DA}" type="presOf" srcId="{3045B1B2-DC0A-4607-ACC9-6EA0209878F6}" destId="{B6A114D4-4B75-4F1E-A379-E402CD10E6C4}" srcOrd="1" destOrd="0" presId="urn:microsoft.com/office/officeart/2005/8/layout/orgChart1"/>
-    <dgm:cxn modelId="{F6B9E185-F40A-4EBC-848F-9E64DC052541}" type="presOf" srcId="{402192EA-635B-4E5A-BC30-CBA091CCA687}" destId="{53F64DE1-C267-4768-9640-9F5FECF761EF}" srcOrd="0" destOrd="0" presId="urn:microsoft.com/office/officeart/2005/8/layout/orgChart1"/>
-    <dgm:cxn modelId="{7E87572C-AE05-4E5D-93DE-CE05C6D95BF6}" type="presOf" srcId="{13F23037-5BD1-4678-8671-2EBB7A37F8AB}" destId="{4E5E3395-7D78-4F0F-8BA4-0CA66D4382A3}" srcOrd="0" destOrd="0" presId="urn:microsoft.com/office/officeart/2005/8/layout/orgChart1"/>
-    <dgm:cxn modelId="{CC6C2AB1-69AD-4C55-944B-2488ABAC2C31}" srcId="{54F52B91-96F3-4A93-8C51-4A8BFBEDFA33}" destId="{9212E598-9C44-43E3-A9F6-848C3F7B98C6}" srcOrd="0" destOrd="0" parTransId="{A3998B0F-A5C6-48FE-B0BC-BF0B7E2B7081}" sibTransId="{8F01BDFD-242D-4425-AA2F-94FB37A1DABF}"/>
-    <dgm:cxn modelId="{4F62E5FA-E573-4A1B-BD41-0E9869B668C9}" type="presOf" srcId="{A9751E97-5308-409A-BD37-D117ED6BF809}" destId="{15F2BC78-D50C-4AAD-8B4C-69F04EAC3A17}" srcOrd="0" destOrd="0" presId="urn:microsoft.com/office/officeart/2005/8/layout/orgChart1"/>
-    <dgm:cxn modelId="{C913FD22-4830-479B-8D0B-C63B9BEF77E3}" srcId="{0274927B-4160-4899-AF19-9671AA211A2B}" destId="{402192EA-635B-4E5A-BC30-CBA091CCA687}" srcOrd="9" destOrd="0" parTransId="{58F003E5-0E8F-43B2-BD78-8704859781FC}" sibTransId="{6DD285F6-212B-4270-B8AA-A5F40C494517}"/>
-    <dgm:cxn modelId="{C5368941-0513-4146-85AE-2FDC9E05624D}" type="presOf" srcId="{49114A9B-D2E0-4713-9DBF-1B7318FD9E27}" destId="{D5BAEF3F-BD35-4D7E-A4FF-F30965920AFA}" srcOrd="1" destOrd="0" presId="urn:microsoft.com/office/officeart/2005/8/layout/orgChart1"/>
-    <dgm:cxn modelId="{AE8D0DAB-690F-46E9-8961-28D7AB9F49FB}" type="presOf" srcId="{2FD0ACBE-A9EE-439B-BDD7-7D04768F5ECB}" destId="{7BD2452F-63BA-4404-A09F-0848D6551F58}" srcOrd="0" destOrd="0" presId="urn:microsoft.com/office/officeart/2005/8/layout/orgChart1"/>
-    <dgm:cxn modelId="{721B8B6A-B60A-4FC9-B228-A79D3958DB03}" srcId="{3045B1B2-DC0A-4607-ACC9-6EA0209878F6}" destId="{0C48992A-DA9E-416D-B351-F6CF3917497B}" srcOrd="1" destOrd="0" parTransId="{7C6E53BB-7621-4B9E-B8AB-2A5789109803}" sibTransId="{BEFB7897-8604-43A3-978F-CBD7C072936F}"/>
-    <dgm:cxn modelId="{BE3C66EF-27B9-4A99-A1E5-D071DE70B0FA}" type="presOf" srcId="{6558A57C-4982-4A47-B2B2-8AABE7345991}" destId="{0845B1E8-7FE0-46CA-B690-B70A34907BDB}" srcOrd="0" destOrd="0" presId="urn:microsoft.com/office/officeart/2005/8/layout/orgChart1"/>
-    <dgm:cxn modelId="{419E7F53-7DD8-4D1F-90D9-CDE59C63B3CF}" srcId="{0274927B-4160-4899-AF19-9671AA211A2B}" destId="{832D0428-C81C-4895-8335-E8EDA9233ED3}" srcOrd="1" destOrd="0" parTransId="{E51BC5A4-9C0D-4258-B89D-D0AE1ABE08D8}" sibTransId="{F6B1AA2B-235E-4C17-88CA-E0378EFC754E}"/>
-    <dgm:cxn modelId="{597EA3C6-690C-4F99-ADC8-91DFADD01181}" srcId="{CF25F756-588F-4C1B-9591-BB613EE272CB}" destId="{CF2D02B9-0D4C-438A-9A09-36265FCD126F}" srcOrd="3" destOrd="0" parTransId="{4576AD9C-8D01-4FF0-8AC4-65179B9664FE}" sibTransId="{FA63D66A-DDD5-4F5D-B3BF-62E3A3C4FC88}"/>
-    <dgm:cxn modelId="{689B0FDE-CB8E-4179-A867-4477D1AD48AA}" srcId="{0274927B-4160-4899-AF19-9671AA211A2B}" destId="{46D32E76-4D85-46E4-8C07-C66241E47DA0}" srcOrd="7" destOrd="0" parTransId="{CC418A99-34CE-4F58-A0D7-696AF26529A1}" sibTransId="{72CB8CFE-6056-44BB-83B7-7F6297D1FDAF}"/>
-    <dgm:cxn modelId="{53F59307-5FBF-422B-9F83-0D71C87A73DC}" type="presOf" srcId="{1E3ABECC-8D21-4FCF-8F22-4047954C6620}" destId="{D27660A4-8C22-4AA8-8F93-D6A250C1942F}" srcOrd="1" destOrd="0" presId="urn:microsoft.com/office/officeart/2005/8/layout/orgChart1"/>
-    <dgm:cxn modelId="{E45A1D5E-F2D1-43DF-ACCB-A614361DE9F2}" type="presOf" srcId="{CC418A99-34CE-4F58-A0D7-696AF26529A1}" destId="{F262803E-CFEC-49FE-80FB-BF7DB555A7BE}" srcOrd="0" destOrd="0" presId="urn:microsoft.com/office/officeart/2005/8/layout/orgChart1"/>
-    <dgm:cxn modelId="{7102A93F-B189-4FA5-93F3-64C97B0D5822}" type="presOf" srcId="{C7416EEA-DB93-48CB-9F21-97C8588E35DD}" destId="{A2F494B7-1FD7-47D3-91A2-9B488590CB64}" srcOrd="0" destOrd="0" presId="urn:microsoft.com/office/officeart/2005/8/layout/orgChart1"/>
-    <dgm:cxn modelId="{813B0836-45E5-494D-AF6A-D39BD059002D}" type="presOf" srcId="{EB3B4FD7-4B93-4B6A-85DA-411D4E46D809}" destId="{BF212140-F00B-41BB-95FA-AB60DEA3AD26}" srcOrd="0" destOrd="0" presId="urn:microsoft.com/office/officeart/2005/8/layout/orgChart1"/>
-    <dgm:cxn modelId="{A5EA83FC-7CE6-4554-9859-FE4AF4EBBBB5}" type="presOf" srcId="{BC73FEC3-7BE4-4F76-A05A-FAEB1EC6BC05}" destId="{1256D7E3-FC8E-4DD7-B64E-2DF45B28EE68}" srcOrd="0" destOrd="0" presId="urn:microsoft.com/office/officeart/2005/8/layout/orgChart1"/>
-    <dgm:cxn modelId="{BC8BED82-C43C-41C2-A297-6E63B4A2516D}" type="presOf" srcId="{C4DD8EDD-E995-4C25-AFF8-F83A3553FAF9}" destId="{5D30D3E5-3448-4B85-9084-9844DD694E7F}" srcOrd="1" destOrd="0" presId="urn:microsoft.com/office/officeart/2005/8/layout/orgChart1"/>
-    <dgm:cxn modelId="{0CA65E07-E810-4F3D-8ACA-44003628B23F}" type="presOf" srcId="{BA44C836-44DF-4853-AFD4-C5FBD868FEDE}" destId="{AC413AD4-05E8-4882-B724-048726377750}" srcOrd="0" destOrd="0" presId="urn:microsoft.com/office/officeart/2005/8/layout/orgChart1"/>
-    <dgm:cxn modelId="{85026290-96D5-4D0F-9075-6ECB10EE9BFA}" srcId="{B5CEA2D4-A899-4C2C-BA30-79C7F0302244}" destId="{49114A9B-D2E0-4713-9DBF-1B7318FD9E27}" srcOrd="3" destOrd="0" parTransId="{9511AE43-BA7F-49B2-BA3B-266CB9B06C28}" sibTransId="{E3FE093F-97A4-4DFF-8A60-A5C2CF1AA222}"/>
-    <dgm:cxn modelId="{F7F13506-2B9D-4500-85CB-8395DC2ED769}" type="presOf" srcId="{3045B1B2-DC0A-4607-ACC9-6EA0209878F6}" destId="{A3596C5C-D5BF-4D1F-99EE-77880EC19FC8}" srcOrd="0" destOrd="0" presId="urn:microsoft.com/office/officeart/2005/8/layout/orgChart1"/>
     <dgm:cxn modelId="{E9D4FDF6-F7BD-4409-A351-CAF38DF6E4ED}" type="presParOf" srcId="{DB6D70D1-1334-4D38-846C-FFDB7A9BF7E5}" destId="{9414EEE7-8A55-4F1D-B7B2-55144D1993C0}" srcOrd="0" destOrd="0" presId="urn:microsoft.com/office/officeart/2005/8/layout/orgChart1"/>
     <dgm:cxn modelId="{C79EA834-E32B-4581-B497-5400F649A34A}" type="presParOf" srcId="{9414EEE7-8A55-4F1D-B7B2-55144D1993C0}" destId="{E6340D80-BCAD-4D87-A180-8BD23DDCC608}" srcOrd="0" destOrd="0" presId="urn:microsoft.com/office/officeart/2005/8/layout/orgChart1"/>
     <dgm:cxn modelId="{3CED8516-F723-4B14-9C61-58AF6AC4D93D}" type="presParOf" srcId="{E6340D80-BCAD-4D87-A180-8BD23DDCC608}" destId="{25FA3ADB-37ED-43D8-B4C9-DE7BAE16907E}" srcOrd="0" destOrd="0" presId="urn:microsoft.com/office/officeart/2005/8/layout/orgChart1"/>
@@ -7938,7 +7945,7 @@
               <a:latin typeface="Arial" panose="020B0604020202020204" pitchFamily="34" charset="0"/>
               <a:cs typeface="Arial" panose="020B0604020202020204" pitchFamily="34" charset="0"/>
             </a:rPr>
-            <a:t>1.1</a:t>
+            <a:t>1.0</a:t>
           </a:r>
         </a:p>
         <a:p>
@@ -11689,7 +11696,7 @@
               <a:latin typeface="Arial" panose="020B0604020202020204" pitchFamily="34" charset="0"/>
               <a:cs typeface="Arial" panose="020B0604020202020204" pitchFamily="34" charset="0"/>
             </a:rPr>
-            <a:t>1.2</a:t>
+            <a:t>1.1</a:t>
           </a:r>
         </a:p>
         <a:p>
@@ -11792,7 +11799,7 @@
               <a:latin typeface="Arial" panose="020B0604020202020204" pitchFamily="34" charset="0"/>
               <a:cs typeface="Arial" panose="020B0604020202020204" pitchFamily="34" charset="0"/>
             </a:rPr>
-            <a:t>1.3</a:t>
+            <a:t>1.2</a:t>
           </a:r>
         </a:p>
         <a:p>
@@ -14390,7 +14397,7 @@
           <a:p>
             <a:fld id="{F5E77B19-4C30-44B4-BD0B-CE34772B3C65}" type="datetimeFigureOut">
               <a:rPr lang="en-US" smtClean="0"/>
-              <a:t>11/14/2017</a:t>
+              <a:t>11/15/2017</a:t>
             </a:fld>
             <a:endParaRPr lang="en-US" dirty="0"/>
           </a:p>
@@ -15659,7 +15666,7 @@
           <a:p>
             <a:fld id="{14973A1A-3B12-4F13-9E45-4B4F2CF06D13}" type="datetimeFigureOut">
               <a:rPr lang="en-US" smtClean="0"/>
-              <a:t>11/14/2017</a:t>
+              <a:t>11/15/2017</a:t>
             </a:fld>
             <a:endParaRPr lang="en-US" dirty="0"/>
           </a:p>
@@ -15870,7 +15877,7 @@
           <a:p>
             <a:fld id="{14973A1A-3B12-4F13-9E45-4B4F2CF06D13}" type="datetimeFigureOut">
               <a:rPr lang="en-US" smtClean="0"/>
-              <a:t>11/14/2017</a:t>
+              <a:t>11/15/2017</a:t>
             </a:fld>
             <a:endParaRPr lang="en-US" dirty="0"/>
           </a:p>
@@ -16050,7 +16057,7 @@
           <a:p>
             <a:fld id="{14973A1A-3B12-4F13-9E45-4B4F2CF06D13}" type="datetimeFigureOut">
               <a:rPr lang="en-US" smtClean="0"/>
-              <a:t>11/14/2017</a:t>
+              <a:t>11/15/2017</a:t>
             </a:fld>
             <a:endParaRPr lang="en-US" dirty="0"/>
           </a:p>
@@ -16220,7 +16227,7 @@
           <a:p>
             <a:fld id="{14973A1A-3B12-4F13-9E45-4B4F2CF06D13}" type="datetimeFigureOut">
               <a:rPr lang="en-US" smtClean="0"/>
-              <a:t>11/14/2017</a:t>
+              <a:t>11/15/2017</a:t>
             </a:fld>
             <a:endParaRPr lang="en-US" dirty="0"/>
           </a:p>
@@ -16507,7 +16514,7 @@
           <a:p>
             <a:fld id="{14973A1A-3B12-4F13-9E45-4B4F2CF06D13}" type="datetimeFigureOut">
               <a:rPr lang="en-US" smtClean="0"/>
-              <a:t>11/14/2017</a:t>
+              <a:t>11/15/2017</a:t>
             </a:fld>
             <a:endParaRPr lang="en-US" dirty="0"/>
           </a:p>
@@ -16795,7 +16802,7 @@
           <a:p>
             <a:fld id="{14973A1A-3B12-4F13-9E45-4B4F2CF06D13}" type="datetimeFigureOut">
               <a:rPr lang="en-US" smtClean="0"/>
-              <a:t>11/14/2017</a:t>
+              <a:t>11/15/2017</a:t>
             </a:fld>
             <a:endParaRPr lang="en-US" dirty="0"/>
           </a:p>
@@ -17217,7 +17224,7 @@
           <a:p>
             <a:fld id="{14973A1A-3B12-4F13-9E45-4B4F2CF06D13}" type="datetimeFigureOut">
               <a:rPr lang="en-US" smtClean="0"/>
-              <a:t>11/14/2017</a:t>
+              <a:t>11/15/2017</a:t>
             </a:fld>
             <a:endParaRPr lang="en-US" dirty="0"/>
           </a:p>
@@ -17335,7 +17342,7 @@
           <a:p>
             <a:fld id="{14973A1A-3B12-4F13-9E45-4B4F2CF06D13}" type="datetimeFigureOut">
               <a:rPr lang="en-US" smtClean="0"/>
-              <a:t>11/14/2017</a:t>
+              <a:t>11/15/2017</a:t>
             </a:fld>
             <a:endParaRPr lang="en-US" dirty="0"/>
           </a:p>
@@ -17430,7 +17437,7 @@
           <a:p>
             <a:fld id="{14973A1A-3B12-4F13-9E45-4B4F2CF06D13}" type="datetimeFigureOut">
               <a:rPr lang="en-US" smtClean="0"/>
-              <a:t>11/14/2017</a:t>
+              <a:t>11/15/2017</a:t>
             </a:fld>
             <a:endParaRPr lang="en-US" dirty="0"/>
           </a:p>
@@ -17707,7 +17714,7 @@
           <a:p>
             <a:fld id="{14973A1A-3B12-4F13-9E45-4B4F2CF06D13}" type="datetimeFigureOut">
               <a:rPr lang="en-US" smtClean="0"/>
-              <a:t>11/14/2017</a:t>
+              <a:t>11/15/2017</a:t>
             </a:fld>
             <a:endParaRPr lang="en-US" dirty="0"/>
           </a:p>
@@ -17960,7 +17967,7 @@
           <a:p>
             <a:fld id="{14973A1A-3B12-4F13-9E45-4B4F2CF06D13}" type="datetimeFigureOut">
               <a:rPr lang="en-US" smtClean="0"/>
-              <a:t>11/14/2017</a:t>
+              <a:t>11/15/2017</a:t>
             </a:fld>
             <a:endParaRPr lang="en-US" dirty="0"/>
           </a:p>
@@ -18183,7 +18190,7 @@
           <a:p>
             <a:fld id="{14973A1A-3B12-4F13-9E45-4B4F2CF06D13}" type="datetimeFigureOut">
               <a:rPr lang="en-US" smtClean="0"/>
-              <a:t>11/14/2017</a:t>
+              <a:t>11/15/2017</a:t>
             </a:fld>
             <a:endParaRPr lang="en-US" dirty="0"/>
           </a:p>
@@ -19942,7 +19949,7 @@
           <p:nvPr>
             <p:extLst>
               <p:ext uri="{D42A27DB-BD31-4B8C-83A1-F6EECF244321}">
-                <p14:modId xmlns:p14="http://schemas.microsoft.com/office/powerpoint/2010/main" val="2242716166"/>
+                <p14:modId xmlns:p14="http://schemas.microsoft.com/office/powerpoint/2010/main" val="936056936"/>
               </p:ext>
             </p:extLst>
           </p:nvPr>
@@ -20862,12 +20869,20 @@
                         </a:spcAft>
                       </a:pPr>
                       <a:r>
+                        <a:rPr lang="en-US" sz="1300" dirty="0" smtClean="0">
+                          <a:effectLst/>
+                          <a:latin typeface="Arial" panose="020B0604020202020204" pitchFamily="34" charset="0"/>
+                          <a:cs typeface="Arial" panose="020B0604020202020204" pitchFamily="34" charset="0"/>
+                        </a:rPr>
+                        <a:t>Edit </a:t>
+                      </a:r>
+                      <a:r>
                         <a:rPr lang="en-US" sz="1300" dirty="0">
                           <a:effectLst/>
                           <a:latin typeface="Arial" panose="020B0604020202020204" pitchFamily="34" charset="0"/>
                           <a:cs typeface="Arial" panose="020B0604020202020204" pitchFamily="34" charset="0"/>
                         </a:rPr>
-                        <a:t>Create &amp; edit volunteer profile</a:t>
+                        <a:t>volunteer profile</a:t>
                       </a:r>
                       <a:endParaRPr lang="en-US" sz="1300" dirty="0">
                         <a:effectLst/>
@@ -20901,7 +20916,39 @@
                           <a:latin typeface="Arial" panose="020B0604020202020204" pitchFamily="34" charset="0"/>
                           <a:cs typeface="Arial" panose="020B0604020202020204" pitchFamily="34" charset="0"/>
                         </a:rPr>
-                        <a:t>I can help other Friends Chapter members who are not able to create their own volunteer profile.</a:t>
+                        <a:t>I can help other Friends Chapter members who are not able </a:t>
+                      </a:r>
+                      <a:r>
+                        <a:rPr lang="en-US" sz="1200" dirty="0" smtClean="0">
+                          <a:effectLst/>
+                          <a:latin typeface="Arial" panose="020B0604020202020204" pitchFamily="34" charset="0"/>
+                          <a:cs typeface="Arial" panose="020B0604020202020204" pitchFamily="34" charset="0"/>
+                        </a:rPr>
+                        <a:t>to</a:t>
+                      </a:r>
+                      <a:r>
+                        <a:rPr lang="en-US" sz="1200" baseline="0" dirty="0" smtClean="0">
+                          <a:effectLst/>
+                          <a:latin typeface="Arial" panose="020B0604020202020204" pitchFamily="34" charset="0"/>
+                          <a:cs typeface="Arial" panose="020B0604020202020204" pitchFamily="34" charset="0"/>
+                        </a:rPr>
+                        <a:t> edit</a:t>
+                      </a:r>
+                      <a:r>
+                        <a:rPr lang="en-US" sz="1200" dirty="0" smtClean="0">
+                          <a:effectLst/>
+                          <a:latin typeface="Arial" panose="020B0604020202020204" pitchFamily="34" charset="0"/>
+                          <a:cs typeface="Arial" panose="020B0604020202020204" pitchFamily="34" charset="0"/>
+                        </a:rPr>
+                        <a:t> </a:t>
+                      </a:r>
+                      <a:r>
+                        <a:rPr lang="en-US" sz="1200" dirty="0">
+                          <a:effectLst/>
+                          <a:latin typeface="Arial" panose="020B0604020202020204" pitchFamily="34" charset="0"/>
+                          <a:cs typeface="Arial" panose="020B0604020202020204" pitchFamily="34" charset="0"/>
+                        </a:rPr>
+                        <a:t>their own volunteer profile.</a:t>
                       </a:r>
                       <a:endParaRPr lang="en-US" sz="1200" dirty="0">
                         <a:effectLst/>
@@ -20981,7 +21028,39 @@
                           <a:latin typeface="Arial" panose="020B0604020202020204" pitchFamily="34" charset="0"/>
                           <a:cs typeface="Arial" panose="020B0604020202020204" pitchFamily="34" charset="0"/>
                         </a:rPr>
-                        <a:t>I can remove the individuals who are no longer Friends Chapter members.</a:t>
+                        <a:t>I </a:t>
+                      </a:r>
+                      <a:r>
+                        <a:rPr lang="en-US" sz="1200" dirty="0" smtClean="0">
+                          <a:effectLst/>
+                          <a:latin typeface="Arial" panose="020B0604020202020204" pitchFamily="34" charset="0"/>
+                          <a:cs typeface="Arial" panose="020B0604020202020204" pitchFamily="34" charset="0"/>
+                        </a:rPr>
+                        <a:t>can</a:t>
+                      </a:r>
+                      <a:r>
+                        <a:rPr lang="en-US" sz="1200" baseline="0" dirty="0" smtClean="0">
+                          <a:effectLst/>
+                          <a:latin typeface="Arial" panose="020B0604020202020204" pitchFamily="34" charset="0"/>
+                          <a:cs typeface="Arial" panose="020B0604020202020204" pitchFamily="34" charset="0"/>
+                        </a:rPr>
+                        <a:t> deactivate</a:t>
+                      </a:r>
+                      <a:r>
+                        <a:rPr lang="en-US" sz="1200" dirty="0" smtClean="0">
+                          <a:effectLst/>
+                          <a:latin typeface="Arial" panose="020B0604020202020204" pitchFamily="34" charset="0"/>
+                          <a:cs typeface="Arial" panose="020B0604020202020204" pitchFamily="34" charset="0"/>
+                        </a:rPr>
+                        <a:t> </a:t>
+                      </a:r>
+                      <a:r>
+                        <a:rPr lang="en-US" sz="1200" dirty="0">
+                          <a:effectLst/>
+                          <a:latin typeface="Arial" panose="020B0604020202020204" pitchFamily="34" charset="0"/>
+                          <a:cs typeface="Arial" panose="020B0604020202020204" pitchFamily="34" charset="0"/>
+                        </a:rPr>
+                        <a:t>the individuals who are no longer Friends Chapter members.</a:t>
                       </a:r>
                       <a:endParaRPr lang="en-US" sz="1200" dirty="0">
                         <a:effectLst/>
@@ -21604,7 +21683,7 @@
           <p:nvPr>
             <p:extLst>
               <p:ext uri="{D42A27DB-BD31-4B8C-83A1-F6EECF244321}">
-                <p14:modId xmlns:p14="http://schemas.microsoft.com/office/powerpoint/2010/main" val="1979734195"/>
+                <p14:modId xmlns:p14="http://schemas.microsoft.com/office/powerpoint/2010/main" val="3066074527"/>
               </p:ext>
             </p:extLst>
           </p:nvPr>
@@ -21870,7 +21949,7 @@
       </p:sp>
       <p:pic>
         <p:nvPicPr>
-          <p:cNvPr id="2050" name="Picture 2"/>
+          <p:cNvPr id="1026" name="Picture 2"/>
           <p:cNvPicPr>
             <a:picLocks noChangeAspect="1" noChangeArrowheads="1"/>
           </p:cNvPicPr>
@@ -21891,8 +21970,8 @@
         </p:blipFill>
         <p:spPr bwMode="auto">
           <a:xfrm>
-            <a:off x="42863" y="1219200"/>
-            <a:ext cx="9058275" cy="5610225"/>
+            <a:off x="40944" y="1246496"/>
+            <a:ext cx="9053512" cy="5572125"/>
           </a:xfrm>
           <a:prstGeom prst="rect">
             <a:avLst/>
@@ -22305,7 +22384,7 @@
             <a:pPr lvl="1"/>
             <a:r>
               <a:rPr lang="en-US" dirty="0" smtClean="0"/>
-              <a:t>Volunteer Reports App</a:t>
+              <a:t>Volunteer Reports App (Secondary site)</a:t>
             </a:r>
           </a:p>
           <a:p>
@@ -22756,7 +22835,7 @@
             </a:pPr>
             <a:r>
               <a:rPr lang="en-US" dirty="0" smtClean="0"/>
-              <a:t>Lodging Reservations</a:t>
+              <a:t>Cabin Reservations</a:t>
             </a:r>
           </a:p>
           <a:p>
@@ -29437,7 +29516,19 @@
                           <a:ea typeface="Calibri"/>
                           <a:cs typeface="Arial" panose="020B0604020202020204" pitchFamily="34" charset="0"/>
                         </a:rPr>
-                        <a:t>Training on Website Maintenance</a:t>
+                        <a:t>Training on Website </a:t>
+                      </a:r>
+                      <a:r>
+                        <a:rPr lang="en-US" sz="1400" b="1" dirty="0" smtClean="0">
+                          <a:solidFill>
+                            <a:schemeClr val="tx1"/>
+                          </a:solidFill>
+                          <a:effectLst/>
+                          <a:latin typeface="Arial" panose="020B0604020202020204" pitchFamily="34" charset="0"/>
+                          <a:ea typeface="Calibri"/>
+                          <a:cs typeface="Arial" panose="020B0604020202020204" pitchFamily="34" charset="0"/>
+                        </a:rPr>
+                        <a:t>Maintenance</a:t>
                       </a:r>
                       <a:endParaRPr lang="en-US" sz="1400" dirty="0">
                         <a:solidFill>
@@ -32027,7 +32118,7 @@
             <p:ph idx="1"/>
             <p:extLst>
               <p:ext uri="{D42A27DB-BD31-4B8C-83A1-F6EECF244321}">
-                <p14:modId xmlns:p14="http://schemas.microsoft.com/office/powerpoint/2010/main" val="2184457831"/>
+                <p14:modId xmlns:p14="http://schemas.microsoft.com/office/powerpoint/2010/main" val="2883804038"/>
               </p:ext>
             </p:extLst>
           </p:nvPr>
@@ -32350,7 +32441,7 @@
                         <a:rPr lang="en-US" sz="1600" dirty="0" smtClean="0">
                           <a:effectLst/>
                         </a:rPr>
-                        <a:t>4.0 Cottage Accommodations Page</a:t>
+                        <a:t>4.0 Cabin Reservation Page</a:t>
                       </a:r>
                       <a:endParaRPr lang="en-US" sz="1600" dirty="0">
                         <a:effectLst/>
@@ -32384,7 +32475,23 @@
                           <a:latin typeface="Arial" panose="020B0604020202020204" pitchFamily="34" charset="0"/>
                           <a:cs typeface="Arial" panose="020B0604020202020204" pitchFamily="34" charset="0"/>
                         </a:rPr>
-                        <a:t>4.1 Page shall link directly to the relevant state park lodging reservations page.  All hyperlinks shall be active and current.</a:t>
+                        <a:t>4.1 Page shall link directly to the relevant state park </a:t>
+                      </a:r>
+                      <a:r>
+                        <a:rPr lang="en-US" sz="1400" smtClean="0">
+                          <a:effectLst/>
+                          <a:latin typeface="Arial" panose="020B0604020202020204" pitchFamily="34" charset="0"/>
+                          <a:cs typeface="Arial" panose="020B0604020202020204" pitchFamily="34" charset="0"/>
+                        </a:rPr>
+                        <a:t>cabin reservation </a:t>
+                      </a:r>
+                      <a:r>
+                        <a:rPr lang="en-US" sz="1400" dirty="0" smtClean="0">
+                          <a:effectLst/>
+                          <a:latin typeface="Arial" panose="020B0604020202020204" pitchFamily="34" charset="0"/>
+                          <a:cs typeface="Arial" panose="020B0604020202020204" pitchFamily="34" charset="0"/>
+                        </a:rPr>
+                        <a:t>page.  All hyperlinks shall be active and current.</a:t>
                       </a:r>
                       <a:endParaRPr lang="en-US" sz="1400" dirty="0">
                         <a:effectLst/>
@@ -32462,7 +32569,31 @@
                           <a:latin typeface="Arial" panose="020B0604020202020204" pitchFamily="34" charset="0"/>
                           <a:cs typeface="Arial" panose="020B0604020202020204" pitchFamily="34" charset="0"/>
                         </a:rPr>
-                        <a:t>4.2 Details shall be provided for each lodging location such as different attractions, landmarks, trails, etc. to help users refine their search based on what they want to see.</a:t>
+                        <a:t>4.2 Details shall be provided for </a:t>
+                      </a:r>
+                      <a:r>
+                        <a:rPr lang="en-US" sz="1400" smtClean="0">
+                          <a:effectLst/>
+                          <a:latin typeface="Arial" panose="020B0604020202020204" pitchFamily="34" charset="0"/>
+                          <a:cs typeface="Arial" panose="020B0604020202020204" pitchFamily="34" charset="0"/>
+                        </a:rPr>
+                        <a:t>each </a:t>
+                      </a:r>
+                      <a:r>
+                        <a:rPr lang="en-US" sz="1400" smtClean="0">
+                          <a:effectLst/>
+                          <a:latin typeface="Arial" panose="020B0604020202020204" pitchFamily="34" charset="0"/>
+                          <a:cs typeface="Arial" panose="020B0604020202020204" pitchFamily="34" charset="0"/>
+                        </a:rPr>
+                        <a:t>cabin </a:t>
+                      </a:r>
+                      <a:r>
+                        <a:rPr lang="en-US" sz="1400" dirty="0" smtClean="0">
+                          <a:effectLst/>
+                          <a:latin typeface="Arial" panose="020B0604020202020204" pitchFamily="34" charset="0"/>
+                          <a:cs typeface="Arial" panose="020B0604020202020204" pitchFamily="34" charset="0"/>
+                        </a:rPr>
+                        <a:t>location such as different attractions, landmarks, trails, etc. to help users refine their search based on what they want to see.</a:t>
                       </a:r>
                       <a:endParaRPr lang="en-US" sz="1400" b="1" dirty="0">
                         <a:solidFill>

</xml_diff>